<commit_message>
Final prep before recording Mod3Class1
</commit_message>
<xml_diff>
--- a/OctopusDeployFundamentals/Module3-DeploymentProjects/Slides/Module3Class1-DeploymentProcess.pptx
+++ b/OctopusDeployFundamentals/Module3-DeploymentProjects/Slides/Module3Class1-DeploymentProcess.pptx
@@ -5,12 +5,16 @@
     <p:sldMasterId id="2147483659" r:id="rId1"/>
   </p:sldMasterIdLst>
   <p:notesMasterIdLst>
-    <p:notesMasterId r:id="rId5"/>
+    <p:notesMasterId r:id="rId9"/>
   </p:notesMasterIdLst>
   <p:sldIdLst>
     <p:sldId id="268" r:id="rId2"/>
-    <p:sldId id="256" r:id="rId3"/>
-    <p:sldId id="266" r:id="rId4"/>
+    <p:sldId id="283" r:id="rId3"/>
+    <p:sldId id="282" r:id="rId4"/>
+    <p:sldId id="281" r:id="rId5"/>
+    <p:sldId id="280" r:id="rId6"/>
+    <p:sldId id="279" r:id="rId7"/>
+    <p:sldId id="266" r:id="rId8"/>
   </p:sldIdLst>
   <p:sldSz cx="9144000" cy="5143500" type="screen16x9"/>
   <p:notesSz cx="6858000" cy="9144000"/>
@@ -249,11 +253,15 @@
         <p14:section name="INTRO" id="{0270C77D-8110-4626-BEF8-4199083D6286}">
           <p14:sldIdLst>
             <p14:sldId id="268"/>
+            <p14:sldId id="283"/>
           </p14:sldIdLst>
         </p14:section>
         <p14:section name="DEMO" id="{C3189919-67CB-4E4B-8654-B0C10042953A}">
           <p14:sldIdLst>
-            <p14:sldId id="256"/>
+            <p14:sldId id="282"/>
+            <p14:sldId id="281"/>
+            <p14:sldId id="280"/>
+            <p14:sldId id="279"/>
           </p14:sldIdLst>
         </p14:section>
         <p14:section name="SUMMARY" id="{40AB4977-2215-43DB-A49C-091EE9B7BBC7}">
@@ -789,6 +797,72 @@
 </file>
 
 <file path=ppt/notesSlides/notesSlide2.xml><?xml version="1.0" encoding="utf-8"?>
+<p:notes xmlns:a="http://schemas.openxmlformats.org/drawingml/2006/main" xmlns:r="http://schemas.openxmlformats.org/officeDocument/2006/relationships" xmlns:p="http://schemas.openxmlformats.org/presentationml/2006/main">
+  <p:cSld>
+    <p:spTree>
+      <p:nvGrpSpPr>
+        <p:cNvPr id="1" name=""/>
+        <p:cNvGrpSpPr/>
+        <p:nvPr/>
+      </p:nvGrpSpPr>
+      <p:grpSpPr>
+        <a:xfrm>
+          <a:off x="0" y="0"/>
+          <a:ext cx="0" cy="0"/>
+          <a:chOff x="0" y="0"/>
+          <a:chExt cx="0" cy="0"/>
+        </a:xfrm>
+      </p:grpSpPr>
+      <p:sp>
+        <p:nvSpPr>
+          <p:cNvPr id="2" name="Slide Image Placeholder 1"/>
+          <p:cNvSpPr>
+            <a:spLocks noGrp="1" noRot="1" noChangeAspect="1"/>
+          </p:cNvSpPr>
+          <p:nvPr>
+            <p:ph type="sldImg"/>
+          </p:nvPr>
+        </p:nvSpPr>
+        <p:spPr>
+          <a:xfrm>
+            <a:off x="381000" y="685800"/>
+            <a:ext cx="6096000" cy="3429000"/>
+          </a:xfrm>
+        </p:spPr>
+      </p:sp>
+      <p:sp>
+        <p:nvSpPr>
+          <p:cNvPr id="3" name="Notes Placeholder 2"/>
+          <p:cNvSpPr>
+            <a:spLocks noGrp="1"/>
+          </p:cNvSpPr>
+          <p:nvPr>
+            <p:ph type="body" idx="1"/>
+          </p:nvPr>
+        </p:nvSpPr>
+        <p:spPr/>
+        <p:txBody>
+          <a:bodyPr/>
+          <a:lstStyle/>
+          <a:p>
+            <a:endParaRPr lang="en-GB" dirty="0"/>
+          </a:p>
+        </p:txBody>
+      </p:sp>
+    </p:spTree>
+    <p:extLst>
+      <p:ext uri="{BB962C8B-B14F-4D97-AF65-F5344CB8AC3E}">
+        <p14:creationId xmlns:p14="http://schemas.microsoft.com/office/powerpoint/2010/main" val="1634816111"/>
+      </p:ext>
+    </p:extLst>
+  </p:cSld>
+  <p:clrMapOvr>
+    <a:masterClrMapping/>
+  </p:clrMapOvr>
+</p:notes>
+</file>
+
+<file path=ppt/notesSlides/notesSlide3.xml><?xml version="1.0" encoding="utf-8"?>
 <p:notes xmlns:a="http://schemas.openxmlformats.org/drawingml/2006/main" xmlns:r="http://schemas.openxmlformats.org/officeDocument/2006/relationships" xmlns:p="http://schemas.openxmlformats.org/presentationml/2006/main" showMasterSp="0" showMasterPhAnim="0">
   <p:cSld>
     <p:spTree>
@@ -885,6 +959,11 @@
         </p:txBody>
       </p:sp>
     </p:spTree>
+    <p:extLst>
+      <p:ext uri="{BB962C8B-B14F-4D97-AF65-F5344CB8AC3E}">
+        <p14:creationId xmlns:p14="http://schemas.microsoft.com/office/powerpoint/2010/main" val="2380903559"/>
+      </p:ext>
+    </p:extLst>
   </p:cSld>
   <p:clrMapOvr>
     <a:masterClrMapping/>
@@ -892,7 +971,334 @@
 </p:notes>
 </file>
 
-<file path=ppt/notesSlides/notesSlide3.xml><?xml version="1.0" encoding="utf-8"?>
+<file path=ppt/notesSlides/notesSlide4.xml><?xml version="1.0" encoding="utf-8"?>
+<p:notes xmlns:a="http://schemas.openxmlformats.org/drawingml/2006/main" xmlns:r="http://schemas.openxmlformats.org/officeDocument/2006/relationships" xmlns:p="http://schemas.openxmlformats.org/presentationml/2006/main" showMasterSp="0" showMasterPhAnim="0">
+  <p:cSld>
+    <p:spTree>
+      <p:nvGrpSpPr>
+        <p:cNvPr id="1" name="Shape 53"/>
+        <p:cNvGrpSpPr/>
+        <p:nvPr/>
+      </p:nvGrpSpPr>
+      <p:grpSpPr>
+        <a:xfrm>
+          <a:off x="0" y="0"/>
+          <a:ext cx="0" cy="0"/>
+          <a:chOff x="0" y="0"/>
+          <a:chExt cx="0" cy="0"/>
+        </a:xfrm>
+      </p:grpSpPr>
+      <p:sp>
+        <p:nvSpPr>
+          <p:cNvPr id="54" name="Google Shape;54;g10e8f13418e_0_6:notes"/>
+          <p:cNvSpPr>
+            <a:spLocks noGrp="1" noRot="1" noChangeAspect="1"/>
+          </p:cNvSpPr>
+          <p:nvPr>
+            <p:ph type="sldImg" idx="2"/>
+          </p:nvPr>
+        </p:nvSpPr>
+        <p:spPr>
+          <a:xfrm>
+            <a:off x="381000" y="685800"/>
+            <a:ext cx="6096000" cy="3429000"/>
+          </a:xfrm>
+          <a:custGeom>
+            <a:avLst/>
+            <a:gdLst/>
+            <a:ahLst/>
+            <a:cxnLst/>
+            <a:rect l="l" t="t" r="r" b="b"/>
+            <a:pathLst>
+              <a:path w="120000" h="120000" extrusionOk="0">
+                <a:moveTo>
+                  <a:pt x="0" y="0"/>
+                </a:moveTo>
+                <a:lnTo>
+                  <a:pt x="120000" y="0"/>
+                </a:lnTo>
+                <a:lnTo>
+                  <a:pt x="120000" y="120000"/>
+                </a:lnTo>
+                <a:lnTo>
+                  <a:pt x="0" y="120000"/>
+                </a:lnTo>
+                <a:close/>
+              </a:path>
+            </a:pathLst>
+          </a:custGeom>
+        </p:spPr>
+      </p:sp>
+      <p:sp>
+        <p:nvSpPr>
+          <p:cNvPr id="55" name="Google Shape;55;g10e8f13418e_0_6:notes"/>
+          <p:cNvSpPr txBox="1">
+            <a:spLocks noGrp="1"/>
+          </p:cNvSpPr>
+          <p:nvPr>
+            <p:ph type="body" idx="1"/>
+          </p:nvPr>
+        </p:nvSpPr>
+        <p:spPr>
+          <a:xfrm>
+            <a:off x="685800" y="4343400"/>
+            <a:ext cx="5486400" cy="4114800"/>
+          </a:xfrm>
+          <a:prstGeom prst="rect">
+            <a:avLst/>
+          </a:prstGeom>
+        </p:spPr>
+        <p:txBody>
+          <a:bodyPr spcFirstLastPara="1" wrap="square" lIns="91425" tIns="91425" rIns="91425" bIns="91425" anchor="t" anchorCtr="0">
+            <a:noAutofit/>
+          </a:bodyPr>
+          <a:lstStyle/>
+          <a:p>
+            <a:pPr marL="0" lvl="0" indent="0" algn="l" rtl="0">
+              <a:spcBef>
+                <a:spcPts val="0"/>
+              </a:spcBef>
+              <a:spcAft>
+                <a:spcPts val="0"/>
+              </a:spcAft>
+              <a:buNone/>
+            </a:pPr>
+            <a:endParaRPr dirty="0"/>
+          </a:p>
+        </p:txBody>
+      </p:sp>
+    </p:spTree>
+    <p:extLst>
+      <p:ext uri="{BB962C8B-B14F-4D97-AF65-F5344CB8AC3E}">
+        <p14:creationId xmlns:p14="http://schemas.microsoft.com/office/powerpoint/2010/main" val="4225404808"/>
+      </p:ext>
+    </p:extLst>
+  </p:cSld>
+  <p:clrMapOvr>
+    <a:masterClrMapping/>
+  </p:clrMapOvr>
+</p:notes>
+</file>
+
+<file path=ppt/notesSlides/notesSlide5.xml><?xml version="1.0" encoding="utf-8"?>
+<p:notes xmlns:a="http://schemas.openxmlformats.org/drawingml/2006/main" xmlns:r="http://schemas.openxmlformats.org/officeDocument/2006/relationships" xmlns:p="http://schemas.openxmlformats.org/presentationml/2006/main" showMasterSp="0" showMasterPhAnim="0">
+  <p:cSld>
+    <p:spTree>
+      <p:nvGrpSpPr>
+        <p:cNvPr id="1" name="Shape 53"/>
+        <p:cNvGrpSpPr/>
+        <p:nvPr/>
+      </p:nvGrpSpPr>
+      <p:grpSpPr>
+        <a:xfrm>
+          <a:off x="0" y="0"/>
+          <a:ext cx="0" cy="0"/>
+          <a:chOff x="0" y="0"/>
+          <a:chExt cx="0" cy="0"/>
+        </a:xfrm>
+      </p:grpSpPr>
+      <p:sp>
+        <p:nvSpPr>
+          <p:cNvPr id="54" name="Google Shape;54;g10e8f13418e_0_6:notes"/>
+          <p:cNvSpPr>
+            <a:spLocks noGrp="1" noRot="1" noChangeAspect="1"/>
+          </p:cNvSpPr>
+          <p:nvPr>
+            <p:ph type="sldImg" idx="2"/>
+          </p:nvPr>
+        </p:nvSpPr>
+        <p:spPr>
+          <a:xfrm>
+            <a:off x="381000" y="685800"/>
+            <a:ext cx="6096000" cy="3429000"/>
+          </a:xfrm>
+          <a:custGeom>
+            <a:avLst/>
+            <a:gdLst/>
+            <a:ahLst/>
+            <a:cxnLst/>
+            <a:rect l="l" t="t" r="r" b="b"/>
+            <a:pathLst>
+              <a:path w="120000" h="120000" extrusionOk="0">
+                <a:moveTo>
+                  <a:pt x="0" y="0"/>
+                </a:moveTo>
+                <a:lnTo>
+                  <a:pt x="120000" y="0"/>
+                </a:lnTo>
+                <a:lnTo>
+                  <a:pt x="120000" y="120000"/>
+                </a:lnTo>
+                <a:lnTo>
+                  <a:pt x="0" y="120000"/>
+                </a:lnTo>
+                <a:close/>
+              </a:path>
+            </a:pathLst>
+          </a:custGeom>
+        </p:spPr>
+      </p:sp>
+      <p:sp>
+        <p:nvSpPr>
+          <p:cNvPr id="55" name="Google Shape;55;g10e8f13418e_0_6:notes"/>
+          <p:cNvSpPr txBox="1">
+            <a:spLocks noGrp="1"/>
+          </p:cNvSpPr>
+          <p:nvPr>
+            <p:ph type="body" idx="1"/>
+          </p:nvPr>
+        </p:nvSpPr>
+        <p:spPr>
+          <a:xfrm>
+            <a:off x="685800" y="4343400"/>
+            <a:ext cx="5486400" cy="4114800"/>
+          </a:xfrm>
+          <a:prstGeom prst="rect">
+            <a:avLst/>
+          </a:prstGeom>
+        </p:spPr>
+        <p:txBody>
+          <a:bodyPr spcFirstLastPara="1" wrap="square" lIns="91425" tIns="91425" rIns="91425" bIns="91425" anchor="t" anchorCtr="0">
+            <a:noAutofit/>
+          </a:bodyPr>
+          <a:lstStyle/>
+          <a:p>
+            <a:pPr marL="0" lvl="0" indent="0" algn="l" rtl="0">
+              <a:spcBef>
+                <a:spcPts val="0"/>
+              </a:spcBef>
+              <a:spcAft>
+                <a:spcPts val="0"/>
+              </a:spcAft>
+              <a:buNone/>
+            </a:pPr>
+            <a:endParaRPr dirty="0"/>
+          </a:p>
+        </p:txBody>
+      </p:sp>
+    </p:spTree>
+    <p:extLst>
+      <p:ext uri="{BB962C8B-B14F-4D97-AF65-F5344CB8AC3E}">
+        <p14:creationId xmlns:p14="http://schemas.microsoft.com/office/powerpoint/2010/main" val="1793553554"/>
+      </p:ext>
+    </p:extLst>
+  </p:cSld>
+  <p:clrMapOvr>
+    <a:masterClrMapping/>
+  </p:clrMapOvr>
+</p:notes>
+</file>
+
+<file path=ppt/notesSlides/notesSlide6.xml><?xml version="1.0" encoding="utf-8"?>
+<p:notes xmlns:a="http://schemas.openxmlformats.org/drawingml/2006/main" xmlns:r="http://schemas.openxmlformats.org/officeDocument/2006/relationships" xmlns:p="http://schemas.openxmlformats.org/presentationml/2006/main" showMasterSp="0" showMasterPhAnim="0">
+  <p:cSld>
+    <p:spTree>
+      <p:nvGrpSpPr>
+        <p:cNvPr id="1" name="Shape 53"/>
+        <p:cNvGrpSpPr/>
+        <p:nvPr/>
+      </p:nvGrpSpPr>
+      <p:grpSpPr>
+        <a:xfrm>
+          <a:off x="0" y="0"/>
+          <a:ext cx="0" cy="0"/>
+          <a:chOff x="0" y="0"/>
+          <a:chExt cx="0" cy="0"/>
+        </a:xfrm>
+      </p:grpSpPr>
+      <p:sp>
+        <p:nvSpPr>
+          <p:cNvPr id="54" name="Google Shape;54;g10e8f13418e_0_6:notes"/>
+          <p:cNvSpPr>
+            <a:spLocks noGrp="1" noRot="1" noChangeAspect="1"/>
+          </p:cNvSpPr>
+          <p:nvPr>
+            <p:ph type="sldImg" idx="2"/>
+          </p:nvPr>
+        </p:nvSpPr>
+        <p:spPr>
+          <a:xfrm>
+            <a:off x="381000" y="685800"/>
+            <a:ext cx="6096000" cy="3429000"/>
+          </a:xfrm>
+          <a:custGeom>
+            <a:avLst/>
+            <a:gdLst/>
+            <a:ahLst/>
+            <a:cxnLst/>
+            <a:rect l="l" t="t" r="r" b="b"/>
+            <a:pathLst>
+              <a:path w="120000" h="120000" extrusionOk="0">
+                <a:moveTo>
+                  <a:pt x="0" y="0"/>
+                </a:moveTo>
+                <a:lnTo>
+                  <a:pt x="120000" y="0"/>
+                </a:lnTo>
+                <a:lnTo>
+                  <a:pt x="120000" y="120000"/>
+                </a:lnTo>
+                <a:lnTo>
+                  <a:pt x="0" y="120000"/>
+                </a:lnTo>
+                <a:close/>
+              </a:path>
+            </a:pathLst>
+          </a:custGeom>
+        </p:spPr>
+      </p:sp>
+      <p:sp>
+        <p:nvSpPr>
+          <p:cNvPr id="55" name="Google Shape;55;g10e8f13418e_0_6:notes"/>
+          <p:cNvSpPr txBox="1">
+            <a:spLocks noGrp="1"/>
+          </p:cNvSpPr>
+          <p:nvPr>
+            <p:ph type="body" idx="1"/>
+          </p:nvPr>
+        </p:nvSpPr>
+        <p:spPr>
+          <a:xfrm>
+            <a:off x="685800" y="4343400"/>
+            <a:ext cx="5486400" cy="4114800"/>
+          </a:xfrm>
+          <a:prstGeom prst="rect">
+            <a:avLst/>
+          </a:prstGeom>
+        </p:spPr>
+        <p:txBody>
+          <a:bodyPr spcFirstLastPara="1" wrap="square" lIns="91425" tIns="91425" rIns="91425" bIns="91425" anchor="t" anchorCtr="0">
+            <a:noAutofit/>
+          </a:bodyPr>
+          <a:lstStyle/>
+          <a:p>
+            <a:pPr marL="0" lvl="0" indent="0" algn="l" rtl="0">
+              <a:spcBef>
+                <a:spcPts val="0"/>
+              </a:spcBef>
+              <a:spcAft>
+                <a:spcPts val="0"/>
+              </a:spcAft>
+              <a:buNone/>
+            </a:pPr>
+            <a:endParaRPr dirty="0"/>
+          </a:p>
+        </p:txBody>
+      </p:sp>
+    </p:spTree>
+    <p:extLst>
+      <p:ext uri="{BB962C8B-B14F-4D97-AF65-F5344CB8AC3E}">
+        <p14:creationId xmlns:p14="http://schemas.microsoft.com/office/powerpoint/2010/main" val="2431361088"/>
+      </p:ext>
+    </p:extLst>
+  </p:cSld>
+  <p:clrMapOvr>
+    <a:masterClrMapping/>
+  </p:clrMapOvr>
+</p:notes>
+</file>
+
+<file path=ppt/notesSlides/notesSlide7.xml><?xml version="1.0" encoding="utf-8"?>
 <p:notes xmlns:a="http://schemas.openxmlformats.org/drawingml/2006/main" xmlns:r="http://schemas.openxmlformats.org/officeDocument/2006/relationships" xmlns:p="http://schemas.openxmlformats.org/presentationml/2006/main" showMasterSp="0" showMasterPhAnim="0">
   <p:cSld>
     <p:spTree>
@@ -5775,10 +6181,91 @@
   <p:clrMapOvr>
     <a:masterClrMapping/>
   </p:clrMapOvr>
+  <mc:AlternateContent xmlns:mc="http://schemas.openxmlformats.org/markup-compatibility/2006">
+    <mc:Choice xmlns:p14="http://schemas.microsoft.com/office/powerpoint/2010/main" Requires="p14">
+      <p:transition spd="med" p14:dur="700">
+        <p:fade/>
+      </p:transition>
+    </mc:Choice>
+    <mc:Fallback>
+      <p:transition spd="med">
+        <p:fade/>
+      </p:transition>
+    </mc:Fallback>
+  </mc:AlternateContent>
 </p:sld>
 </file>
 
 <file path=ppt/slides/slide2.xml><?xml version="1.0" encoding="utf-8"?>
+<p:sld xmlns:a="http://schemas.openxmlformats.org/drawingml/2006/main" xmlns:r="http://schemas.openxmlformats.org/officeDocument/2006/relationships" xmlns:p="http://schemas.openxmlformats.org/presentationml/2006/main">
+  <p:cSld>
+    <p:spTree>
+      <p:nvGrpSpPr>
+        <p:cNvPr id="1" name=""/>
+        <p:cNvGrpSpPr/>
+        <p:nvPr/>
+      </p:nvGrpSpPr>
+      <p:grpSpPr>
+        <a:xfrm>
+          <a:off x="0" y="0"/>
+          <a:ext cx="0" cy="0"/>
+          <a:chOff x="0" y="0"/>
+          <a:chExt cx="0" cy="0"/>
+        </a:xfrm>
+      </p:grpSpPr>
+      <p:sp>
+        <p:nvSpPr>
+          <p:cNvPr id="4" name="Title 3">
+            <a:extLst>
+              <a:ext uri="{FF2B5EF4-FFF2-40B4-BE49-F238E27FC236}">
+                <a16:creationId xmlns:a16="http://schemas.microsoft.com/office/drawing/2014/main" id="{76E66CEA-C7C2-4509-AFDD-13BC8CAF7A2E}"/>
+              </a:ext>
+            </a:extLst>
+          </p:cNvPr>
+          <p:cNvSpPr>
+            <a:spLocks noGrp="1"/>
+          </p:cNvSpPr>
+          <p:nvPr>
+            <p:ph type="title"/>
+          </p:nvPr>
+        </p:nvSpPr>
+        <p:spPr/>
+        <p:txBody>
+          <a:bodyPr>
+            <a:normAutofit fontScale="90000"/>
+          </a:bodyPr>
+          <a:lstStyle/>
+          <a:p>
+            <a:endParaRPr lang="en-GB"/>
+          </a:p>
+        </p:txBody>
+      </p:sp>
+    </p:spTree>
+    <p:extLst>
+      <p:ext uri="{BB962C8B-B14F-4D97-AF65-F5344CB8AC3E}">
+        <p14:creationId xmlns:p14="http://schemas.microsoft.com/office/powerpoint/2010/main" val="46703598"/>
+      </p:ext>
+    </p:extLst>
+  </p:cSld>
+  <p:clrMapOvr>
+    <a:masterClrMapping/>
+  </p:clrMapOvr>
+  <mc:AlternateContent xmlns:mc="http://schemas.openxmlformats.org/markup-compatibility/2006">
+    <mc:Choice xmlns:p14="http://schemas.microsoft.com/office/powerpoint/2010/main" Requires="p14">
+      <p:transition spd="med" p14:dur="700">
+        <p:fade/>
+      </p:transition>
+    </mc:Choice>
+    <mc:Fallback>
+      <p:transition spd="med">
+        <p:fade/>
+      </p:transition>
+    </mc:Fallback>
+  </mc:AlternateContent>
+</p:sld>
+</file>
+
+<file path=ppt/slides/slide3.xml><?xml version="1.0" encoding="utf-8"?>
 <p:sld xmlns:a="http://schemas.openxmlformats.org/drawingml/2006/main" xmlns:r="http://schemas.openxmlformats.org/officeDocument/2006/relationships" xmlns:p="http://schemas.openxmlformats.org/presentationml/2006/main">
   <p:cSld>
     <p:spTree>
@@ -5797,68 +6284,606 @@
       </p:grpSpPr>
       <p:sp>
         <p:nvSpPr>
-          <p:cNvPr id="5" name="Title 4">
+          <p:cNvPr id="21" name="Rectangle 20">
             <a:extLst>
               <a:ext uri="{FF2B5EF4-FFF2-40B4-BE49-F238E27FC236}">
-                <a16:creationId xmlns:a16="http://schemas.microsoft.com/office/drawing/2014/main" id="{9380990E-8DA0-45AE-8970-46D0E77B3FDA}"/>
+                <a16:creationId xmlns:a16="http://schemas.microsoft.com/office/drawing/2014/main" id="{516D30A2-39F4-4AD0-AC87-0DAB450E7712}"/>
               </a:ext>
             </a:extLst>
           </p:cNvPr>
-          <p:cNvSpPr>
-            <a:spLocks noGrp="1"/>
-          </p:cNvSpPr>
-          <p:nvPr>
-            <p:ph type="title"/>
-          </p:nvPr>
+          <p:cNvSpPr/>
+          <p:nvPr/>
         </p:nvSpPr>
-        <p:spPr/>
+        <p:spPr>
+          <a:xfrm>
+            <a:off x="6848624" y="1725773"/>
+            <a:ext cx="1669918" cy="1037607"/>
+          </a:xfrm>
+          <a:prstGeom prst="rect">
+            <a:avLst/>
+          </a:prstGeom>
+          <a:noFill/>
+          <a:ln w="76200">
+            <a:noFill/>
+            <a:miter lim="800000"/>
+          </a:ln>
+        </p:spPr>
+        <p:style>
+          <a:lnRef idx="2">
+            <a:schemeClr val="accent1">
+              <a:shade val="50000"/>
+            </a:schemeClr>
+          </a:lnRef>
+          <a:fillRef idx="1">
+            <a:schemeClr val="accent1"/>
+          </a:fillRef>
+          <a:effectRef idx="0">
+            <a:schemeClr val="accent1"/>
+          </a:effectRef>
+          <a:fontRef idx="minor">
+            <a:schemeClr val="lt1"/>
+          </a:fontRef>
+        </p:style>
         <p:txBody>
-          <a:bodyPr>
-            <a:normAutofit fontScale="90000"/>
-          </a:bodyPr>
+          <a:bodyPr rtlCol="0" anchor="t"/>
           <a:lstStyle/>
           <a:p>
-            <a:endParaRPr lang="en-GB" dirty="0"/>
+            <a:r>
+              <a:rPr lang="en-GB" sz="1100" dirty="0">
+                <a:latin typeface="Consolas" panose="020B0609020204030204" pitchFamily="49" charset="0"/>
+              </a:rPr>
+              <a:t>Database</a:t>
+            </a:r>
+            <a:endParaRPr lang="en-GB" sz="1100" dirty="0">
+              <a:solidFill>
+                <a:schemeClr val="accent6"/>
+              </a:solidFill>
+              <a:latin typeface="Consolas" panose="020B0609020204030204" pitchFamily="49" charset="0"/>
+            </a:endParaRPr>
           </a:p>
         </p:txBody>
       </p:sp>
       <p:sp>
         <p:nvSpPr>
-          <p:cNvPr id="3" name="Text Placeholder 2">
+          <p:cNvPr id="17" name="Rectangle 16">
             <a:extLst>
               <a:ext uri="{FF2B5EF4-FFF2-40B4-BE49-F238E27FC236}">
-                <a16:creationId xmlns:a16="http://schemas.microsoft.com/office/drawing/2014/main" id="{39A17BC3-A6E7-4345-A784-987AAE0EBF16}"/>
+                <a16:creationId xmlns:a16="http://schemas.microsoft.com/office/drawing/2014/main" id="{D99FB313-AE7E-46EB-96DD-32A98C640097}"/>
               </a:ext>
             </a:extLst>
           </p:cNvPr>
-          <p:cNvSpPr>
-            <a:spLocks noGrp="1"/>
-          </p:cNvSpPr>
-          <p:nvPr>
-            <p:ph type="body" idx="1"/>
-          </p:nvPr>
+          <p:cNvSpPr/>
+          <p:nvPr/>
         </p:nvSpPr>
-        <p:spPr/>
+        <p:spPr>
+          <a:xfrm>
+            <a:off x="5060039" y="1725774"/>
+            <a:ext cx="1669918" cy="1037607"/>
+          </a:xfrm>
+          <a:prstGeom prst="rect">
+            <a:avLst/>
+          </a:prstGeom>
+          <a:noFill/>
+          <a:ln w="76200">
+            <a:noFill/>
+            <a:miter lim="800000"/>
+          </a:ln>
+        </p:spPr>
+        <p:style>
+          <a:lnRef idx="2">
+            <a:schemeClr val="accent1">
+              <a:shade val="50000"/>
+            </a:schemeClr>
+          </a:lnRef>
+          <a:fillRef idx="1">
+            <a:schemeClr val="accent1"/>
+          </a:fillRef>
+          <a:effectRef idx="0">
+            <a:schemeClr val="accent1"/>
+          </a:effectRef>
+          <a:fontRef idx="minor">
+            <a:schemeClr val="lt1"/>
+          </a:fontRef>
+        </p:style>
         <p:txBody>
-          <a:bodyPr/>
+          <a:bodyPr rtlCol="0" anchor="t"/>
           <a:lstStyle/>
           <a:p>
-            <a:endParaRPr lang="en-GB"/>
+            <a:r>
+              <a:rPr lang="en-GB" sz="1100" dirty="0">
+                <a:latin typeface="Consolas" panose="020B0609020204030204" pitchFamily="49" charset="0"/>
+              </a:rPr>
+              <a:t>Service</a:t>
+            </a:r>
+            <a:endParaRPr lang="en-GB" sz="1100" dirty="0">
+              <a:solidFill>
+                <a:schemeClr val="accent6"/>
+              </a:solidFill>
+              <a:latin typeface="Consolas" panose="020B0609020204030204" pitchFamily="49" charset="0"/>
+            </a:endParaRPr>
           </a:p>
         </p:txBody>
       </p:sp>
+      <p:sp>
+        <p:nvSpPr>
+          <p:cNvPr id="20" name="Rectangle 19">
+            <a:extLst>
+              <a:ext uri="{FF2B5EF4-FFF2-40B4-BE49-F238E27FC236}">
+                <a16:creationId xmlns:a16="http://schemas.microsoft.com/office/drawing/2014/main" id="{DBC9E0D9-E69C-4055-A9F2-BF29E344A23A}"/>
+              </a:ext>
+            </a:extLst>
+          </p:cNvPr>
+          <p:cNvSpPr/>
+          <p:nvPr/>
+        </p:nvSpPr>
+        <p:spPr>
+          <a:xfrm>
+            <a:off x="3273557" y="1725775"/>
+            <a:ext cx="1669918" cy="1037607"/>
+          </a:xfrm>
+          <a:prstGeom prst="rect">
+            <a:avLst/>
+          </a:prstGeom>
+          <a:noFill/>
+          <a:ln w="76200">
+            <a:noFill/>
+            <a:miter lim="800000"/>
+          </a:ln>
+        </p:spPr>
+        <p:style>
+          <a:lnRef idx="2">
+            <a:schemeClr val="accent1">
+              <a:shade val="50000"/>
+            </a:schemeClr>
+          </a:lnRef>
+          <a:fillRef idx="1">
+            <a:schemeClr val="accent1"/>
+          </a:fillRef>
+          <a:effectRef idx="0">
+            <a:schemeClr val="accent1"/>
+          </a:effectRef>
+          <a:fontRef idx="minor">
+            <a:schemeClr val="lt1"/>
+          </a:fontRef>
+        </p:style>
+        <p:txBody>
+          <a:bodyPr rtlCol="0" anchor="t"/>
+          <a:lstStyle/>
+          <a:p>
+            <a:r>
+              <a:rPr lang="en-GB" sz="1100" dirty="0">
+                <a:latin typeface="Consolas" panose="020B0609020204030204" pitchFamily="49" charset="0"/>
+              </a:rPr>
+              <a:t>Web portal</a:t>
+            </a:r>
+            <a:endParaRPr lang="en-GB" sz="1100" dirty="0">
+              <a:solidFill>
+                <a:schemeClr val="accent6"/>
+              </a:solidFill>
+              <a:latin typeface="Consolas" panose="020B0609020204030204" pitchFamily="49" charset="0"/>
+            </a:endParaRPr>
+          </a:p>
+        </p:txBody>
+      </p:sp>
+      <p:sp>
+        <p:nvSpPr>
+          <p:cNvPr id="6" name="Rectangle 5">
+            <a:extLst>
+              <a:ext uri="{FF2B5EF4-FFF2-40B4-BE49-F238E27FC236}">
+                <a16:creationId xmlns:a16="http://schemas.microsoft.com/office/drawing/2014/main" id="{7ECADFE4-6284-40CF-A1D9-75FE6FDFA479}"/>
+              </a:ext>
+            </a:extLst>
+          </p:cNvPr>
+          <p:cNvSpPr/>
+          <p:nvPr/>
+        </p:nvSpPr>
+        <p:spPr>
+          <a:xfrm>
+            <a:off x="-3734770" y="867307"/>
+            <a:ext cx="2571512" cy="892911"/>
+          </a:xfrm>
+          <a:prstGeom prst="rect">
+            <a:avLst/>
+          </a:prstGeom>
+          <a:solidFill>
+            <a:srgbClr val="00CC65"/>
+          </a:solidFill>
+          <a:ln w="76200">
+            <a:solidFill>
+              <a:schemeClr val="bg1"/>
+            </a:solidFill>
+            <a:miter lim="800000"/>
+          </a:ln>
+        </p:spPr>
+        <p:style>
+          <a:lnRef idx="2">
+            <a:schemeClr val="accent1">
+              <a:shade val="50000"/>
+            </a:schemeClr>
+          </a:lnRef>
+          <a:fillRef idx="1">
+            <a:schemeClr val="accent1"/>
+          </a:fillRef>
+          <a:effectRef idx="0">
+            <a:schemeClr val="accent1"/>
+          </a:effectRef>
+          <a:fontRef idx="minor">
+            <a:schemeClr val="lt1"/>
+          </a:fontRef>
+        </p:style>
+        <p:txBody>
+          <a:bodyPr rtlCol="0" anchor="t"/>
+          <a:lstStyle/>
+          <a:p>
+            <a:r>
+              <a:rPr lang="en-GB" sz="1100" b="1" dirty="0">
+                <a:latin typeface="Consolas" panose="020B0609020204030204" pitchFamily="49" charset="0"/>
+              </a:rPr>
+              <a:t>Target: Web02</a:t>
+            </a:r>
+          </a:p>
+          <a:p>
+            <a:r>
+              <a:rPr lang="en-GB" sz="1100" b="1" dirty="0">
+                <a:latin typeface="Consolas" panose="020B0609020204030204" pitchFamily="49" charset="0"/>
+              </a:rPr>
+              <a:t>Roles:</a:t>
+            </a:r>
+            <a:r>
+              <a:rPr lang="en-GB" sz="300" b="1" dirty="0">
+                <a:latin typeface="Consolas" panose="020B0609020204030204" pitchFamily="49" charset="0"/>
+              </a:rPr>
+              <a:t> </a:t>
+            </a:r>
+            <a:endParaRPr lang="en-GB" sz="1100" b="1" dirty="0">
+              <a:latin typeface="Consolas" panose="020B0609020204030204" pitchFamily="49" charset="0"/>
+            </a:endParaRPr>
+          </a:p>
+          <a:p>
+            <a:r>
+              <a:rPr lang="en-GB" sz="1100" b="1" dirty="0" err="1">
+                <a:solidFill>
+                  <a:srgbClr val="FFFF00"/>
+                </a:solidFill>
+                <a:latin typeface="Consolas" panose="020B0609020204030204" pitchFamily="49" charset="0"/>
+              </a:rPr>
+              <a:t>WebServer</a:t>
+            </a:r>
+            <a:endParaRPr lang="en-GB" sz="1100" b="1" dirty="0">
+              <a:solidFill>
+                <a:srgbClr val="FFFF00"/>
+              </a:solidFill>
+              <a:latin typeface="Consolas" panose="020B0609020204030204" pitchFamily="49" charset="0"/>
+            </a:endParaRPr>
+          </a:p>
+          <a:p>
+            <a:endParaRPr lang="en-GB" sz="1100" dirty="0">
+              <a:latin typeface="Consolas" panose="020B0609020204030204" pitchFamily="49" charset="0"/>
+            </a:endParaRPr>
+          </a:p>
+        </p:txBody>
+      </p:sp>
+      <p:sp>
+        <p:nvSpPr>
+          <p:cNvPr id="7" name="Rectangle 6">
+            <a:extLst>
+              <a:ext uri="{FF2B5EF4-FFF2-40B4-BE49-F238E27FC236}">
+                <a16:creationId xmlns:a16="http://schemas.microsoft.com/office/drawing/2014/main" id="{97423E62-1D0A-45F2-A76F-1D2484112914}"/>
+              </a:ext>
+            </a:extLst>
+          </p:cNvPr>
+          <p:cNvSpPr/>
+          <p:nvPr/>
+        </p:nvSpPr>
+        <p:spPr>
+          <a:xfrm>
+            <a:off x="-3517602" y="3658485"/>
+            <a:ext cx="2571514" cy="917722"/>
+          </a:xfrm>
+          <a:prstGeom prst="rect">
+            <a:avLst/>
+          </a:prstGeom>
+          <a:solidFill>
+            <a:srgbClr val="2F93E0"/>
+          </a:solidFill>
+          <a:ln w="76200">
+            <a:solidFill>
+              <a:schemeClr val="bg1"/>
+            </a:solidFill>
+            <a:miter lim="800000"/>
+          </a:ln>
+        </p:spPr>
+        <p:style>
+          <a:lnRef idx="2">
+            <a:schemeClr val="accent1">
+              <a:shade val="50000"/>
+            </a:schemeClr>
+          </a:lnRef>
+          <a:fillRef idx="1">
+            <a:schemeClr val="accent1"/>
+          </a:fillRef>
+          <a:effectRef idx="0">
+            <a:schemeClr val="accent1"/>
+          </a:effectRef>
+          <a:fontRef idx="minor">
+            <a:schemeClr val="lt1"/>
+          </a:fontRef>
+        </p:style>
+        <p:txBody>
+          <a:bodyPr rtlCol="0" anchor="t"/>
+          <a:lstStyle/>
+          <a:p>
+            <a:r>
+              <a:rPr lang="en-GB" sz="1100" dirty="0">
+                <a:latin typeface="Consolas" panose="020B0609020204030204" pitchFamily="49" charset="0"/>
+              </a:rPr>
+              <a:t>Target: DB02</a:t>
+            </a:r>
+          </a:p>
+          <a:p>
+            <a:r>
+              <a:rPr lang="en-GB" sz="300" dirty="0">
+                <a:latin typeface="Consolas" panose="020B0609020204030204" pitchFamily="49" charset="0"/>
+              </a:rPr>
+              <a:t> </a:t>
+            </a:r>
+            <a:r>
+              <a:rPr lang="en-GB" sz="1100" dirty="0">
+                <a:latin typeface="Consolas" panose="020B0609020204030204" pitchFamily="49" charset="0"/>
+              </a:rPr>
+              <a:t>Roles:</a:t>
+            </a:r>
+            <a:r>
+              <a:rPr lang="en-GB" sz="300" dirty="0">
+                <a:latin typeface="Consolas" panose="020B0609020204030204" pitchFamily="49" charset="0"/>
+              </a:rPr>
+              <a:t> </a:t>
+            </a:r>
+            <a:endParaRPr lang="en-GB" sz="1100" dirty="0">
+              <a:latin typeface="Consolas" panose="020B0609020204030204" pitchFamily="49" charset="0"/>
+            </a:endParaRPr>
+          </a:p>
+          <a:p>
+            <a:r>
+              <a:rPr lang="en-GB" sz="1100" dirty="0">
+                <a:solidFill>
+                  <a:schemeClr val="accent6"/>
+                </a:solidFill>
+                <a:latin typeface="Consolas" panose="020B0609020204030204" pitchFamily="49" charset="0"/>
+              </a:rPr>
+              <a:t>Database</a:t>
+            </a:r>
+          </a:p>
+          <a:p>
+            <a:endParaRPr lang="en-GB" sz="1100" dirty="0">
+              <a:latin typeface="Consolas" panose="020B0609020204030204" pitchFamily="49" charset="0"/>
+            </a:endParaRPr>
+          </a:p>
+        </p:txBody>
+      </p:sp>
+      <p:sp>
+        <p:nvSpPr>
+          <p:cNvPr id="9" name="Rectangle 8">
+            <a:extLst>
+              <a:ext uri="{FF2B5EF4-FFF2-40B4-BE49-F238E27FC236}">
+                <a16:creationId xmlns:a16="http://schemas.microsoft.com/office/drawing/2014/main" id="{708F42E3-02CA-44D3-9683-0CADB846FD68}"/>
+              </a:ext>
+            </a:extLst>
+          </p:cNvPr>
+          <p:cNvSpPr/>
+          <p:nvPr/>
+        </p:nvSpPr>
+        <p:spPr>
+          <a:xfrm>
+            <a:off x="-3833226" y="2416071"/>
+            <a:ext cx="2571512" cy="892911"/>
+          </a:xfrm>
+          <a:prstGeom prst="rect">
+            <a:avLst/>
+          </a:prstGeom>
+          <a:solidFill>
+            <a:srgbClr val="00CC65"/>
+          </a:solidFill>
+          <a:ln w="76200">
+            <a:solidFill>
+              <a:schemeClr val="bg1"/>
+            </a:solidFill>
+            <a:miter lim="800000"/>
+          </a:ln>
+        </p:spPr>
+        <p:style>
+          <a:lnRef idx="2">
+            <a:schemeClr val="accent1">
+              <a:shade val="50000"/>
+            </a:schemeClr>
+          </a:lnRef>
+          <a:fillRef idx="1">
+            <a:schemeClr val="accent1"/>
+          </a:fillRef>
+          <a:effectRef idx="0">
+            <a:schemeClr val="accent1"/>
+          </a:effectRef>
+          <a:fontRef idx="minor">
+            <a:schemeClr val="lt1"/>
+          </a:fontRef>
+        </p:style>
+        <p:txBody>
+          <a:bodyPr rtlCol="0" anchor="t"/>
+          <a:lstStyle/>
+          <a:p>
+            <a:r>
+              <a:rPr lang="en-GB" sz="1100" b="1" dirty="0">
+                <a:latin typeface="Consolas" panose="020B0609020204030204" pitchFamily="49" charset="0"/>
+              </a:rPr>
+              <a:t>Target: Web03</a:t>
+            </a:r>
+          </a:p>
+          <a:p>
+            <a:r>
+              <a:rPr lang="en-GB" sz="1100" b="1" dirty="0">
+                <a:latin typeface="Consolas" panose="020B0609020204030204" pitchFamily="49" charset="0"/>
+              </a:rPr>
+              <a:t>Roles:</a:t>
+            </a:r>
+            <a:r>
+              <a:rPr lang="en-GB" sz="300" b="1" dirty="0">
+                <a:latin typeface="Consolas" panose="020B0609020204030204" pitchFamily="49" charset="0"/>
+              </a:rPr>
+              <a:t> </a:t>
+            </a:r>
+            <a:endParaRPr lang="en-GB" sz="1100" b="1" dirty="0">
+              <a:latin typeface="Consolas" panose="020B0609020204030204" pitchFamily="49" charset="0"/>
+            </a:endParaRPr>
+          </a:p>
+          <a:p>
+            <a:r>
+              <a:rPr lang="en-GB" sz="1100" b="1" dirty="0" err="1">
+                <a:solidFill>
+                  <a:srgbClr val="FFFF00"/>
+                </a:solidFill>
+                <a:latin typeface="Consolas" panose="020B0609020204030204" pitchFamily="49" charset="0"/>
+              </a:rPr>
+              <a:t>WebServer</a:t>
+            </a:r>
+            <a:endParaRPr lang="en-GB" sz="1100" b="1" dirty="0">
+              <a:solidFill>
+                <a:srgbClr val="FFFF00"/>
+              </a:solidFill>
+              <a:latin typeface="Consolas" panose="020B0609020204030204" pitchFamily="49" charset="0"/>
+            </a:endParaRPr>
+          </a:p>
+          <a:p>
+            <a:endParaRPr lang="en-GB" sz="1100" dirty="0">
+              <a:latin typeface="Consolas" panose="020B0609020204030204" pitchFamily="49" charset="0"/>
+            </a:endParaRPr>
+          </a:p>
+        </p:txBody>
+      </p:sp>
+      <p:pic>
+        <p:nvPicPr>
+          <p:cNvPr id="10" name="Graphic 9" descr="Internet with solid fill">
+            <a:extLst>
+              <a:ext uri="{FF2B5EF4-FFF2-40B4-BE49-F238E27FC236}">
+                <a16:creationId xmlns:a16="http://schemas.microsoft.com/office/drawing/2014/main" id="{2E00E9F0-C9B7-4319-9440-8D811CDB8778}"/>
+              </a:ext>
+            </a:extLst>
+          </p:cNvPr>
+          <p:cNvPicPr>
+            <a:picLocks noChangeAspect="1"/>
+          </p:cNvPicPr>
+          <p:nvPr/>
+        </p:nvPicPr>
+        <p:blipFill>
+          <a:blip r:embed="rId3">
+            <a:extLst>
+              <a:ext uri="{96DAC541-7B7A-43D3-8B79-37D633B846F1}">
+                <asvg:svgBlip xmlns:asvg="http://schemas.microsoft.com/office/drawing/2016/SVG/main" r:embed="rId4"/>
+              </a:ext>
+            </a:extLst>
+          </a:blip>
+          <a:stretch>
+            <a:fillRect/>
+          </a:stretch>
+        </p:blipFill>
+        <p:spPr>
+          <a:xfrm>
+            <a:off x="3651316" y="1848982"/>
+            <a:ext cx="914400" cy="914400"/>
+          </a:xfrm>
+          <a:prstGeom prst="rect">
+            <a:avLst/>
+          </a:prstGeom>
+        </p:spPr>
+      </p:pic>
+      <p:pic>
+        <p:nvPicPr>
+          <p:cNvPr id="12" name="Graphic 11" descr="Cmd Terminal with solid fill">
+            <a:extLst>
+              <a:ext uri="{FF2B5EF4-FFF2-40B4-BE49-F238E27FC236}">
+                <a16:creationId xmlns:a16="http://schemas.microsoft.com/office/drawing/2014/main" id="{BC42805B-F436-4492-8C67-B5C11BD975D1}"/>
+              </a:ext>
+            </a:extLst>
+          </p:cNvPr>
+          <p:cNvPicPr>
+            <a:picLocks noChangeAspect="1"/>
+          </p:cNvPicPr>
+          <p:nvPr/>
+        </p:nvPicPr>
+        <p:blipFill>
+          <a:blip r:embed="rId5">
+            <a:extLst>
+              <a:ext uri="{96DAC541-7B7A-43D3-8B79-37D633B846F1}">
+                <asvg:svgBlip xmlns:asvg="http://schemas.microsoft.com/office/drawing/2016/SVG/main" r:embed="rId6"/>
+              </a:ext>
+            </a:extLst>
+          </a:blip>
+          <a:stretch>
+            <a:fillRect/>
+          </a:stretch>
+        </p:blipFill>
+        <p:spPr>
+          <a:xfrm>
+            <a:off x="5494935" y="1848982"/>
+            <a:ext cx="914400" cy="928867"/>
+          </a:xfrm>
+          <a:prstGeom prst="rect">
+            <a:avLst/>
+          </a:prstGeom>
+        </p:spPr>
+      </p:pic>
+      <p:pic>
+        <p:nvPicPr>
+          <p:cNvPr id="14" name="Graphic 13" descr="Database with solid fill">
+            <a:extLst>
+              <a:ext uri="{FF2B5EF4-FFF2-40B4-BE49-F238E27FC236}">
+                <a16:creationId xmlns:a16="http://schemas.microsoft.com/office/drawing/2014/main" id="{F8FDECFF-7DAC-47B9-8E63-266058585BA4}"/>
+              </a:ext>
+            </a:extLst>
+          </p:cNvPr>
+          <p:cNvPicPr>
+            <a:picLocks noChangeAspect="1"/>
+          </p:cNvPicPr>
+          <p:nvPr/>
+        </p:nvPicPr>
+        <p:blipFill>
+          <a:blip r:embed="rId7">
+            <a:extLst>
+              <a:ext uri="{96DAC541-7B7A-43D3-8B79-37D633B846F1}">
+                <asvg:svgBlip xmlns:asvg="http://schemas.microsoft.com/office/drawing/2016/SVG/main" r:embed="rId8"/>
+              </a:ext>
+            </a:extLst>
+          </a:blip>
+          <a:stretch>
+            <a:fillRect/>
+          </a:stretch>
+        </p:blipFill>
+        <p:spPr>
+          <a:xfrm>
+            <a:off x="7226383" y="1854695"/>
+            <a:ext cx="914400" cy="914400"/>
+          </a:xfrm>
+          <a:prstGeom prst="rect">
+            <a:avLst/>
+          </a:prstGeom>
+        </p:spPr>
+      </p:pic>
     </p:spTree>
+    <p:extLst>
+      <p:ext uri="{BB962C8B-B14F-4D97-AF65-F5344CB8AC3E}">
+        <p14:creationId xmlns:p14="http://schemas.microsoft.com/office/powerpoint/2010/main" val="3900287846"/>
+      </p:ext>
+    </p:extLst>
   </p:cSld>
   <p:clrMapOvr>
     <a:masterClrMapping/>
   </p:clrMapOvr>
-  <mc:AlternateContent xmlns:mc="http://schemas.openxmlformats.org/markup-compatibility/2006" xmlns:p14="http://schemas.microsoft.com/office/powerpoint/2010/main">
-    <mc:Choice Requires="p14">
+  <mc:AlternateContent xmlns:mc="http://schemas.openxmlformats.org/markup-compatibility/2006">
+    <mc:Choice xmlns:p14="http://schemas.microsoft.com/office/powerpoint/2010/main" Requires="p14">
       <p:transition spd="med" p14:dur="700">
         <p:fade/>
       </p:transition>
     </mc:Choice>
-    <mc:Fallback xmlns="">
+    <mc:Fallback>
       <p:transition spd="med">
         <p:fade/>
       </p:transition>
@@ -5867,7 +6892,2269 @@
 </p:sld>
 </file>
 
-<file path=ppt/slides/slide3.xml><?xml version="1.0" encoding="utf-8"?>
+<file path=ppt/slides/slide4.xml><?xml version="1.0" encoding="utf-8"?>
+<p:sld xmlns:a="http://schemas.openxmlformats.org/drawingml/2006/main" xmlns:r="http://schemas.openxmlformats.org/officeDocument/2006/relationships" xmlns:p="http://schemas.openxmlformats.org/presentationml/2006/main">
+  <p:cSld>
+    <p:spTree>
+      <p:nvGrpSpPr>
+        <p:cNvPr id="1" name="Shape 56"/>
+        <p:cNvGrpSpPr/>
+        <p:nvPr/>
+      </p:nvGrpSpPr>
+      <p:grpSpPr>
+        <a:xfrm>
+          <a:off x="0" y="0"/>
+          <a:ext cx="0" cy="0"/>
+          <a:chOff x="0" y="0"/>
+          <a:chExt cx="0" cy="0"/>
+        </a:xfrm>
+      </p:grpSpPr>
+      <p:sp>
+        <p:nvSpPr>
+          <p:cNvPr id="4" name="Rectangle 3">
+            <a:extLst>
+              <a:ext uri="{FF2B5EF4-FFF2-40B4-BE49-F238E27FC236}">
+                <a16:creationId xmlns:a16="http://schemas.microsoft.com/office/drawing/2014/main" id="{76081B0F-E9B5-4D6B-A920-D7CA77CB05F3}"/>
+              </a:ext>
+            </a:extLst>
+          </p:cNvPr>
+          <p:cNvSpPr/>
+          <p:nvPr/>
+        </p:nvSpPr>
+        <p:spPr>
+          <a:xfrm>
+            <a:off x="2748915" y="1308736"/>
+            <a:ext cx="6297930" cy="1634489"/>
+          </a:xfrm>
+          <a:prstGeom prst="rect">
+            <a:avLst/>
+          </a:prstGeom>
+          <a:noFill/>
+          <a:ln w="76200">
+            <a:solidFill>
+              <a:schemeClr val="bg1"/>
+            </a:solidFill>
+            <a:miter lim="800000"/>
+          </a:ln>
+        </p:spPr>
+        <p:style>
+          <a:lnRef idx="2">
+            <a:schemeClr val="accent1">
+              <a:shade val="50000"/>
+            </a:schemeClr>
+          </a:lnRef>
+          <a:fillRef idx="1">
+            <a:schemeClr val="accent1"/>
+          </a:fillRef>
+          <a:effectRef idx="0">
+            <a:schemeClr val="accent1"/>
+          </a:effectRef>
+          <a:fontRef idx="minor">
+            <a:schemeClr val="lt1"/>
+          </a:fontRef>
+        </p:style>
+        <p:txBody>
+          <a:bodyPr rtlCol="0" anchor="t"/>
+          <a:lstStyle/>
+          <a:p>
+            <a:r>
+              <a:rPr lang="en-GB" b="1" dirty="0">
+                <a:latin typeface="Consolas" panose="020B0609020204030204" pitchFamily="49" charset="0"/>
+              </a:rPr>
+              <a:t>Project: </a:t>
+            </a:r>
+            <a:r>
+              <a:rPr lang="en-GB" dirty="0">
+                <a:latin typeface="Consolas" panose="020B0609020204030204" pitchFamily="49" charset="0"/>
+              </a:rPr>
+              <a:t>Accounting System</a:t>
+            </a:r>
+          </a:p>
+        </p:txBody>
+      </p:sp>
+      <p:sp>
+        <p:nvSpPr>
+          <p:cNvPr id="21" name="Rectangle 20">
+            <a:extLst>
+              <a:ext uri="{FF2B5EF4-FFF2-40B4-BE49-F238E27FC236}">
+                <a16:creationId xmlns:a16="http://schemas.microsoft.com/office/drawing/2014/main" id="{516D30A2-39F4-4AD0-AC87-0DAB450E7712}"/>
+              </a:ext>
+            </a:extLst>
+          </p:cNvPr>
+          <p:cNvSpPr/>
+          <p:nvPr/>
+        </p:nvSpPr>
+        <p:spPr>
+          <a:xfrm>
+            <a:off x="6848624" y="1725773"/>
+            <a:ext cx="1669918" cy="1037607"/>
+          </a:xfrm>
+          <a:prstGeom prst="rect">
+            <a:avLst/>
+          </a:prstGeom>
+          <a:noFill/>
+          <a:ln w="76200">
+            <a:noFill/>
+            <a:miter lim="800000"/>
+          </a:ln>
+        </p:spPr>
+        <p:style>
+          <a:lnRef idx="2">
+            <a:schemeClr val="accent1">
+              <a:shade val="50000"/>
+            </a:schemeClr>
+          </a:lnRef>
+          <a:fillRef idx="1">
+            <a:schemeClr val="accent1"/>
+          </a:fillRef>
+          <a:effectRef idx="0">
+            <a:schemeClr val="accent1"/>
+          </a:effectRef>
+          <a:fontRef idx="minor">
+            <a:schemeClr val="lt1"/>
+          </a:fontRef>
+        </p:style>
+        <p:txBody>
+          <a:bodyPr rtlCol="0" anchor="t"/>
+          <a:lstStyle/>
+          <a:p>
+            <a:r>
+              <a:rPr lang="en-GB" sz="1100" dirty="0">
+                <a:latin typeface="Consolas" panose="020B0609020204030204" pitchFamily="49" charset="0"/>
+              </a:rPr>
+              <a:t>Database</a:t>
+            </a:r>
+            <a:endParaRPr lang="en-GB" sz="1100" dirty="0">
+              <a:solidFill>
+                <a:schemeClr val="accent6"/>
+              </a:solidFill>
+              <a:latin typeface="Consolas" panose="020B0609020204030204" pitchFamily="49" charset="0"/>
+            </a:endParaRPr>
+          </a:p>
+        </p:txBody>
+      </p:sp>
+      <p:sp>
+        <p:nvSpPr>
+          <p:cNvPr id="17" name="Rectangle 16">
+            <a:extLst>
+              <a:ext uri="{FF2B5EF4-FFF2-40B4-BE49-F238E27FC236}">
+                <a16:creationId xmlns:a16="http://schemas.microsoft.com/office/drawing/2014/main" id="{D99FB313-AE7E-46EB-96DD-32A98C640097}"/>
+              </a:ext>
+            </a:extLst>
+          </p:cNvPr>
+          <p:cNvSpPr/>
+          <p:nvPr/>
+        </p:nvSpPr>
+        <p:spPr>
+          <a:xfrm>
+            <a:off x="5060039" y="1725774"/>
+            <a:ext cx="1669918" cy="1037607"/>
+          </a:xfrm>
+          <a:prstGeom prst="rect">
+            <a:avLst/>
+          </a:prstGeom>
+          <a:noFill/>
+          <a:ln w="76200">
+            <a:noFill/>
+            <a:miter lim="800000"/>
+          </a:ln>
+        </p:spPr>
+        <p:style>
+          <a:lnRef idx="2">
+            <a:schemeClr val="accent1">
+              <a:shade val="50000"/>
+            </a:schemeClr>
+          </a:lnRef>
+          <a:fillRef idx="1">
+            <a:schemeClr val="accent1"/>
+          </a:fillRef>
+          <a:effectRef idx="0">
+            <a:schemeClr val="accent1"/>
+          </a:effectRef>
+          <a:fontRef idx="minor">
+            <a:schemeClr val="lt1"/>
+          </a:fontRef>
+        </p:style>
+        <p:txBody>
+          <a:bodyPr rtlCol="0" anchor="t"/>
+          <a:lstStyle/>
+          <a:p>
+            <a:r>
+              <a:rPr lang="en-GB" sz="1100" dirty="0">
+                <a:latin typeface="Consolas" panose="020B0609020204030204" pitchFamily="49" charset="0"/>
+              </a:rPr>
+              <a:t>Service</a:t>
+            </a:r>
+            <a:endParaRPr lang="en-GB" sz="1100" dirty="0">
+              <a:solidFill>
+                <a:schemeClr val="accent6"/>
+              </a:solidFill>
+              <a:latin typeface="Consolas" panose="020B0609020204030204" pitchFamily="49" charset="0"/>
+            </a:endParaRPr>
+          </a:p>
+        </p:txBody>
+      </p:sp>
+      <p:sp>
+        <p:nvSpPr>
+          <p:cNvPr id="20" name="Rectangle 19">
+            <a:extLst>
+              <a:ext uri="{FF2B5EF4-FFF2-40B4-BE49-F238E27FC236}">
+                <a16:creationId xmlns:a16="http://schemas.microsoft.com/office/drawing/2014/main" id="{DBC9E0D9-E69C-4055-A9F2-BF29E344A23A}"/>
+              </a:ext>
+            </a:extLst>
+          </p:cNvPr>
+          <p:cNvSpPr/>
+          <p:nvPr/>
+        </p:nvSpPr>
+        <p:spPr>
+          <a:xfrm>
+            <a:off x="3273557" y="1725775"/>
+            <a:ext cx="1669918" cy="1037607"/>
+          </a:xfrm>
+          <a:prstGeom prst="rect">
+            <a:avLst/>
+          </a:prstGeom>
+          <a:noFill/>
+          <a:ln w="76200">
+            <a:noFill/>
+            <a:miter lim="800000"/>
+          </a:ln>
+        </p:spPr>
+        <p:style>
+          <a:lnRef idx="2">
+            <a:schemeClr val="accent1">
+              <a:shade val="50000"/>
+            </a:schemeClr>
+          </a:lnRef>
+          <a:fillRef idx="1">
+            <a:schemeClr val="accent1"/>
+          </a:fillRef>
+          <a:effectRef idx="0">
+            <a:schemeClr val="accent1"/>
+          </a:effectRef>
+          <a:fontRef idx="minor">
+            <a:schemeClr val="lt1"/>
+          </a:fontRef>
+        </p:style>
+        <p:txBody>
+          <a:bodyPr rtlCol="0" anchor="t"/>
+          <a:lstStyle/>
+          <a:p>
+            <a:r>
+              <a:rPr lang="en-GB" sz="1100" dirty="0">
+                <a:latin typeface="Consolas" panose="020B0609020204030204" pitchFamily="49" charset="0"/>
+              </a:rPr>
+              <a:t>Web portal</a:t>
+            </a:r>
+            <a:endParaRPr lang="en-GB" sz="1100" dirty="0">
+              <a:solidFill>
+                <a:schemeClr val="accent6"/>
+              </a:solidFill>
+              <a:latin typeface="Consolas" panose="020B0609020204030204" pitchFamily="49" charset="0"/>
+            </a:endParaRPr>
+          </a:p>
+        </p:txBody>
+      </p:sp>
+      <p:sp>
+        <p:nvSpPr>
+          <p:cNvPr id="6" name="Rectangle 5">
+            <a:extLst>
+              <a:ext uri="{FF2B5EF4-FFF2-40B4-BE49-F238E27FC236}">
+                <a16:creationId xmlns:a16="http://schemas.microsoft.com/office/drawing/2014/main" id="{7ECADFE4-6284-40CF-A1D9-75FE6FDFA479}"/>
+              </a:ext>
+            </a:extLst>
+          </p:cNvPr>
+          <p:cNvSpPr/>
+          <p:nvPr/>
+        </p:nvSpPr>
+        <p:spPr>
+          <a:xfrm>
+            <a:off x="-3734770" y="867307"/>
+            <a:ext cx="2571512" cy="892911"/>
+          </a:xfrm>
+          <a:prstGeom prst="rect">
+            <a:avLst/>
+          </a:prstGeom>
+          <a:solidFill>
+            <a:srgbClr val="00CC65"/>
+          </a:solidFill>
+          <a:ln w="76200">
+            <a:solidFill>
+              <a:schemeClr val="bg1"/>
+            </a:solidFill>
+            <a:miter lim="800000"/>
+          </a:ln>
+        </p:spPr>
+        <p:style>
+          <a:lnRef idx="2">
+            <a:schemeClr val="accent1">
+              <a:shade val="50000"/>
+            </a:schemeClr>
+          </a:lnRef>
+          <a:fillRef idx="1">
+            <a:schemeClr val="accent1"/>
+          </a:fillRef>
+          <a:effectRef idx="0">
+            <a:schemeClr val="accent1"/>
+          </a:effectRef>
+          <a:fontRef idx="minor">
+            <a:schemeClr val="lt1"/>
+          </a:fontRef>
+        </p:style>
+        <p:txBody>
+          <a:bodyPr rtlCol="0" anchor="t"/>
+          <a:lstStyle/>
+          <a:p>
+            <a:r>
+              <a:rPr lang="en-GB" sz="1100" b="1" dirty="0">
+                <a:latin typeface="Consolas" panose="020B0609020204030204" pitchFamily="49" charset="0"/>
+              </a:rPr>
+              <a:t>Target: Web02</a:t>
+            </a:r>
+          </a:p>
+          <a:p>
+            <a:r>
+              <a:rPr lang="en-GB" sz="1100" b="1" dirty="0">
+                <a:latin typeface="Consolas" panose="020B0609020204030204" pitchFamily="49" charset="0"/>
+              </a:rPr>
+              <a:t>Roles:</a:t>
+            </a:r>
+            <a:r>
+              <a:rPr lang="en-GB" sz="300" b="1" dirty="0">
+                <a:latin typeface="Consolas" panose="020B0609020204030204" pitchFamily="49" charset="0"/>
+              </a:rPr>
+              <a:t> </a:t>
+            </a:r>
+            <a:endParaRPr lang="en-GB" sz="1100" b="1" dirty="0">
+              <a:latin typeface="Consolas" panose="020B0609020204030204" pitchFamily="49" charset="0"/>
+            </a:endParaRPr>
+          </a:p>
+          <a:p>
+            <a:r>
+              <a:rPr lang="en-GB" sz="1100" b="1" dirty="0" err="1">
+                <a:solidFill>
+                  <a:srgbClr val="FFFF00"/>
+                </a:solidFill>
+                <a:latin typeface="Consolas" panose="020B0609020204030204" pitchFamily="49" charset="0"/>
+              </a:rPr>
+              <a:t>WebServer</a:t>
+            </a:r>
+            <a:endParaRPr lang="en-GB" sz="1100" b="1" dirty="0">
+              <a:solidFill>
+                <a:srgbClr val="FFFF00"/>
+              </a:solidFill>
+              <a:latin typeface="Consolas" panose="020B0609020204030204" pitchFamily="49" charset="0"/>
+            </a:endParaRPr>
+          </a:p>
+          <a:p>
+            <a:endParaRPr lang="en-GB" sz="1100" dirty="0">
+              <a:latin typeface="Consolas" panose="020B0609020204030204" pitchFamily="49" charset="0"/>
+            </a:endParaRPr>
+          </a:p>
+        </p:txBody>
+      </p:sp>
+      <p:sp>
+        <p:nvSpPr>
+          <p:cNvPr id="7" name="Rectangle 6">
+            <a:extLst>
+              <a:ext uri="{FF2B5EF4-FFF2-40B4-BE49-F238E27FC236}">
+                <a16:creationId xmlns:a16="http://schemas.microsoft.com/office/drawing/2014/main" id="{97423E62-1D0A-45F2-A76F-1D2484112914}"/>
+              </a:ext>
+            </a:extLst>
+          </p:cNvPr>
+          <p:cNvSpPr/>
+          <p:nvPr/>
+        </p:nvSpPr>
+        <p:spPr>
+          <a:xfrm>
+            <a:off x="-3517602" y="3658485"/>
+            <a:ext cx="2571514" cy="917722"/>
+          </a:xfrm>
+          <a:prstGeom prst="rect">
+            <a:avLst/>
+          </a:prstGeom>
+          <a:solidFill>
+            <a:srgbClr val="2F93E0"/>
+          </a:solidFill>
+          <a:ln w="76200">
+            <a:solidFill>
+              <a:schemeClr val="bg1"/>
+            </a:solidFill>
+            <a:miter lim="800000"/>
+          </a:ln>
+        </p:spPr>
+        <p:style>
+          <a:lnRef idx="2">
+            <a:schemeClr val="accent1">
+              <a:shade val="50000"/>
+            </a:schemeClr>
+          </a:lnRef>
+          <a:fillRef idx="1">
+            <a:schemeClr val="accent1"/>
+          </a:fillRef>
+          <a:effectRef idx="0">
+            <a:schemeClr val="accent1"/>
+          </a:effectRef>
+          <a:fontRef idx="minor">
+            <a:schemeClr val="lt1"/>
+          </a:fontRef>
+        </p:style>
+        <p:txBody>
+          <a:bodyPr rtlCol="0" anchor="t"/>
+          <a:lstStyle/>
+          <a:p>
+            <a:r>
+              <a:rPr lang="en-GB" sz="1100" dirty="0">
+                <a:latin typeface="Consolas" panose="020B0609020204030204" pitchFamily="49" charset="0"/>
+              </a:rPr>
+              <a:t>Target: DB02</a:t>
+            </a:r>
+          </a:p>
+          <a:p>
+            <a:r>
+              <a:rPr lang="en-GB" sz="300" dirty="0">
+                <a:latin typeface="Consolas" panose="020B0609020204030204" pitchFamily="49" charset="0"/>
+              </a:rPr>
+              <a:t> </a:t>
+            </a:r>
+            <a:r>
+              <a:rPr lang="en-GB" sz="1100" dirty="0">
+                <a:latin typeface="Consolas" panose="020B0609020204030204" pitchFamily="49" charset="0"/>
+              </a:rPr>
+              <a:t>Roles:</a:t>
+            </a:r>
+            <a:r>
+              <a:rPr lang="en-GB" sz="300" dirty="0">
+                <a:latin typeface="Consolas" panose="020B0609020204030204" pitchFamily="49" charset="0"/>
+              </a:rPr>
+              <a:t> </a:t>
+            </a:r>
+            <a:endParaRPr lang="en-GB" sz="1100" dirty="0">
+              <a:latin typeface="Consolas" panose="020B0609020204030204" pitchFamily="49" charset="0"/>
+            </a:endParaRPr>
+          </a:p>
+          <a:p>
+            <a:r>
+              <a:rPr lang="en-GB" sz="1100" dirty="0">
+                <a:solidFill>
+                  <a:schemeClr val="accent6"/>
+                </a:solidFill>
+                <a:latin typeface="Consolas" panose="020B0609020204030204" pitchFamily="49" charset="0"/>
+              </a:rPr>
+              <a:t>Database</a:t>
+            </a:r>
+          </a:p>
+          <a:p>
+            <a:endParaRPr lang="en-GB" sz="1100" dirty="0">
+              <a:latin typeface="Consolas" panose="020B0609020204030204" pitchFamily="49" charset="0"/>
+            </a:endParaRPr>
+          </a:p>
+        </p:txBody>
+      </p:sp>
+      <p:sp>
+        <p:nvSpPr>
+          <p:cNvPr id="9" name="Rectangle 8">
+            <a:extLst>
+              <a:ext uri="{FF2B5EF4-FFF2-40B4-BE49-F238E27FC236}">
+                <a16:creationId xmlns:a16="http://schemas.microsoft.com/office/drawing/2014/main" id="{708F42E3-02CA-44D3-9683-0CADB846FD68}"/>
+              </a:ext>
+            </a:extLst>
+          </p:cNvPr>
+          <p:cNvSpPr/>
+          <p:nvPr/>
+        </p:nvSpPr>
+        <p:spPr>
+          <a:xfrm>
+            <a:off x="-3833226" y="2416071"/>
+            <a:ext cx="2571512" cy="892911"/>
+          </a:xfrm>
+          <a:prstGeom prst="rect">
+            <a:avLst/>
+          </a:prstGeom>
+          <a:solidFill>
+            <a:srgbClr val="00CC65"/>
+          </a:solidFill>
+          <a:ln w="76200">
+            <a:solidFill>
+              <a:schemeClr val="bg1"/>
+            </a:solidFill>
+            <a:miter lim="800000"/>
+          </a:ln>
+        </p:spPr>
+        <p:style>
+          <a:lnRef idx="2">
+            <a:schemeClr val="accent1">
+              <a:shade val="50000"/>
+            </a:schemeClr>
+          </a:lnRef>
+          <a:fillRef idx="1">
+            <a:schemeClr val="accent1"/>
+          </a:fillRef>
+          <a:effectRef idx="0">
+            <a:schemeClr val="accent1"/>
+          </a:effectRef>
+          <a:fontRef idx="minor">
+            <a:schemeClr val="lt1"/>
+          </a:fontRef>
+        </p:style>
+        <p:txBody>
+          <a:bodyPr rtlCol="0" anchor="t"/>
+          <a:lstStyle/>
+          <a:p>
+            <a:r>
+              <a:rPr lang="en-GB" sz="1100" b="1" dirty="0">
+                <a:latin typeface="Consolas" panose="020B0609020204030204" pitchFamily="49" charset="0"/>
+              </a:rPr>
+              <a:t>Target: Web03</a:t>
+            </a:r>
+          </a:p>
+          <a:p>
+            <a:r>
+              <a:rPr lang="en-GB" sz="1100" b="1" dirty="0">
+                <a:latin typeface="Consolas" panose="020B0609020204030204" pitchFamily="49" charset="0"/>
+              </a:rPr>
+              <a:t>Roles:</a:t>
+            </a:r>
+            <a:r>
+              <a:rPr lang="en-GB" sz="300" b="1" dirty="0">
+                <a:latin typeface="Consolas" panose="020B0609020204030204" pitchFamily="49" charset="0"/>
+              </a:rPr>
+              <a:t> </a:t>
+            </a:r>
+            <a:endParaRPr lang="en-GB" sz="1100" b="1" dirty="0">
+              <a:latin typeface="Consolas" panose="020B0609020204030204" pitchFamily="49" charset="0"/>
+            </a:endParaRPr>
+          </a:p>
+          <a:p>
+            <a:r>
+              <a:rPr lang="en-GB" sz="1100" b="1" dirty="0" err="1">
+                <a:solidFill>
+                  <a:srgbClr val="FFFF00"/>
+                </a:solidFill>
+                <a:latin typeface="Consolas" panose="020B0609020204030204" pitchFamily="49" charset="0"/>
+              </a:rPr>
+              <a:t>WebServer</a:t>
+            </a:r>
+            <a:endParaRPr lang="en-GB" sz="1100" b="1" dirty="0">
+              <a:solidFill>
+                <a:srgbClr val="FFFF00"/>
+              </a:solidFill>
+              <a:latin typeface="Consolas" panose="020B0609020204030204" pitchFamily="49" charset="0"/>
+            </a:endParaRPr>
+          </a:p>
+          <a:p>
+            <a:endParaRPr lang="en-GB" sz="1100" dirty="0">
+              <a:latin typeface="Consolas" panose="020B0609020204030204" pitchFamily="49" charset="0"/>
+            </a:endParaRPr>
+          </a:p>
+        </p:txBody>
+      </p:sp>
+      <p:pic>
+        <p:nvPicPr>
+          <p:cNvPr id="10" name="Graphic 9" descr="Internet with solid fill">
+            <a:extLst>
+              <a:ext uri="{FF2B5EF4-FFF2-40B4-BE49-F238E27FC236}">
+                <a16:creationId xmlns:a16="http://schemas.microsoft.com/office/drawing/2014/main" id="{2E00E9F0-C9B7-4319-9440-8D811CDB8778}"/>
+              </a:ext>
+            </a:extLst>
+          </p:cNvPr>
+          <p:cNvPicPr>
+            <a:picLocks noChangeAspect="1"/>
+          </p:cNvPicPr>
+          <p:nvPr/>
+        </p:nvPicPr>
+        <p:blipFill>
+          <a:blip r:embed="rId3">
+            <a:extLst>
+              <a:ext uri="{96DAC541-7B7A-43D3-8B79-37D633B846F1}">
+                <asvg:svgBlip xmlns:asvg="http://schemas.microsoft.com/office/drawing/2016/SVG/main" r:embed="rId4"/>
+              </a:ext>
+            </a:extLst>
+          </a:blip>
+          <a:stretch>
+            <a:fillRect/>
+          </a:stretch>
+        </p:blipFill>
+        <p:spPr>
+          <a:xfrm>
+            <a:off x="3651316" y="1848982"/>
+            <a:ext cx="914400" cy="914400"/>
+          </a:xfrm>
+          <a:prstGeom prst="rect">
+            <a:avLst/>
+          </a:prstGeom>
+        </p:spPr>
+      </p:pic>
+      <p:pic>
+        <p:nvPicPr>
+          <p:cNvPr id="12" name="Graphic 11" descr="Cmd Terminal with solid fill">
+            <a:extLst>
+              <a:ext uri="{FF2B5EF4-FFF2-40B4-BE49-F238E27FC236}">
+                <a16:creationId xmlns:a16="http://schemas.microsoft.com/office/drawing/2014/main" id="{BC42805B-F436-4492-8C67-B5C11BD975D1}"/>
+              </a:ext>
+            </a:extLst>
+          </p:cNvPr>
+          <p:cNvPicPr>
+            <a:picLocks noChangeAspect="1"/>
+          </p:cNvPicPr>
+          <p:nvPr/>
+        </p:nvPicPr>
+        <p:blipFill>
+          <a:blip r:embed="rId5">
+            <a:extLst>
+              <a:ext uri="{96DAC541-7B7A-43D3-8B79-37D633B846F1}">
+                <asvg:svgBlip xmlns:asvg="http://schemas.microsoft.com/office/drawing/2016/SVG/main" r:embed="rId6"/>
+              </a:ext>
+            </a:extLst>
+          </a:blip>
+          <a:stretch>
+            <a:fillRect/>
+          </a:stretch>
+        </p:blipFill>
+        <p:spPr>
+          <a:xfrm>
+            <a:off x="5494935" y="1848982"/>
+            <a:ext cx="914400" cy="928867"/>
+          </a:xfrm>
+          <a:prstGeom prst="rect">
+            <a:avLst/>
+          </a:prstGeom>
+        </p:spPr>
+      </p:pic>
+      <p:pic>
+        <p:nvPicPr>
+          <p:cNvPr id="14" name="Graphic 13" descr="Database with solid fill">
+            <a:extLst>
+              <a:ext uri="{FF2B5EF4-FFF2-40B4-BE49-F238E27FC236}">
+                <a16:creationId xmlns:a16="http://schemas.microsoft.com/office/drawing/2014/main" id="{F8FDECFF-7DAC-47B9-8E63-266058585BA4}"/>
+              </a:ext>
+            </a:extLst>
+          </p:cNvPr>
+          <p:cNvPicPr>
+            <a:picLocks noChangeAspect="1"/>
+          </p:cNvPicPr>
+          <p:nvPr/>
+        </p:nvPicPr>
+        <p:blipFill>
+          <a:blip r:embed="rId7">
+            <a:extLst>
+              <a:ext uri="{96DAC541-7B7A-43D3-8B79-37D633B846F1}">
+                <asvg:svgBlip xmlns:asvg="http://schemas.microsoft.com/office/drawing/2016/SVG/main" r:embed="rId8"/>
+              </a:ext>
+            </a:extLst>
+          </a:blip>
+          <a:stretch>
+            <a:fillRect/>
+          </a:stretch>
+        </p:blipFill>
+        <p:spPr>
+          <a:xfrm>
+            <a:off x="7226383" y="1854695"/>
+            <a:ext cx="914400" cy="914400"/>
+          </a:xfrm>
+          <a:prstGeom prst="rect">
+            <a:avLst/>
+          </a:prstGeom>
+        </p:spPr>
+      </p:pic>
+    </p:spTree>
+    <p:extLst>
+      <p:ext uri="{BB962C8B-B14F-4D97-AF65-F5344CB8AC3E}">
+        <p14:creationId xmlns:p14="http://schemas.microsoft.com/office/powerpoint/2010/main" val="3332357240"/>
+      </p:ext>
+    </p:extLst>
+  </p:cSld>
+  <p:clrMapOvr>
+    <a:masterClrMapping/>
+  </p:clrMapOvr>
+  <mc:AlternateContent xmlns:mc="http://schemas.openxmlformats.org/markup-compatibility/2006">
+    <mc:Choice xmlns:p14="http://schemas.microsoft.com/office/powerpoint/2010/main" Requires="p14">
+      <p:transition spd="med" p14:dur="700">
+        <p:fade/>
+      </p:transition>
+    </mc:Choice>
+    <mc:Fallback>
+      <p:transition spd="med">
+        <p:fade/>
+      </p:transition>
+    </mc:Fallback>
+  </mc:AlternateContent>
+</p:sld>
+</file>
+
+<file path=ppt/slides/slide5.xml><?xml version="1.0" encoding="utf-8"?>
+<p:sld xmlns:a="http://schemas.openxmlformats.org/drawingml/2006/main" xmlns:r="http://schemas.openxmlformats.org/officeDocument/2006/relationships" xmlns:p="http://schemas.openxmlformats.org/presentationml/2006/main">
+  <p:cSld>
+    <p:spTree>
+      <p:nvGrpSpPr>
+        <p:cNvPr id="1" name="Shape 56"/>
+        <p:cNvGrpSpPr/>
+        <p:nvPr/>
+      </p:nvGrpSpPr>
+      <p:grpSpPr>
+        <a:xfrm>
+          <a:off x="0" y="0"/>
+          <a:ext cx="0" cy="0"/>
+          <a:chOff x="0" y="0"/>
+          <a:chExt cx="0" cy="0"/>
+        </a:xfrm>
+      </p:grpSpPr>
+      <p:sp>
+        <p:nvSpPr>
+          <p:cNvPr id="4" name="Rectangle 3">
+            <a:extLst>
+              <a:ext uri="{FF2B5EF4-FFF2-40B4-BE49-F238E27FC236}">
+                <a16:creationId xmlns:a16="http://schemas.microsoft.com/office/drawing/2014/main" id="{76081B0F-E9B5-4D6B-A920-D7CA77CB05F3}"/>
+              </a:ext>
+            </a:extLst>
+          </p:cNvPr>
+          <p:cNvSpPr/>
+          <p:nvPr/>
+        </p:nvSpPr>
+        <p:spPr>
+          <a:xfrm>
+            <a:off x="2748915" y="1308736"/>
+            <a:ext cx="6297930" cy="1634489"/>
+          </a:xfrm>
+          <a:prstGeom prst="rect">
+            <a:avLst/>
+          </a:prstGeom>
+          <a:solidFill>
+            <a:srgbClr val="00B0F0"/>
+          </a:solidFill>
+          <a:ln w="76200">
+            <a:solidFill>
+              <a:schemeClr val="bg1"/>
+            </a:solidFill>
+            <a:miter lim="800000"/>
+          </a:ln>
+        </p:spPr>
+        <p:style>
+          <a:lnRef idx="2">
+            <a:schemeClr val="accent1">
+              <a:shade val="50000"/>
+            </a:schemeClr>
+          </a:lnRef>
+          <a:fillRef idx="1">
+            <a:schemeClr val="accent1"/>
+          </a:fillRef>
+          <a:effectRef idx="0">
+            <a:schemeClr val="accent1"/>
+          </a:effectRef>
+          <a:fontRef idx="minor">
+            <a:schemeClr val="lt1"/>
+          </a:fontRef>
+        </p:style>
+        <p:txBody>
+          <a:bodyPr rtlCol="0" anchor="t"/>
+          <a:lstStyle/>
+          <a:p>
+            <a:r>
+              <a:rPr lang="en-GB" b="1" dirty="0">
+                <a:latin typeface="Consolas" panose="020B0609020204030204" pitchFamily="49" charset="0"/>
+              </a:rPr>
+              <a:t>Project Group: </a:t>
+            </a:r>
+            <a:r>
+              <a:rPr lang="en-GB" dirty="0">
+                <a:latin typeface="Consolas" panose="020B0609020204030204" pitchFamily="49" charset="0"/>
+              </a:rPr>
+              <a:t>Accounting System</a:t>
+            </a:r>
+          </a:p>
+        </p:txBody>
+      </p:sp>
+      <p:sp>
+        <p:nvSpPr>
+          <p:cNvPr id="21" name="Rectangle 20">
+            <a:extLst>
+              <a:ext uri="{FF2B5EF4-FFF2-40B4-BE49-F238E27FC236}">
+                <a16:creationId xmlns:a16="http://schemas.microsoft.com/office/drawing/2014/main" id="{516D30A2-39F4-4AD0-AC87-0DAB450E7712}"/>
+              </a:ext>
+            </a:extLst>
+          </p:cNvPr>
+          <p:cNvSpPr/>
+          <p:nvPr/>
+        </p:nvSpPr>
+        <p:spPr>
+          <a:xfrm>
+            <a:off x="6848624" y="1725773"/>
+            <a:ext cx="1669918" cy="1037607"/>
+          </a:xfrm>
+          <a:prstGeom prst="rect">
+            <a:avLst/>
+          </a:prstGeom>
+          <a:solidFill>
+            <a:srgbClr val="2F93E0"/>
+          </a:solidFill>
+          <a:ln w="76200">
+            <a:solidFill>
+              <a:schemeClr val="bg1"/>
+            </a:solidFill>
+            <a:miter lim="800000"/>
+          </a:ln>
+        </p:spPr>
+        <p:style>
+          <a:lnRef idx="2">
+            <a:schemeClr val="accent1">
+              <a:shade val="50000"/>
+            </a:schemeClr>
+          </a:lnRef>
+          <a:fillRef idx="1">
+            <a:schemeClr val="accent1"/>
+          </a:fillRef>
+          <a:effectRef idx="0">
+            <a:schemeClr val="accent1"/>
+          </a:effectRef>
+          <a:fontRef idx="minor">
+            <a:schemeClr val="lt1"/>
+          </a:fontRef>
+        </p:style>
+        <p:txBody>
+          <a:bodyPr rtlCol="0" anchor="t"/>
+          <a:lstStyle/>
+          <a:p>
+            <a:r>
+              <a:rPr lang="en-GB" sz="1100" b="1" dirty="0">
+                <a:latin typeface="Consolas" panose="020B0609020204030204" pitchFamily="49" charset="0"/>
+              </a:rPr>
+              <a:t>Project:</a:t>
+            </a:r>
+            <a:r>
+              <a:rPr lang="en-GB" sz="1100" dirty="0">
+                <a:latin typeface="Consolas" panose="020B0609020204030204" pitchFamily="49" charset="0"/>
+              </a:rPr>
+              <a:t> Database</a:t>
+            </a:r>
+            <a:endParaRPr lang="en-GB" sz="1100" dirty="0">
+              <a:solidFill>
+                <a:schemeClr val="accent6"/>
+              </a:solidFill>
+              <a:latin typeface="Consolas" panose="020B0609020204030204" pitchFamily="49" charset="0"/>
+            </a:endParaRPr>
+          </a:p>
+        </p:txBody>
+      </p:sp>
+      <p:sp>
+        <p:nvSpPr>
+          <p:cNvPr id="17" name="Rectangle 16">
+            <a:extLst>
+              <a:ext uri="{FF2B5EF4-FFF2-40B4-BE49-F238E27FC236}">
+                <a16:creationId xmlns:a16="http://schemas.microsoft.com/office/drawing/2014/main" id="{D99FB313-AE7E-46EB-96DD-32A98C640097}"/>
+              </a:ext>
+            </a:extLst>
+          </p:cNvPr>
+          <p:cNvSpPr/>
+          <p:nvPr/>
+        </p:nvSpPr>
+        <p:spPr>
+          <a:xfrm>
+            <a:off x="5060039" y="1725774"/>
+            <a:ext cx="1669918" cy="1037607"/>
+          </a:xfrm>
+          <a:prstGeom prst="rect">
+            <a:avLst/>
+          </a:prstGeom>
+          <a:solidFill>
+            <a:srgbClr val="2F93E0"/>
+          </a:solidFill>
+          <a:ln w="76200">
+            <a:solidFill>
+              <a:schemeClr val="bg1"/>
+            </a:solidFill>
+            <a:miter lim="800000"/>
+          </a:ln>
+        </p:spPr>
+        <p:style>
+          <a:lnRef idx="2">
+            <a:schemeClr val="accent1">
+              <a:shade val="50000"/>
+            </a:schemeClr>
+          </a:lnRef>
+          <a:fillRef idx="1">
+            <a:schemeClr val="accent1"/>
+          </a:fillRef>
+          <a:effectRef idx="0">
+            <a:schemeClr val="accent1"/>
+          </a:effectRef>
+          <a:fontRef idx="minor">
+            <a:schemeClr val="lt1"/>
+          </a:fontRef>
+        </p:style>
+        <p:txBody>
+          <a:bodyPr rtlCol="0" anchor="t"/>
+          <a:lstStyle/>
+          <a:p>
+            <a:r>
+              <a:rPr lang="en-GB" sz="1100" b="1" dirty="0">
+                <a:latin typeface="Consolas" panose="020B0609020204030204" pitchFamily="49" charset="0"/>
+              </a:rPr>
+              <a:t>Project:</a:t>
+            </a:r>
+            <a:r>
+              <a:rPr lang="en-GB" sz="1100" dirty="0">
+                <a:latin typeface="Consolas" panose="020B0609020204030204" pitchFamily="49" charset="0"/>
+              </a:rPr>
+              <a:t> Service</a:t>
+            </a:r>
+            <a:endParaRPr lang="en-GB" sz="1100" dirty="0">
+              <a:solidFill>
+                <a:schemeClr val="accent6"/>
+              </a:solidFill>
+              <a:latin typeface="Consolas" panose="020B0609020204030204" pitchFamily="49" charset="0"/>
+            </a:endParaRPr>
+          </a:p>
+        </p:txBody>
+      </p:sp>
+      <p:sp>
+        <p:nvSpPr>
+          <p:cNvPr id="20" name="Rectangle 19">
+            <a:extLst>
+              <a:ext uri="{FF2B5EF4-FFF2-40B4-BE49-F238E27FC236}">
+                <a16:creationId xmlns:a16="http://schemas.microsoft.com/office/drawing/2014/main" id="{DBC9E0D9-E69C-4055-A9F2-BF29E344A23A}"/>
+              </a:ext>
+            </a:extLst>
+          </p:cNvPr>
+          <p:cNvSpPr/>
+          <p:nvPr/>
+        </p:nvSpPr>
+        <p:spPr>
+          <a:xfrm>
+            <a:off x="3273557" y="1725775"/>
+            <a:ext cx="1669918" cy="1037607"/>
+          </a:xfrm>
+          <a:prstGeom prst="rect">
+            <a:avLst/>
+          </a:prstGeom>
+          <a:solidFill>
+            <a:srgbClr val="2F93E0"/>
+          </a:solidFill>
+          <a:ln w="76200">
+            <a:solidFill>
+              <a:schemeClr val="bg1"/>
+            </a:solidFill>
+            <a:miter lim="800000"/>
+          </a:ln>
+        </p:spPr>
+        <p:style>
+          <a:lnRef idx="2">
+            <a:schemeClr val="accent1">
+              <a:shade val="50000"/>
+            </a:schemeClr>
+          </a:lnRef>
+          <a:fillRef idx="1">
+            <a:schemeClr val="accent1"/>
+          </a:fillRef>
+          <a:effectRef idx="0">
+            <a:schemeClr val="accent1"/>
+          </a:effectRef>
+          <a:fontRef idx="minor">
+            <a:schemeClr val="lt1"/>
+          </a:fontRef>
+        </p:style>
+        <p:txBody>
+          <a:bodyPr rtlCol="0" anchor="t"/>
+          <a:lstStyle/>
+          <a:p>
+            <a:r>
+              <a:rPr lang="en-GB" sz="1100" b="1" dirty="0">
+                <a:latin typeface="Consolas" panose="020B0609020204030204" pitchFamily="49" charset="0"/>
+              </a:rPr>
+              <a:t>Project:</a:t>
+            </a:r>
+            <a:r>
+              <a:rPr lang="en-GB" sz="1100" dirty="0">
+                <a:latin typeface="Consolas" panose="020B0609020204030204" pitchFamily="49" charset="0"/>
+              </a:rPr>
+              <a:t> Web portal</a:t>
+            </a:r>
+            <a:endParaRPr lang="en-GB" sz="1100" dirty="0">
+              <a:solidFill>
+                <a:schemeClr val="accent6"/>
+              </a:solidFill>
+              <a:latin typeface="Consolas" panose="020B0609020204030204" pitchFamily="49" charset="0"/>
+            </a:endParaRPr>
+          </a:p>
+        </p:txBody>
+      </p:sp>
+      <p:sp>
+        <p:nvSpPr>
+          <p:cNvPr id="6" name="Rectangle 5">
+            <a:extLst>
+              <a:ext uri="{FF2B5EF4-FFF2-40B4-BE49-F238E27FC236}">
+                <a16:creationId xmlns:a16="http://schemas.microsoft.com/office/drawing/2014/main" id="{7ECADFE4-6284-40CF-A1D9-75FE6FDFA479}"/>
+              </a:ext>
+            </a:extLst>
+          </p:cNvPr>
+          <p:cNvSpPr/>
+          <p:nvPr/>
+        </p:nvSpPr>
+        <p:spPr>
+          <a:xfrm>
+            <a:off x="-3734770" y="867307"/>
+            <a:ext cx="2571512" cy="892911"/>
+          </a:xfrm>
+          <a:prstGeom prst="rect">
+            <a:avLst/>
+          </a:prstGeom>
+          <a:solidFill>
+            <a:srgbClr val="00CC65"/>
+          </a:solidFill>
+          <a:ln w="76200">
+            <a:solidFill>
+              <a:schemeClr val="bg1"/>
+            </a:solidFill>
+            <a:miter lim="800000"/>
+          </a:ln>
+        </p:spPr>
+        <p:style>
+          <a:lnRef idx="2">
+            <a:schemeClr val="accent1">
+              <a:shade val="50000"/>
+            </a:schemeClr>
+          </a:lnRef>
+          <a:fillRef idx="1">
+            <a:schemeClr val="accent1"/>
+          </a:fillRef>
+          <a:effectRef idx="0">
+            <a:schemeClr val="accent1"/>
+          </a:effectRef>
+          <a:fontRef idx="minor">
+            <a:schemeClr val="lt1"/>
+          </a:fontRef>
+        </p:style>
+        <p:txBody>
+          <a:bodyPr rtlCol="0" anchor="t"/>
+          <a:lstStyle/>
+          <a:p>
+            <a:r>
+              <a:rPr lang="en-GB" sz="1100" b="1" dirty="0">
+                <a:latin typeface="Consolas" panose="020B0609020204030204" pitchFamily="49" charset="0"/>
+              </a:rPr>
+              <a:t>Target: Web02</a:t>
+            </a:r>
+          </a:p>
+          <a:p>
+            <a:r>
+              <a:rPr lang="en-GB" sz="1100" b="1" dirty="0">
+                <a:latin typeface="Consolas" panose="020B0609020204030204" pitchFamily="49" charset="0"/>
+              </a:rPr>
+              <a:t>Roles:</a:t>
+            </a:r>
+            <a:r>
+              <a:rPr lang="en-GB" sz="300" b="1" dirty="0">
+                <a:latin typeface="Consolas" panose="020B0609020204030204" pitchFamily="49" charset="0"/>
+              </a:rPr>
+              <a:t> </a:t>
+            </a:r>
+            <a:endParaRPr lang="en-GB" sz="1100" b="1" dirty="0">
+              <a:latin typeface="Consolas" panose="020B0609020204030204" pitchFamily="49" charset="0"/>
+            </a:endParaRPr>
+          </a:p>
+          <a:p>
+            <a:r>
+              <a:rPr lang="en-GB" sz="1100" b="1" dirty="0" err="1">
+                <a:solidFill>
+                  <a:srgbClr val="FFFF00"/>
+                </a:solidFill>
+                <a:latin typeface="Consolas" panose="020B0609020204030204" pitchFamily="49" charset="0"/>
+              </a:rPr>
+              <a:t>WebServer</a:t>
+            </a:r>
+            <a:endParaRPr lang="en-GB" sz="1100" b="1" dirty="0">
+              <a:solidFill>
+                <a:srgbClr val="FFFF00"/>
+              </a:solidFill>
+              <a:latin typeface="Consolas" panose="020B0609020204030204" pitchFamily="49" charset="0"/>
+            </a:endParaRPr>
+          </a:p>
+          <a:p>
+            <a:endParaRPr lang="en-GB" sz="1100" dirty="0">
+              <a:latin typeface="Consolas" panose="020B0609020204030204" pitchFamily="49" charset="0"/>
+            </a:endParaRPr>
+          </a:p>
+        </p:txBody>
+      </p:sp>
+      <p:sp>
+        <p:nvSpPr>
+          <p:cNvPr id="7" name="Rectangle 6">
+            <a:extLst>
+              <a:ext uri="{FF2B5EF4-FFF2-40B4-BE49-F238E27FC236}">
+                <a16:creationId xmlns:a16="http://schemas.microsoft.com/office/drawing/2014/main" id="{97423E62-1D0A-45F2-A76F-1D2484112914}"/>
+              </a:ext>
+            </a:extLst>
+          </p:cNvPr>
+          <p:cNvSpPr/>
+          <p:nvPr/>
+        </p:nvSpPr>
+        <p:spPr>
+          <a:xfrm>
+            <a:off x="-3517602" y="3658485"/>
+            <a:ext cx="2571514" cy="917722"/>
+          </a:xfrm>
+          <a:prstGeom prst="rect">
+            <a:avLst/>
+          </a:prstGeom>
+          <a:solidFill>
+            <a:srgbClr val="2F93E0"/>
+          </a:solidFill>
+          <a:ln w="76200">
+            <a:solidFill>
+              <a:schemeClr val="bg1"/>
+            </a:solidFill>
+            <a:miter lim="800000"/>
+          </a:ln>
+        </p:spPr>
+        <p:style>
+          <a:lnRef idx="2">
+            <a:schemeClr val="accent1">
+              <a:shade val="50000"/>
+            </a:schemeClr>
+          </a:lnRef>
+          <a:fillRef idx="1">
+            <a:schemeClr val="accent1"/>
+          </a:fillRef>
+          <a:effectRef idx="0">
+            <a:schemeClr val="accent1"/>
+          </a:effectRef>
+          <a:fontRef idx="minor">
+            <a:schemeClr val="lt1"/>
+          </a:fontRef>
+        </p:style>
+        <p:txBody>
+          <a:bodyPr rtlCol="0" anchor="t"/>
+          <a:lstStyle/>
+          <a:p>
+            <a:r>
+              <a:rPr lang="en-GB" sz="1100" dirty="0">
+                <a:latin typeface="Consolas" panose="020B0609020204030204" pitchFamily="49" charset="0"/>
+              </a:rPr>
+              <a:t>Target: DB02</a:t>
+            </a:r>
+          </a:p>
+          <a:p>
+            <a:r>
+              <a:rPr lang="en-GB" sz="300" dirty="0">
+                <a:latin typeface="Consolas" panose="020B0609020204030204" pitchFamily="49" charset="0"/>
+              </a:rPr>
+              <a:t> </a:t>
+            </a:r>
+            <a:r>
+              <a:rPr lang="en-GB" sz="1100" dirty="0">
+                <a:latin typeface="Consolas" panose="020B0609020204030204" pitchFamily="49" charset="0"/>
+              </a:rPr>
+              <a:t>Roles:</a:t>
+            </a:r>
+            <a:r>
+              <a:rPr lang="en-GB" sz="300" dirty="0">
+                <a:latin typeface="Consolas" panose="020B0609020204030204" pitchFamily="49" charset="0"/>
+              </a:rPr>
+              <a:t> </a:t>
+            </a:r>
+            <a:endParaRPr lang="en-GB" sz="1100" dirty="0">
+              <a:latin typeface="Consolas" panose="020B0609020204030204" pitchFamily="49" charset="0"/>
+            </a:endParaRPr>
+          </a:p>
+          <a:p>
+            <a:r>
+              <a:rPr lang="en-GB" sz="1100" dirty="0">
+                <a:solidFill>
+                  <a:schemeClr val="accent6"/>
+                </a:solidFill>
+                <a:latin typeface="Consolas" panose="020B0609020204030204" pitchFamily="49" charset="0"/>
+              </a:rPr>
+              <a:t>Database</a:t>
+            </a:r>
+          </a:p>
+          <a:p>
+            <a:endParaRPr lang="en-GB" sz="1100" dirty="0">
+              <a:latin typeface="Consolas" panose="020B0609020204030204" pitchFamily="49" charset="0"/>
+            </a:endParaRPr>
+          </a:p>
+        </p:txBody>
+      </p:sp>
+      <p:sp>
+        <p:nvSpPr>
+          <p:cNvPr id="9" name="Rectangle 8">
+            <a:extLst>
+              <a:ext uri="{FF2B5EF4-FFF2-40B4-BE49-F238E27FC236}">
+                <a16:creationId xmlns:a16="http://schemas.microsoft.com/office/drawing/2014/main" id="{708F42E3-02CA-44D3-9683-0CADB846FD68}"/>
+              </a:ext>
+            </a:extLst>
+          </p:cNvPr>
+          <p:cNvSpPr/>
+          <p:nvPr/>
+        </p:nvSpPr>
+        <p:spPr>
+          <a:xfrm>
+            <a:off x="-3833226" y="2416071"/>
+            <a:ext cx="2571512" cy="892911"/>
+          </a:xfrm>
+          <a:prstGeom prst="rect">
+            <a:avLst/>
+          </a:prstGeom>
+          <a:solidFill>
+            <a:srgbClr val="00CC65"/>
+          </a:solidFill>
+          <a:ln w="76200">
+            <a:solidFill>
+              <a:schemeClr val="bg1"/>
+            </a:solidFill>
+            <a:miter lim="800000"/>
+          </a:ln>
+        </p:spPr>
+        <p:style>
+          <a:lnRef idx="2">
+            <a:schemeClr val="accent1">
+              <a:shade val="50000"/>
+            </a:schemeClr>
+          </a:lnRef>
+          <a:fillRef idx="1">
+            <a:schemeClr val="accent1"/>
+          </a:fillRef>
+          <a:effectRef idx="0">
+            <a:schemeClr val="accent1"/>
+          </a:effectRef>
+          <a:fontRef idx="minor">
+            <a:schemeClr val="lt1"/>
+          </a:fontRef>
+        </p:style>
+        <p:txBody>
+          <a:bodyPr rtlCol="0" anchor="t"/>
+          <a:lstStyle/>
+          <a:p>
+            <a:r>
+              <a:rPr lang="en-GB" sz="1100" b="1" dirty="0">
+                <a:latin typeface="Consolas" panose="020B0609020204030204" pitchFamily="49" charset="0"/>
+              </a:rPr>
+              <a:t>Target: Web03</a:t>
+            </a:r>
+          </a:p>
+          <a:p>
+            <a:r>
+              <a:rPr lang="en-GB" sz="1100" b="1" dirty="0">
+                <a:latin typeface="Consolas" panose="020B0609020204030204" pitchFamily="49" charset="0"/>
+              </a:rPr>
+              <a:t>Roles:</a:t>
+            </a:r>
+            <a:r>
+              <a:rPr lang="en-GB" sz="300" b="1" dirty="0">
+                <a:latin typeface="Consolas" panose="020B0609020204030204" pitchFamily="49" charset="0"/>
+              </a:rPr>
+              <a:t> </a:t>
+            </a:r>
+            <a:endParaRPr lang="en-GB" sz="1100" b="1" dirty="0">
+              <a:latin typeface="Consolas" panose="020B0609020204030204" pitchFamily="49" charset="0"/>
+            </a:endParaRPr>
+          </a:p>
+          <a:p>
+            <a:r>
+              <a:rPr lang="en-GB" sz="1100" b="1" dirty="0" err="1">
+                <a:solidFill>
+                  <a:srgbClr val="FFFF00"/>
+                </a:solidFill>
+                <a:latin typeface="Consolas" panose="020B0609020204030204" pitchFamily="49" charset="0"/>
+              </a:rPr>
+              <a:t>WebServer</a:t>
+            </a:r>
+            <a:endParaRPr lang="en-GB" sz="1100" b="1" dirty="0">
+              <a:solidFill>
+                <a:srgbClr val="FFFF00"/>
+              </a:solidFill>
+              <a:latin typeface="Consolas" panose="020B0609020204030204" pitchFamily="49" charset="0"/>
+            </a:endParaRPr>
+          </a:p>
+          <a:p>
+            <a:endParaRPr lang="en-GB" sz="1100" dirty="0">
+              <a:latin typeface="Consolas" panose="020B0609020204030204" pitchFamily="49" charset="0"/>
+            </a:endParaRPr>
+          </a:p>
+        </p:txBody>
+      </p:sp>
+      <p:pic>
+        <p:nvPicPr>
+          <p:cNvPr id="10" name="Graphic 9" descr="Internet with solid fill">
+            <a:extLst>
+              <a:ext uri="{FF2B5EF4-FFF2-40B4-BE49-F238E27FC236}">
+                <a16:creationId xmlns:a16="http://schemas.microsoft.com/office/drawing/2014/main" id="{2E00E9F0-C9B7-4319-9440-8D811CDB8778}"/>
+              </a:ext>
+            </a:extLst>
+          </p:cNvPr>
+          <p:cNvPicPr>
+            <a:picLocks noChangeAspect="1"/>
+          </p:cNvPicPr>
+          <p:nvPr/>
+        </p:nvPicPr>
+        <p:blipFill>
+          <a:blip r:embed="rId3">
+            <a:extLst>
+              <a:ext uri="{96DAC541-7B7A-43D3-8B79-37D633B846F1}">
+                <asvg:svgBlip xmlns:asvg="http://schemas.microsoft.com/office/drawing/2016/SVG/main" r:embed="rId4"/>
+              </a:ext>
+            </a:extLst>
+          </a:blip>
+          <a:stretch>
+            <a:fillRect/>
+          </a:stretch>
+        </p:blipFill>
+        <p:spPr>
+          <a:xfrm>
+            <a:off x="3651316" y="1848982"/>
+            <a:ext cx="914400" cy="914400"/>
+          </a:xfrm>
+          <a:prstGeom prst="rect">
+            <a:avLst/>
+          </a:prstGeom>
+        </p:spPr>
+      </p:pic>
+      <p:pic>
+        <p:nvPicPr>
+          <p:cNvPr id="12" name="Graphic 11" descr="Cmd Terminal with solid fill">
+            <a:extLst>
+              <a:ext uri="{FF2B5EF4-FFF2-40B4-BE49-F238E27FC236}">
+                <a16:creationId xmlns:a16="http://schemas.microsoft.com/office/drawing/2014/main" id="{BC42805B-F436-4492-8C67-B5C11BD975D1}"/>
+              </a:ext>
+            </a:extLst>
+          </p:cNvPr>
+          <p:cNvPicPr>
+            <a:picLocks noChangeAspect="1"/>
+          </p:cNvPicPr>
+          <p:nvPr/>
+        </p:nvPicPr>
+        <p:blipFill>
+          <a:blip r:embed="rId5">
+            <a:extLst>
+              <a:ext uri="{96DAC541-7B7A-43D3-8B79-37D633B846F1}">
+                <asvg:svgBlip xmlns:asvg="http://schemas.microsoft.com/office/drawing/2016/SVG/main" r:embed="rId6"/>
+              </a:ext>
+            </a:extLst>
+          </a:blip>
+          <a:stretch>
+            <a:fillRect/>
+          </a:stretch>
+        </p:blipFill>
+        <p:spPr>
+          <a:xfrm>
+            <a:off x="5494935" y="1848982"/>
+            <a:ext cx="914400" cy="928867"/>
+          </a:xfrm>
+          <a:prstGeom prst="rect">
+            <a:avLst/>
+          </a:prstGeom>
+        </p:spPr>
+      </p:pic>
+      <p:pic>
+        <p:nvPicPr>
+          <p:cNvPr id="14" name="Graphic 13" descr="Database with solid fill">
+            <a:extLst>
+              <a:ext uri="{FF2B5EF4-FFF2-40B4-BE49-F238E27FC236}">
+                <a16:creationId xmlns:a16="http://schemas.microsoft.com/office/drawing/2014/main" id="{F8FDECFF-7DAC-47B9-8E63-266058585BA4}"/>
+              </a:ext>
+            </a:extLst>
+          </p:cNvPr>
+          <p:cNvPicPr>
+            <a:picLocks noChangeAspect="1"/>
+          </p:cNvPicPr>
+          <p:nvPr/>
+        </p:nvPicPr>
+        <p:blipFill>
+          <a:blip r:embed="rId7">
+            <a:extLst>
+              <a:ext uri="{96DAC541-7B7A-43D3-8B79-37D633B846F1}">
+                <asvg:svgBlip xmlns:asvg="http://schemas.microsoft.com/office/drawing/2016/SVG/main" r:embed="rId8"/>
+              </a:ext>
+            </a:extLst>
+          </a:blip>
+          <a:stretch>
+            <a:fillRect/>
+          </a:stretch>
+        </p:blipFill>
+        <p:spPr>
+          <a:xfrm>
+            <a:off x="7226383" y="1854695"/>
+            <a:ext cx="914400" cy="914400"/>
+          </a:xfrm>
+          <a:prstGeom prst="rect">
+            <a:avLst/>
+          </a:prstGeom>
+        </p:spPr>
+      </p:pic>
+    </p:spTree>
+    <p:extLst>
+      <p:ext uri="{BB962C8B-B14F-4D97-AF65-F5344CB8AC3E}">
+        <p14:creationId xmlns:p14="http://schemas.microsoft.com/office/powerpoint/2010/main" val="1722844341"/>
+      </p:ext>
+    </p:extLst>
+  </p:cSld>
+  <p:clrMapOvr>
+    <a:masterClrMapping/>
+  </p:clrMapOvr>
+  <mc:AlternateContent xmlns:mc="http://schemas.openxmlformats.org/markup-compatibility/2006">
+    <mc:Choice xmlns:p14="http://schemas.microsoft.com/office/powerpoint/2010/main" Requires="p14">
+      <p:transition spd="med" p14:dur="700">
+        <p:fade/>
+      </p:transition>
+    </mc:Choice>
+    <mc:Fallback>
+      <p:transition spd="med">
+        <p:fade/>
+      </p:transition>
+    </mc:Fallback>
+  </mc:AlternateContent>
+</p:sld>
+</file>
+
+<file path=ppt/slides/slide6.xml><?xml version="1.0" encoding="utf-8"?>
+<p:sld xmlns:a="http://schemas.openxmlformats.org/drawingml/2006/main" xmlns:r="http://schemas.openxmlformats.org/officeDocument/2006/relationships" xmlns:p="http://schemas.openxmlformats.org/presentationml/2006/main">
+  <p:cSld>
+    <p:spTree>
+      <p:nvGrpSpPr>
+        <p:cNvPr id="1" name="Shape 56"/>
+        <p:cNvGrpSpPr/>
+        <p:nvPr/>
+      </p:nvGrpSpPr>
+      <p:grpSpPr>
+        <a:xfrm>
+          <a:off x="0" y="0"/>
+          <a:ext cx="0" cy="0"/>
+          <a:chOff x="0" y="0"/>
+          <a:chExt cx="0" cy="0"/>
+        </a:xfrm>
+      </p:grpSpPr>
+      <p:sp>
+        <p:nvSpPr>
+          <p:cNvPr id="4" name="Rectangle 3">
+            <a:extLst>
+              <a:ext uri="{FF2B5EF4-FFF2-40B4-BE49-F238E27FC236}">
+                <a16:creationId xmlns:a16="http://schemas.microsoft.com/office/drawing/2014/main" id="{76081B0F-E9B5-4D6B-A920-D7CA77CB05F3}"/>
+              </a:ext>
+            </a:extLst>
+          </p:cNvPr>
+          <p:cNvSpPr/>
+          <p:nvPr/>
+        </p:nvSpPr>
+        <p:spPr>
+          <a:xfrm>
+            <a:off x="2748915" y="1308736"/>
+            <a:ext cx="6297930" cy="2857499"/>
+          </a:xfrm>
+          <a:prstGeom prst="rect">
+            <a:avLst/>
+          </a:prstGeom>
+          <a:solidFill>
+            <a:srgbClr val="00B0F0"/>
+          </a:solidFill>
+          <a:ln w="76200">
+            <a:solidFill>
+              <a:schemeClr val="bg1"/>
+            </a:solidFill>
+            <a:miter lim="800000"/>
+          </a:ln>
+        </p:spPr>
+        <p:style>
+          <a:lnRef idx="2">
+            <a:schemeClr val="accent1">
+              <a:shade val="50000"/>
+            </a:schemeClr>
+          </a:lnRef>
+          <a:fillRef idx="1">
+            <a:schemeClr val="accent1"/>
+          </a:fillRef>
+          <a:effectRef idx="0">
+            <a:schemeClr val="accent1"/>
+          </a:effectRef>
+          <a:fontRef idx="minor">
+            <a:schemeClr val="lt1"/>
+          </a:fontRef>
+        </p:style>
+        <p:txBody>
+          <a:bodyPr rtlCol="0" anchor="t"/>
+          <a:lstStyle/>
+          <a:p>
+            <a:r>
+              <a:rPr lang="en-GB" b="1" dirty="0">
+                <a:latin typeface="Consolas" panose="020B0609020204030204" pitchFamily="49" charset="0"/>
+              </a:rPr>
+              <a:t>Project Group: </a:t>
+            </a:r>
+            <a:r>
+              <a:rPr lang="en-GB" dirty="0">
+                <a:latin typeface="Consolas" panose="020B0609020204030204" pitchFamily="49" charset="0"/>
+              </a:rPr>
+              <a:t>Accounting System</a:t>
+            </a:r>
+          </a:p>
+        </p:txBody>
+      </p:sp>
+      <p:sp>
+        <p:nvSpPr>
+          <p:cNvPr id="21" name="Rectangle 20">
+            <a:extLst>
+              <a:ext uri="{FF2B5EF4-FFF2-40B4-BE49-F238E27FC236}">
+                <a16:creationId xmlns:a16="http://schemas.microsoft.com/office/drawing/2014/main" id="{516D30A2-39F4-4AD0-AC87-0DAB450E7712}"/>
+              </a:ext>
+            </a:extLst>
+          </p:cNvPr>
+          <p:cNvSpPr/>
+          <p:nvPr/>
+        </p:nvSpPr>
+        <p:spPr>
+          <a:xfrm>
+            <a:off x="6848624" y="1725773"/>
+            <a:ext cx="1669918" cy="1037607"/>
+          </a:xfrm>
+          <a:prstGeom prst="rect">
+            <a:avLst/>
+          </a:prstGeom>
+          <a:solidFill>
+            <a:srgbClr val="2F93E0"/>
+          </a:solidFill>
+          <a:ln w="76200">
+            <a:solidFill>
+              <a:schemeClr val="bg1"/>
+            </a:solidFill>
+            <a:miter lim="800000"/>
+          </a:ln>
+        </p:spPr>
+        <p:style>
+          <a:lnRef idx="2">
+            <a:schemeClr val="accent1">
+              <a:shade val="50000"/>
+            </a:schemeClr>
+          </a:lnRef>
+          <a:fillRef idx="1">
+            <a:schemeClr val="accent1"/>
+          </a:fillRef>
+          <a:effectRef idx="0">
+            <a:schemeClr val="accent1"/>
+          </a:effectRef>
+          <a:fontRef idx="minor">
+            <a:schemeClr val="lt1"/>
+          </a:fontRef>
+        </p:style>
+        <p:txBody>
+          <a:bodyPr rtlCol="0" anchor="t"/>
+          <a:lstStyle/>
+          <a:p>
+            <a:r>
+              <a:rPr lang="en-GB" sz="1100" b="1" dirty="0">
+                <a:latin typeface="Consolas" panose="020B0609020204030204" pitchFamily="49" charset="0"/>
+              </a:rPr>
+              <a:t>Project:</a:t>
+            </a:r>
+            <a:r>
+              <a:rPr lang="en-GB" sz="1100" dirty="0">
+                <a:latin typeface="Consolas" panose="020B0609020204030204" pitchFamily="49" charset="0"/>
+              </a:rPr>
+              <a:t> Database</a:t>
+            </a:r>
+            <a:endParaRPr lang="en-GB" sz="1100" dirty="0">
+              <a:solidFill>
+                <a:schemeClr val="accent6"/>
+              </a:solidFill>
+              <a:latin typeface="Consolas" panose="020B0609020204030204" pitchFamily="49" charset="0"/>
+            </a:endParaRPr>
+          </a:p>
+        </p:txBody>
+      </p:sp>
+      <p:sp>
+        <p:nvSpPr>
+          <p:cNvPr id="17" name="Rectangle 16">
+            <a:extLst>
+              <a:ext uri="{FF2B5EF4-FFF2-40B4-BE49-F238E27FC236}">
+                <a16:creationId xmlns:a16="http://schemas.microsoft.com/office/drawing/2014/main" id="{D99FB313-AE7E-46EB-96DD-32A98C640097}"/>
+              </a:ext>
+            </a:extLst>
+          </p:cNvPr>
+          <p:cNvSpPr/>
+          <p:nvPr/>
+        </p:nvSpPr>
+        <p:spPr>
+          <a:xfrm>
+            <a:off x="5060039" y="1725774"/>
+            <a:ext cx="1669918" cy="1037607"/>
+          </a:xfrm>
+          <a:prstGeom prst="rect">
+            <a:avLst/>
+          </a:prstGeom>
+          <a:solidFill>
+            <a:srgbClr val="2F93E0"/>
+          </a:solidFill>
+          <a:ln w="76200">
+            <a:solidFill>
+              <a:schemeClr val="bg1"/>
+            </a:solidFill>
+            <a:miter lim="800000"/>
+          </a:ln>
+        </p:spPr>
+        <p:style>
+          <a:lnRef idx="2">
+            <a:schemeClr val="accent1">
+              <a:shade val="50000"/>
+            </a:schemeClr>
+          </a:lnRef>
+          <a:fillRef idx="1">
+            <a:schemeClr val="accent1"/>
+          </a:fillRef>
+          <a:effectRef idx="0">
+            <a:schemeClr val="accent1"/>
+          </a:effectRef>
+          <a:fontRef idx="minor">
+            <a:schemeClr val="lt1"/>
+          </a:fontRef>
+        </p:style>
+        <p:txBody>
+          <a:bodyPr rtlCol="0" anchor="t"/>
+          <a:lstStyle/>
+          <a:p>
+            <a:r>
+              <a:rPr lang="en-GB" sz="1100" b="1" dirty="0">
+                <a:latin typeface="Consolas" panose="020B0609020204030204" pitchFamily="49" charset="0"/>
+              </a:rPr>
+              <a:t>Project:</a:t>
+            </a:r>
+            <a:r>
+              <a:rPr lang="en-GB" sz="1100" dirty="0">
+                <a:latin typeface="Consolas" panose="020B0609020204030204" pitchFamily="49" charset="0"/>
+              </a:rPr>
+              <a:t> Service</a:t>
+            </a:r>
+            <a:endParaRPr lang="en-GB" sz="1100" dirty="0">
+              <a:solidFill>
+                <a:schemeClr val="accent6"/>
+              </a:solidFill>
+              <a:latin typeface="Consolas" panose="020B0609020204030204" pitchFamily="49" charset="0"/>
+            </a:endParaRPr>
+          </a:p>
+        </p:txBody>
+      </p:sp>
+      <p:sp>
+        <p:nvSpPr>
+          <p:cNvPr id="20" name="Rectangle 19">
+            <a:extLst>
+              <a:ext uri="{FF2B5EF4-FFF2-40B4-BE49-F238E27FC236}">
+                <a16:creationId xmlns:a16="http://schemas.microsoft.com/office/drawing/2014/main" id="{DBC9E0D9-E69C-4055-A9F2-BF29E344A23A}"/>
+              </a:ext>
+            </a:extLst>
+          </p:cNvPr>
+          <p:cNvSpPr/>
+          <p:nvPr/>
+        </p:nvSpPr>
+        <p:spPr>
+          <a:xfrm>
+            <a:off x="3273557" y="1725775"/>
+            <a:ext cx="1669918" cy="1037607"/>
+          </a:xfrm>
+          <a:prstGeom prst="rect">
+            <a:avLst/>
+          </a:prstGeom>
+          <a:solidFill>
+            <a:srgbClr val="2F93E0"/>
+          </a:solidFill>
+          <a:ln w="76200">
+            <a:solidFill>
+              <a:schemeClr val="bg1"/>
+            </a:solidFill>
+            <a:miter lim="800000"/>
+          </a:ln>
+        </p:spPr>
+        <p:style>
+          <a:lnRef idx="2">
+            <a:schemeClr val="accent1">
+              <a:shade val="50000"/>
+            </a:schemeClr>
+          </a:lnRef>
+          <a:fillRef idx="1">
+            <a:schemeClr val="accent1"/>
+          </a:fillRef>
+          <a:effectRef idx="0">
+            <a:schemeClr val="accent1"/>
+          </a:effectRef>
+          <a:fontRef idx="minor">
+            <a:schemeClr val="lt1"/>
+          </a:fontRef>
+        </p:style>
+        <p:txBody>
+          <a:bodyPr rtlCol="0" anchor="t"/>
+          <a:lstStyle/>
+          <a:p>
+            <a:r>
+              <a:rPr lang="en-GB" sz="1100" b="1" dirty="0">
+                <a:latin typeface="Consolas" panose="020B0609020204030204" pitchFamily="49" charset="0"/>
+              </a:rPr>
+              <a:t>Project:</a:t>
+            </a:r>
+            <a:r>
+              <a:rPr lang="en-GB" sz="1100" dirty="0">
+                <a:latin typeface="Consolas" panose="020B0609020204030204" pitchFamily="49" charset="0"/>
+              </a:rPr>
+              <a:t> Web portal</a:t>
+            </a:r>
+            <a:endParaRPr lang="en-GB" sz="1100" dirty="0">
+              <a:solidFill>
+                <a:schemeClr val="accent6"/>
+              </a:solidFill>
+              <a:latin typeface="Consolas" panose="020B0609020204030204" pitchFamily="49" charset="0"/>
+            </a:endParaRPr>
+          </a:p>
+        </p:txBody>
+      </p:sp>
+      <p:sp>
+        <p:nvSpPr>
+          <p:cNvPr id="6" name="Rectangle 5">
+            <a:extLst>
+              <a:ext uri="{FF2B5EF4-FFF2-40B4-BE49-F238E27FC236}">
+                <a16:creationId xmlns:a16="http://schemas.microsoft.com/office/drawing/2014/main" id="{7ECADFE4-6284-40CF-A1D9-75FE6FDFA479}"/>
+              </a:ext>
+            </a:extLst>
+          </p:cNvPr>
+          <p:cNvSpPr/>
+          <p:nvPr/>
+        </p:nvSpPr>
+        <p:spPr>
+          <a:xfrm>
+            <a:off x="-3734770" y="867307"/>
+            <a:ext cx="2571512" cy="892911"/>
+          </a:xfrm>
+          <a:prstGeom prst="rect">
+            <a:avLst/>
+          </a:prstGeom>
+          <a:solidFill>
+            <a:srgbClr val="00CC65"/>
+          </a:solidFill>
+          <a:ln w="76200">
+            <a:solidFill>
+              <a:schemeClr val="bg1"/>
+            </a:solidFill>
+            <a:miter lim="800000"/>
+          </a:ln>
+        </p:spPr>
+        <p:style>
+          <a:lnRef idx="2">
+            <a:schemeClr val="accent1">
+              <a:shade val="50000"/>
+            </a:schemeClr>
+          </a:lnRef>
+          <a:fillRef idx="1">
+            <a:schemeClr val="accent1"/>
+          </a:fillRef>
+          <a:effectRef idx="0">
+            <a:schemeClr val="accent1"/>
+          </a:effectRef>
+          <a:fontRef idx="minor">
+            <a:schemeClr val="lt1"/>
+          </a:fontRef>
+        </p:style>
+        <p:txBody>
+          <a:bodyPr rtlCol="0" anchor="t"/>
+          <a:lstStyle/>
+          <a:p>
+            <a:r>
+              <a:rPr lang="en-GB" sz="1100" b="1" dirty="0">
+                <a:latin typeface="Consolas" panose="020B0609020204030204" pitchFamily="49" charset="0"/>
+              </a:rPr>
+              <a:t>Target: Web02</a:t>
+            </a:r>
+          </a:p>
+          <a:p>
+            <a:r>
+              <a:rPr lang="en-GB" sz="1100" b="1" dirty="0">
+                <a:latin typeface="Consolas" panose="020B0609020204030204" pitchFamily="49" charset="0"/>
+              </a:rPr>
+              <a:t>Roles:</a:t>
+            </a:r>
+            <a:r>
+              <a:rPr lang="en-GB" sz="300" b="1" dirty="0">
+                <a:latin typeface="Consolas" panose="020B0609020204030204" pitchFamily="49" charset="0"/>
+              </a:rPr>
+              <a:t> </a:t>
+            </a:r>
+            <a:endParaRPr lang="en-GB" sz="1100" b="1" dirty="0">
+              <a:latin typeface="Consolas" panose="020B0609020204030204" pitchFamily="49" charset="0"/>
+            </a:endParaRPr>
+          </a:p>
+          <a:p>
+            <a:r>
+              <a:rPr lang="en-GB" sz="1100" b="1" dirty="0" err="1">
+                <a:solidFill>
+                  <a:srgbClr val="FFFF00"/>
+                </a:solidFill>
+                <a:latin typeface="Consolas" panose="020B0609020204030204" pitchFamily="49" charset="0"/>
+              </a:rPr>
+              <a:t>WebServer</a:t>
+            </a:r>
+            <a:endParaRPr lang="en-GB" sz="1100" b="1" dirty="0">
+              <a:solidFill>
+                <a:srgbClr val="FFFF00"/>
+              </a:solidFill>
+              <a:latin typeface="Consolas" panose="020B0609020204030204" pitchFamily="49" charset="0"/>
+            </a:endParaRPr>
+          </a:p>
+          <a:p>
+            <a:endParaRPr lang="en-GB" sz="1100" dirty="0">
+              <a:latin typeface="Consolas" panose="020B0609020204030204" pitchFamily="49" charset="0"/>
+            </a:endParaRPr>
+          </a:p>
+        </p:txBody>
+      </p:sp>
+      <p:sp>
+        <p:nvSpPr>
+          <p:cNvPr id="7" name="Rectangle 6">
+            <a:extLst>
+              <a:ext uri="{FF2B5EF4-FFF2-40B4-BE49-F238E27FC236}">
+                <a16:creationId xmlns:a16="http://schemas.microsoft.com/office/drawing/2014/main" id="{97423E62-1D0A-45F2-A76F-1D2484112914}"/>
+              </a:ext>
+            </a:extLst>
+          </p:cNvPr>
+          <p:cNvSpPr/>
+          <p:nvPr/>
+        </p:nvSpPr>
+        <p:spPr>
+          <a:xfrm>
+            <a:off x="-3517602" y="3658485"/>
+            <a:ext cx="2571514" cy="917722"/>
+          </a:xfrm>
+          <a:prstGeom prst="rect">
+            <a:avLst/>
+          </a:prstGeom>
+          <a:solidFill>
+            <a:srgbClr val="2F93E0"/>
+          </a:solidFill>
+          <a:ln w="76200">
+            <a:solidFill>
+              <a:schemeClr val="bg1"/>
+            </a:solidFill>
+            <a:miter lim="800000"/>
+          </a:ln>
+        </p:spPr>
+        <p:style>
+          <a:lnRef idx="2">
+            <a:schemeClr val="accent1">
+              <a:shade val="50000"/>
+            </a:schemeClr>
+          </a:lnRef>
+          <a:fillRef idx="1">
+            <a:schemeClr val="accent1"/>
+          </a:fillRef>
+          <a:effectRef idx="0">
+            <a:schemeClr val="accent1"/>
+          </a:effectRef>
+          <a:fontRef idx="minor">
+            <a:schemeClr val="lt1"/>
+          </a:fontRef>
+        </p:style>
+        <p:txBody>
+          <a:bodyPr rtlCol="0" anchor="t"/>
+          <a:lstStyle/>
+          <a:p>
+            <a:r>
+              <a:rPr lang="en-GB" sz="1100" dirty="0">
+                <a:latin typeface="Consolas" panose="020B0609020204030204" pitchFamily="49" charset="0"/>
+              </a:rPr>
+              <a:t>Target: DB02</a:t>
+            </a:r>
+          </a:p>
+          <a:p>
+            <a:r>
+              <a:rPr lang="en-GB" sz="300" dirty="0">
+                <a:latin typeface="Consolas" panose="020B0609020204030204" pitchFamily="49" charset="0"/>
+              </a:rPr>
+              <a:t> </a:t>
+            </a:r>
+            <a:r>
+              <a:rPr lang="en-GB" sz="1100" dirty="0">
+                <a:latin typeface="Consolas" panose="020B0609020204030204" pitchFamily="49" charset="0"/>
+              </a:rPr>
+              <a:t>Roles:</a:t>
+            </a:r>
+            <a:r>
+              <a:rPr lang="en-GB" sz="300" dirty="0">
+                <a:latin typeface="Consolas" panose="020B0609020204030204" pitchFamily="49" charset="0"/>
+              </a:rPr>
+              <a:t> </a:t>
+            </a:r>
+            <a:endParaRPr lang="en-GB" sz="1100" dirty="0">
+              <a:latin typeface="Consolas" panose="020B0609020204030204" pitchFamily="49" charset="0"/>
+            </a:endParaRPr>
+          </a:p>
+          <a:p>
+            <a:r>
+              <a:rPr lang="en-GB" sz="1100" dirty="0">
+                <a:solidFill>
+                  <a:schemeClr val="accent6"/>
+                </a:solidFill>
+                <a:latin typeface="Consolas" panose="020B0609020204030204" pitchFamily="49" charset="0"/>
+              </a:rPr>
+              <a:t>Database</a:t>
+            </a:r>
+          </a:p>
+          <a:p>
+            <a:endParaRPr lang="en-GB" sz="1100" dirty="0">
+              <a:latin typeface="Consolas" panose="020B0609020204030204" pitchFamily="49" charset="0"/>
+            </a:endParaRPr>
+          </a:p>
+        </p:txBody>
+      </p:sp>
+      <p:sp>
+        <p:nvSpPr>
+          <p:cNvPr id="9" name="Rectangle 8">
+            <a:extLst>
+              <a:ext uri="{FF2B5EF4-FFF2-40B4-BE49-F238E27FC236}">
+                <a16:creationId xmlns:a16="http://schemas.microsoft.com/office/drawing/2014/main" id="{708F42E3-02CA-44D3-9683-0CADB846FD68}"/>
+              </a:ext>
+            </a:extLst>
+          </p:cNvPr>
+          <p:cNvSpPr/>
+          <p:nvPr/>
+        </p:nvSpPr>
+        <p:spPr>
+          <a:xfrm>
+            <a:off x="-3833226" y="2416071"/>
+            <a:ext cx="2571512" cy="892911"/>
+          </a:xfrm>
+          <a:prstGeom prst="rect">
+            <a:avLst/>
+          </a:prstGeom>
+          <a:solidFill>
+            <a:srgbClr val="00CC65"/>
+          </a:solidFill>
+          <a:ln w="76200">
+            <a:solidFill>
+              <a:schemeClr val="bg1"/>
+            </a:solidFill>
+            <a:miter lim="800000"/>
+          </a:ln>
+        </p:spPr>
+        <p:style>
+          <a:lnRef idx="2">
+            <a:schemeClr val="accent1">
+              <a:shade val="50000"/>
+            </a:schemeClr>
+          </a:lnRef>
+          <a:fillRef idx="1">
+            <a:schemeClr val="accent1"/>
+          </a:fillRef>
+          <a:effectRef idx="0">
+            <a:schemeClr val="accent1"/>
+          </a:effectRef>
+          <a:fontRef idx="minor">
+            <a:schemeClr val="lt1"/>
+          </a:fontRef>
+        </p:style>
+        <p:txBody>
+          <a:bodyPr rtlCol="0" anchor="t"/>
+          <a:lstStyle/>
+          <a:p>
+            <a:r>
+              <a:rPr lang="en-GB" sz="1100" b="1" dirty="0">
+                <a:latin typeface="Consolas" panose="020B0609020204030204" pitchFamily="49" charset="0"/>
+              </a:rPr>
+              <a:t>Target: Web03</a:t>
+            </a:r>
+          </a:p>
+          <a:p>
+            <a:r>
+              <a:rPr lang="en-GB" sz="1100" b="1" dirty="0">
+                <a:latin typeface="Consolas" panose="020B0609020204030204" pitchFamily="49" charset="0"/>
+              </a:rPr>
+              <a:t>Roles:</a:t>
+            </a:r>
+            <a:r>
+              <a:rPr lang="en-GB" sz="300" b="1" dirty="0">
+                <a:latin typeface="Consolas" panose="020B0609020204030204" pitchFamily="49" charset="0"/>
+              </a:rPr>
+              <a:t> </a:t>
+            </a:r>
+            <a:endParaRPr lang="en-GB" sz="1100" b="1" dirty="0">
+              <a:latin typeface="Consolas" panose="020B0609020204030204" pitchFamily="49" charset="0"/>
+            </a:endParaRPr>
+          </a:p>
+          <a:p>
+            <a:r>
+              <a:rPr lang="en-GB" sz="1100" b="1" dirty="0" err="1">
+                <a:solidFill>
+                  <a:srgbClr val="FFFF00"/>
+                </a:solidFill>
+                <a:latin typeface="Consolas" panose="020B0609020204030204" pitchFamily="49" charset="0"/>
+              </a:rPr>
+              <a:t>WebServer</a:t>
+            </a:r>
+            <a:endParaRPr lang="en-GB" sz="1100" b="1" dirty="0">
+              <a:solidFill>
+                <a:srgbClr val="FFFF00"/>
+              </a:solidFill>
+              <a:latin typeface="Consolas" panose="020B0609020204030204" pitchFamily="49" charset="0"/>
+            </a:endParaRPr>
+          </a:p>
+          <a:p>
+            <a:endParaRPr lang="en-GB" sz="1100" dirty="0">
+              <a:latin typeface="Consolas" panose="020B0609020204030204" pitchFamily="49" charset="0"/>
+            </a:endParaRPr>
+          </a:p>
+        </p:txBody>
+      </p:sp>
+      <p:pic>
+        <p:nvPicPr>
+          <p:cNvPr id="10" name="Graphic 9" descr="Internet with solid fill">
+            <a:extLst>
+              <a:ext uri="{FF2B5EF4-FFF2-40B4-BE49-F238E27FC236}">
+                <a16:creationId xmlns:a16="http://schemas.microsoft.com/office/drawing/2014/main" id="{2E00E9F0-C9B7-4319-9440-8D811CDB8778}"/>
+              </a:ext>
+            </a:extLst>
+          </p:cNvPr>
+          <p:cNvPicPr>
+            <a:picLocks noChangeAspect="1"/>
+          </p:cNvPicPr>
+          <p:nvPr/>
+        </p:nvPicPr>
+        <p:blipFill>
+          <a:blip r:embed="rId3">
+            <a:extLst>
+              <a:ext uri="{96DAC541-7B7A-43D3-8B79-37D633B846F1}">
+                <asvg:svgBlip xmlns:asvg="http://schemas.microsoft.com/office/drawing/2016/SVG/main" r:embed="rId4"/>
+              </a:ext>
+            </a:extLst>
+          </a:blip>
+          <a:stretch>
+            <a:fillRect/>
+          </a:stretch>
+        </p:blipFill>
+        <p:spPr>
+          <a:xfrm>
+            <a:off x="3651316" y="1848982"/>
+            <a:ext cx="914400" cy="914400"/>
+          </a:xfrm>
+          <a:prstGeom prst="rect">
+            <a:avLst/>
+          </a:prstGeom>
+        </p:spPr>
+      </p:pic>
+      <p:pic>
+        <p:nvPicPr>
+          <p:cNvPr id="12" name="Graphic 11" descr="Cmd Terminal with solid fill">
+            <a:extLst>
+              <a:ext uri="{FF2B5EF4-FFF2-40B4-BE49-F238E27FC236}">
+                <a16:creationId xmlns:a16="http://schemas.microsoft.com/office/drawing/2014/main" id="{BC42805B-F436-4492-8C67-B5C11BD975D1}"/>
+              </a:ext>
+            </a:extLst>
+          </p:cNvPr>
+          <p:cNvPicPr>
+            <a:picLocks noChangeAspect="1"/>
+          </p:cNvPicPr>
+          <p:nvPr/>
+        </p:nvPicPr>
+        <p:blipFill>
+          <a:blip r:embed="rId5">
+            <a:extLst>
+              <a:ext uri="{96DAC541-7B7A-43D3-8B79-37D633B846F1}">
+                <asvg:svgBlip xmlns:asvg="http://schemas.microsoft.com/office/drawing/2016/SVG/main" r:embed="rId6"/>
+              </a:ext>
+            </a:extLst>
+          </a:blip>
+          <a:stretch>
+            <a:fillRect/>
+          </a:stretch>
+        </p:blipFill>
+        <p:spPr>
+          <a:xfrm>
+            <a:off x="5494935" y="1848982"/>
+            <a:ext cx="914400" cy="928867"/>
+          </a:xfrm>
+          <a:prstGeom prst="rect">
+            <a:avLst/>
+          </a:prstGeom>
+        </p:spPr>
+      </p:pic>
+      <p:pic>
+        <p:nvPicPr>
+          <p:cNvPr id="14" name="Graphic 13" descr="Database with solid fill">
+            <a:extLst>
+              <a:ext uri="{FF2B5EF4-FFF2-40B4-BE49-F238E27FC236}">
+                <a16:creationId xmlns:a16="http://schemas.microsoft.com/office/drawing/2014/main" id="{F8FDECFF-7DAC-47B9-8E63-266058585BA4}"/>
+              </a:ext>
+            </a:extLst>
+          </p:cNvPr>
+          <p:cNvPicPr>
+            <a:picLocks noChangeAspect="1"/>
+          </p:cNvPicPr>
+          <p:nvPr/>
+        </p:nvPicPr>
+        <p:blipFill>
+          <a:blip r:embed="rId7">
+            <a:extLst>
+              <a:ext uri="{96DAC541-7B7A-43D3-8B79-37D633B846F1}">
+                <asvg:svgBlip xmlns:asvg="http://schemas.microsoft.com/office/drawing/2016/SVG/main" r:embed="rId8"/>
+              </a:ext>
+            </a:extLst>
+          </a:blip>
+          <a:stretch>
+            <a:fillRect/>
+          </a:stretch>
+        </p:blipFill>
+        <p:spPr>
+          <a:xfrm>
+            <a:off x="7226383" y="1854695"/>
+            <a:ext cx="914400" cy="914400"/>
+          </a:xfrm>
+          <a:prstGeom prst="rect">
+            <a:avLst/>
+          </a:prstGeom>
+        </p:spPr>
+      </p:pic>
+      <p:grpSp>
+        <p:nvGrpSpPr>
+          <p:cNvPr id="2" name="Group 1">
+            <a:extLst>
+              <a:ext uri="{FF2B5EF4-FFF2-40B4-BE49-F238E27FC236}">
+                <a16:creationId xmlns:a16="http://schemas.microsoft.com/office/drawing/2014/main" id="{FABBAF4C-E50A-4E04-8A04-B7F67FE748B8}"/>
+              </a:ext>
+            </a:extLst>
+          </p:cNvPr>
+          <p:cNvGrpSpPr/>
+          <p:nvPr/>
+        </p:nvGrpSpPr>
+        <p:grpSpPr>
+          <a:xfrm>
+            <a:off x="5952135" y="2951798"/>
+            <a:ext cx="2571825" cy="1037607"/>
+            <a:chOff x="4326180" y="2691208"/>
+            <a:chExt cx="2571825" cy="1037607"/>
+          </a:xfrm>
+        </p:grpSpPr>
+        <p:sp>
+          <p:nvSpPr>
+            <p:cNvPr id="22" name="Rectangle 21">
+              <a:extLst>
+                <a:ext uri="{FF2B5EF4-FFF2-40B4-BE49-F238E27FC236}">
+                  <a16:creationId xmlns:a16="http://schemas.microsoft.com/office/drawing/2014/main" id="{C982E2AE-E960-45C8-8A2E-42E244AC3042}"/>
+                </a:ext>
+              </a:extLst>
+            </p:cNvPr>
+            <p:cNvSpPr/>
+            <p:nvPr/>
+          </p:nvSpPr>
+          <p:spPr>
+            <a:xfrm>
+              <a:off x="4326180" y="2691208"/>
+              <a:ext cx="2571825" cy="1037607"/>
+            </a:xfrm>
+            <a:prstGeom prst="rect">
+              <a:avLst/>
+            </a:prstGeom>
+            <a:solidFill>
+              <a:srgbClr val="2F93E0"/>
+            </a:solidFill>
+            <a:ln w="76200">
+              <a:solidFill>
+                <a:schemeClr val="bg1"/>
+              </a:solidFill>
+              <a:miter lim="800000"/>
+            </a:ln>
+          </p:spPr>
+          <p:style>
+            <a:lnRef idx="2">
+              <a:schemeClr val="accent1">
+                <a:shade val="50000"/>
+              </a:schemeClr>
+            </a:lnRef>
+            <a:fillRef idx="1">
+              <a:schemeClr val="accent1"/>
+            </a:fillRef>
+            <a:effectRef idx="0">
+              <a:schemeClr val="accent1"/>
+            </a:effectRef>
+            <a:fontRef idx="minor">
+              <a:schemeClr val="lt1"/>
+            </a:fontRef>
+          </p:style>
+          <p:txBody>
+            <a:bodyPr rtlCol="0" anchor="t"/>
+            <a:lstStyle/>
+            <a:p>
+              <a:r>
+                <a:rPr lang="en-GB" sz="1100" b="1" dirty="0">
+                  <a:latin typeface="Consolas" panose="020B0609020204030204" pitchFamily="49" charset="0"/>
+                </a:rPr>
+                <a:t>Project:</a:t>
+              </a:r>
+              <a:r>
+                <a:rPr lang="en-GB" sz="1100" dirty="0">
+                  <a:latin typeface="Consolas" panose="020B0609020204030204" pitchFamily="49" charset="0"/>
+                </a:rPr>
+                <a:t> Deployment Coordinator</a:t>
+              </a:r>
+              <a:endParaRPr lang="en-GB" sz="1100" dirty="0">
+                <a:solidFill>
+                  <a:schemeClr val="accent6"/>
+                </a:solidFill>
+                <a:latin typeface="Consolas" panose="020B0609020204030204" pitchFamily="49" charset="0"/>
+              </a:endParaRPr>
+            </a:p>
+          </p:txBody>
+        </p:sp>
+        <p:pic>
+          <p:nvPicPr>
+            <p:cNvPr id="18" name="Graphic 17" descr="Network with solid fill">
+              <a:extLst>
+                <a:ext uri="{FF2B5EF4-FFF2-40B4-BE49-F238E27FC236}">
+                  <a16:creationId xmlns:a16="http://schemas.microsoft.com/office/drawing/2014/main" id="{4E02D2E8-0589-4048-85AF-38B2061AF025}"/>
+                </a:ext>
+              </a:extLst>
+            </p:cNvPr>
+            <p:cNvPicPr>
+              <a:picLocks noChangeAspect="1"/>
+            </p:cNvPicPr>
+            <p:nvPr/>
+          </p:nvPicPr>
+          <p:blipFill>
+            <a:blip r:embed="rId9">
+              <a:extLst>
+                <a:ext uri="{96DAC541-7B7A-43D3-8B79-37D633B846F1}">
+                  <asvg:svgBlip xmlns:asvg="http://schemas.microsoft.com/office/drawing/2016/SVG/main" r:embed="rId10"/>
+                </a:ext>
+              </a:extLst>
+            </a:blip>
+            <a:stretch>
+              <a:fillRect/>
+            </a:stretch>
+          </p:blipFill>
+          <p:spPr>
+            <a:xfrm>
+              <a:off x="5809842" y="2814415"/>
+              <a:ext cx="914400" cy="914400"/>
+            </a:xfrm>
+            <a:prstGeom prst="rect">
+              <a:avLst/>
+            </a:prstGeom>
+          </p:spPr>
+        </p:pic>
+      </p:grpSp>
+    </p:spTree>
+    <p:extLst>
+      <p:ext uri="{BB962C8B-B14F-4D97-AF65-F5344CB8AC3E}">
+        <p14:creationId xmlns:p14="http://schemas.microsoft.com/office/powerpoint/2010/main" val="4059541368"/>
+      </p:ext>
+    </p:extLst>
+  </p:cSld>
+  <p:clrMapOvr>
+    <a:masterClrMapping/>
+  </p:clrMapOvr>
+  <mc:AlternateContent xmlns:mc="http://schemas.openxmlformats.org/markup-compatibility/2006">
+    <mc:Choice xmlns:p14="http://schemas.microsoft.com/office/powerpoint/2010/main" Requires="p14">
+      <p:transition spd="med" p14:dur="700">
+        <p:fade/>
+      </p:transition>
+    </mc:Choice>
+    <mc:Fallback>
+      <p:transition spd="med">
+        <p:fade/>
+      </p:transition>
+    </mc:Fallback>
+  </mc:AlternateContent>
+</p:sld>
+</file>
+
+<file path=ppt/slides/slide7.xml><?xml version="1.0" encoding="utf-8"?>
 <p:sld xmlns:a="http://schemas.openxmlformats.org/drawingml/2006/main" xmlns:r="http://schemas.openxmlformats.org/officeDocument/2006/relationships" xmlns:p="http://schemas.openxmlformats.org/presentationml/2006/main">
   <p:cSld>
     <p:spTree>
@@ -5905,7 +9192,7 @@
         </p:spPr>
         <p:txBody>
           <a:bodyPr spcFirstLastPara="1" wrap="square" lIns="91425" tIns="91425" rIns="91425" bIns="91425" anchor="t" anchorCtr="0">
-            <a:normAutofit/>
+            <a:noAutofit/>
           </a:bodyPr>
           <a:lstStyle/>
           <a:p>
@@ -5920,14 +9207,14 @@
               <a:buChar char="●"/>
             </a:pPr>
             <a:r>
-              <a:rPr lang="en-GB" dirty="0"/>
-              <a:t>A thing</a:t>
+              <a:rPr lang="en-GB" sz="2400" dirty="0"/>
+              <a:t>Use concise names</a:t>
             </a:r>
             <a:br>
-              <a:rPr lang="en-GB" dirty="0"/>
+              <a:rPr lang="en-GB" sz="2400" dirty="0"/>
             </a:br>
             <a:r>
-              <a:rPr lang="en-GB" dirty="0"/>
+              <a:rPr lang="en-GB" sz="2400" dirty="0"/>
               <a:t>	</a:t>
             </a:r>
           </a:p>
@@ -5943,13 +9230,13 @@
               <a:buChar char="●"/>
             </a:pPr>
             <a:r>
-              <a:rPr lang="en-GB" dirty="0"/>
-              <a:t>Another thing</a:t>
+              <a:rPr lang="en-GB" sz="2400" dirty="0"/>
+              <a:t>Automate all the things</a:t>
             </a:r>
             <a:br>
-              <a:rPr lang="en-GB" dirty="0"/>
+              <a:rPr lang="en-GB" sz="2400" dirty="0"/>
             </a:br>
-            <a:endParaRPr lang="en-GB" dirty="0"/>
+            <a:endParaRPr lang="en-GB" sz="2400" dirty="0"/>
           </a:p>
           <a:p>
             <a:pPr marL="457200" lvl="0" indent="-349250" algn="l" rtl="0">
@@ -5963,8 +9250,8 @@
               <a:buChar char="●"/>
             </a:pPr>
             <a:r>
-              <a:rPr lang="en-GB" dirty="0"/>
-              <a:t>Yet another thing</a:t>
+              <a:rPr lang="en-GB" sz="2400" dirty="0"/>
+              <a:t>Break up big projects</a:t>
             </a:r>
           </a:p>
         </p:txBody>
@@ -5979,13 +9266,13 @@
   <p:clrMapOvr>
     <a:masterClrMapping/>
   </p:clrMapOvr>
-  <mc:AlternateContent xmlns:mc="http://schemas.openxmlformats.org/markup-compatibility/2006" xmlns:p14="http://schemas.microsoft.com/office/powerpoint/2010/main">
-    <mc:Choice Requires="p14">
+  <mc:AlternateContent xmlns:mc="http://schemas.openxmlformats.org/markup-compatibility/2006">
+    <mc:Choice xmlns:p14="http://schemas.microsoft.com/office/powerpoint/2010/main" Requires="p14">
       <p:transition spd="med" p14:dur="700">
         <p:fade/>
       </p:transition>
     </mc:Choice>
-    <mc:Fallback xmlns="">
+    <mc:Fallback>
       <p:transition spd="med">
         <p:fade/>
       </p:transition>

</xml_diff>

<commit_message>
Final tweaks during recording
</commit_message>
<xml_diff>
--- a/OctopusDeployFundamentals/Module3-DeploymentProjects/Slides/Module3Class1-DeploymentProcess.pptx
+++ b/OctopusDeployFundamentals/Module3-DeploymentProjects/Slides/Module3Class1-DeploymentProcess.pptx
@@ -5,7 +5,7 @@
     <p:sldMasterId id="2147483659" r:id="rId1"/>
   </p:sldMasterIdLst>
   <p:notesMasterIdLst>
-    <p:notesMasterId r:id="rId9"/>
+    <p:notesMasterId r:id="rId10"/>
   </p:notesMasterIdLst>
   <p:sldIdLst>
     <p:sldId id="268" r:id="rId2"/>
@@ -14,7 +14,8 @@
     <p:sldId id="281" r:id="rId5"/>
     <p:sldId id="280" r:id="rId6"/>
     <p:sldId id="279" r:id="rId7"/>
-    <p:sldId id="266" r:id="rId8"/>
+    <p:sldId id="284" r:id="rId8"/>
+    <p:sldId id="266" r:id="rId9"/>
   </p:sldIdLst>
   <p:sldSz cx="9144000" cy="5143500" type="screen16x9"/>
   <p:notesSz cx="6858000" cy="9144000"/>
@@ -254,14 +255,15 @@
           <p14:sldIdLst>
             <p14:sldId id="268"/>
             <p14:sldId id="283"/>
-          </p14:sldIdLst>
-        </p14:section>
-        <p14:section name="DEMO" id="{C3189919-67CB-4E4B-8654-B0C10042953A}">
-          <p14:sldIdLst>
             <p14:sldId id="282"/>
             <p14:sldId id="281"/>
             <p14:sldId id="280"/>
             <p14:sldId id="279"/>
+          </p14:sldIdLst>
+        </p14:section>
+        <p14:section name="Demo" id="{A5021685-75C9-42CA-82E8-86C709525159}">
+          <p14:sldIdLst>
+            <p14:sldId id="284"/>
           </p14:sldIdLst>
         </p14:section>
         <p14:section name="SUMMARY" id="{40AB4977-2215-43DB-A49C-091EE9B7BBC7}">
@@ -779,6 +781,127 @@
           <a:bodyPr/>
           <a:lstStyle/>
           <a:p>
+            <a:pPr marL="158750" indent="0">
+              <a:buNone/>
+            </a:pPr>
+            <a:r>
+              <a:rPr lang="en-GB" b="0" dirty="0">
+                <a:solidFill>
+                  <a:srgbClr val="D4D4D4"/>
+                </a:solidFill>
+                <a:effectLst/>
+                <a:latin typeface="Consolas" panose="020B0609020204030204" pitchFamily="49" charset="0"/>
+              </a:rPr>
+              <a:t>Welcome to module 3, class 1 of this Octopus Deploy Fundamentals training course.</a:t>
+            </a:r>
+          </a:p>
+          <a:p>
+            <a:pPr marL="158750" indent="0">
+              <a:buNone/>
+            </a:pPr>
+            <a:br>
+              <a:rPr lang="en-GB" b="0" dirty="0">
+                <a:solidFill>
+                  <a:srgbClr val="D4D4D4"/>
+                </a:solidFill>
+                <a:effectLst/>
+                <a:latin typeface="Consolas" panose="020B0609020204030204" pitchFamily="49" charset="0"/>
+              </a:rPr>
+            </a:br>
+            <a:r>
+              <a:rPr lang="en-GB" b="0" dirty="0">
+                <a:solidFill>
+                  <a:srgbClr val="D4D4D4"/>
+                </a:solidFill>
+                <a:effectLst/>
+                <a:latin typeface="Consolas" panose="020B0609020204030204" pitchFamily="49" charset="0"/>
+              </a:rPr>
+              <a:t>In this module we'll explain how to deploy the Package we uploaded in module 2, to the Infrastructure we configured in module 1.</a:t>
+            </a:r>
+          </a:p>
+          <a:p>
+            <a:pPr marL="158750" indent="0">
+              <a:buNone/>
+            </a:pPr>
+            <a:br>
+              <a:rPr lang="en-GB" b="0" dirty="0">
+                <a:solidFill>
+                  <a:srgbClr val="D4D4D4"/>
+                </a:solidFill>
+                <a:effectLst/>
+                <a:latin typeface="Consolas" panose="020B0609020204030204" pitchFamily="49" charset="0"/>
+              </a:rPr>
+            </a:br>
+            <a:r>
+              <a:rPr lang="en-GB" b="0" dirty="0">
+                <a:solidFill>
+                  <a:srgbClr val="D4D4D4"/>
+                </a:solidFill>
+                <a:effectLst/>
+                <a:latin typeface="Consolas" panose="020B0609020204030204" pitchFamily="49" charset="0"/>
+              </a:rPr>
+              <a:t>In class 1, we'll introduce the concepts of Projects and Project Groups.</a:t>
+            </a:r>
+          </a:p>
+          <a:p>
+            <a:pPr marL="158750" indent="0">
+              <a:buNone/>
+            </a:pPr>
+            <a:endParaRPr lang="en-GB" b="0" dirty="0">
+              <a:solidFill>
+                <a:srgbClr val="D4D4D4"/>
+              </a:solidFill>
+              <a:effectLst/>
+              <a:latin typeface="Consolas" panose="020B0609020204030204" pitchFamily="49" charset="0"/>
+            </a:endParaRPr>
+          </a:p>
+          <a:p>
+            <a:pPr marL="158750" marR="0" lvl="0" indent="0" algn="l" defTabSz="914400" rtl="0" eaLnBrk="1" fontAlgn="auto" latinLnBrk="0" hangingPunct="1">
+              <a:lnSpc>
+                <a:spcPct val="100000"/>
+              </a:lnSpc>
+              <a:spcBef>
+                <a:spcPts val="0"/>
+              </a:spcBef>
+              <a:spcAft>
+                <a:spcPts val="0"/>
+              </a:spcAft>
+              <a:buClr>
+                <a:srgbClr val="000000"/>
+              </a:buClr>
+              <a:buSzPts val="1100"/>
+              <a:buFont typeface="Arial"/>
+              <a:buNone/>
+              <a:tabLst/>
+              <a:defRPr/>
+            </a:pPr>
+            <a:r>
+              <a:rPr lang="en-GB" b="0" dirty="0">
+                <a:solidFill>
+                  <a:srgbClr val="D4D4D4"/>
+                </a:solidFill>
+                <a:effectLst/>
+                <a:latin typeface="Consolas" panose="020B0609020204030204" pitchFamily="49" charset="0"/>
+              </a:rPr>
+              <a:t>Projects are where you define the process for deploying your software. They are also used for managing runbooks for general operations tasks associated with that software. However, in this module we'll be focussing on deployment, rather than operations tasks.</a:t>
+            </a:r>
+          </a:p>
+          <a:p>
+            <a:pPr marL="158750" indent="0">
+              <a:buNone/>
+            </a:pPr>
+            <a:endParaRPr lang="en-GB" b="0" dirty="0">
+              <a:solidFill>
+                <a:srgbClr val="D4D4D4"/>
+              </a:solidFill>
+              <a:effectLst/>
+              <a:latin typeface="Consolas" panose="020B0609020204030204" pitchFamily="49" charset="0"/>
+            </a:endParaRPr>
+          </a:p>
+          <a:p>
+            <a:pPr marL="158750" indent="0">
+              <a:buNone/>
+            </a:pPr>
             <a:endParaRPr lang="en-GB" dirty="0"/>
           </a:p>
         </p:txBody>
@@ -845,6 +968,40 @@
           <a:bodyPr/>
           <a:lstStyle/>
           <a:p>
+            <a:pPr marL="158750" marR="0" lvl="0" indent="0" algn="l" defTabSz="914400" rtl="0" eaLnBrk="1" fontAlgn="auto" latinLnBrk="0" hangingPunct="1">
+              <a:lnSpc>
+                <a:spcPct val="100000"/>
+              </a:lnSpc>
+              <a:spcBef>
+                <a:spcPts val="0"/>
+              </a:spcBef>
+              <a:spcAft>
+                <a:spcPts val="0"/>
+              </a:spcAft>
+              <a:buClr>
+                <a:srgbClr val="000000"/>
+              </a:buClr>
+              <a:buSzPts val="1100"/>
+              <a:buFont typeface="Arial"/>
+              <a:buNone/>
+              <a:tabLst/>
+              <a:defRPr/>
+            </a:pPr>
+            <a:r>
+              <a:rPr lang="en-GB" b="0" dirty="0">
+                <a:solidFill>
+                  <a:srgbClr val="D4D4D4"/>
+                </a:solidFill>
+                <a:effectLst/>
+                <a:latin typeface="Consolas" panose="020B0609020204030204" pitchFamily="49" charset="0"/>
+              </a:rPr>
+              <a:t>Projects work best when they are small and focussed. </a:t>
+            </a:r>
+          </a:p>
+          <a:p>
+            <a:pPr marL="158750" indent="0">
+              <a:buNone/>
+            </a:pPr>
             <a:endParaRPr lang="en-GB" dirty="0"/>
           </a:p>
         </p:txBody>
@@ -944,6 +1101,37 @@
             <a:noAutofit/>
           </a:bodyPr>
           <a:lstStyle/>
+          <a:p>
+            <a:pPr marL="0" marR="0" lvl="0" indent="0" algn="l" defTabSz="914400" rtl="0" eaLnBrk="1" fontAlgn="auto" latinLnBrk="0" hangingPunct="1">
+              <a:lnSpc>
+                <a:spcPct val="100000"/>
+              </a:lnSpc>
+              <a:spcBef>
+                <a:spcPts val="0"/>
+              </a:spcBef>
+              <a:spcAft>
+                <a:spcPts val="0"/>
+              </a:spcAft>
+              <a:buClr>
+                <a:srgbClr val="000000"/>
+              </a:buClr>
+              <a:buSzPts val="1100"/>
+              <a:buFont typeface="Arial"/>
+              <a:buNone/>
+              <a:tabLst/>
+              <a:defRPr/>
+            </a:pPr>
+            <a:r>
+              <a:rPr lang="en-GB" b="0" dirty="0">
+                <a:solidFill>
+                  <a:srgbClr val="D4D4D4"/>
+                </a:solidFill>
+                <a:effectLst/>
+                <a:latin typeface="Consolas" panose="020B0609020204030204" pitchFamily="49" charset="0"/>
+              </a:rPr>
+              <a:t>Let's imagine we're looking after the accounting software for our company. It has a web portal, some background service and a database.</a:t>
+            </a:r>
+          </a:p>
           <a:p>
             <a:pPr marL="0" lvl="0" indent="0" algn="l" rtl="0">
               <a:spcBef>
@@ -1054,6 +1242,37 @@
           </a:bodyPr>
           <a:lstStyle/>
           <a:p>
+            <a:pPr marL="0" marR="0" lvl="0" indent="0" algn="l" defTabSz="914400" rtl="0" eaLnBrk="1" fontAlgn="auto" latinLnBrk="0" hangingPunct="1">
+              <a:lnSpc>
+                <a:spcPct val="100000"/>
+              </a:lnSpc>
+              <a:spcBef>
+                <a:spcPts val="0"/>
+              </a:spcBef>
+              <a:spcAft>
+                <a:spcPts val="0"/>
+              </a:spcAft>
+              <a:buClr>
+                <a:srgbClr val="000000"/>
+              </a:buClr>
+              <a:buSzPts val="1100"/>
+              <a:buFont typeface="Arial"/>
+              <a:buNone/>
+              <a:tabLst/>
+              <a:defRPr/>
+            </a:pPr>
+            <a:r>
+              <a:rPr lang="en-GB" b="0" dirty="0">
+                <a:solidFill>
+                  <a:srgbClr val="D4D4D4"/>
+                </a:solidFill>
+                <a:effectLst/>
+                <a:latin typeface="Consolas" panose="020B0609020204030204" pitchFamily="49" charset="0"/>
+              </a:rPr>
+              <a:t>It's tempting to add everything to a single project. However, this temptation should be avoided. We don't want to be re-running database updates every time we tweak to the UI.</a:t>
+            </a:r>
+          </a:p>
+          <a:p>
             <a:pPr marL="0" lvl="0" indent="0" algn="l" rtl="0">
               <a:spcBef>
                 <a:spcPts val="0"/>
@@ -1163,13 +1382,22 @@
           </a:bodyPr>
           <a:lstStyle/>
           <a:p>
-            <a:pPr marL="0" lvl="0" indent="0" algn="l" rtl="0">
-              <a:spcBef>
-                <a:spcPts val="0"/>
-              </a:spcBef>
-              <a:spcAft>
-                <a:spcPts val="0"/>
-              </a:spcAft>
+            <a:pPr marL="158750" indent="0">
+              <a:buNone/>
+            </a:pPr>
+            <a:r>
+              <a:rPr lang="en-GB" b="0" dirty="0">
+                <a:solidFill>
+                  <a:srgbClr val="D4D4D4"/>
+                </a:solidFill>
+                <a:effectLst/>
+                <a:latin typeface="Consolas" panose="020B0609020204030204" pitchFamily="49" charset="0"/>
+              </a:rPr>
+              <a:t>Instead, start by creating a Project Group. Then add separate Projects to that Project Group for each component that can be deployed independently. In-line with the single responsibility principle, and a bias toward loose-coupling, this allows each part to be managed and deployed on its own schedule. </a:t>
+            </a:r>
+          </a:p>
+          <a:p>
+            <a:pPr marL="158750" indent="0">
               <a:buNone/>
             </a:pPr>
             <a:endParaRPr dirty="0"/>
@@ -1272,6 +1500,155 @@
           </a:bodyPr>
           <a:lstStyle/>
           <a:p>
+            <a:pPr marL="0" marR="0" lvl="0" indent="0" algn="l" defTabSz="914400" rtl="0" eaLnBrk="1" fontAlgn="auto" latinLnBrk="0" hangingPunct="1">
+              <a:lnSpc>
+                <a:spcPct val="100000"/>
+              </a:lnSpc>
+              <a:spcBef>
+                <a:spcPts val="0"/>
+              </a:spcBef>
+              <a:spcAft>
+                <a:spcPts val="0"/>
+              </a:spcAft>
+              <a:buClr>
+                <a:srgbClr val="000000"/>
+              </a:buClr>
+              <a:buSzPts val="1100"/>
+              <a:buFont typeface="Arial"/>
+              <a:buNone/>
+              <a:tabLst/>
+              <a:defRPr/>
+            </a:pPr>
+            <a:r>
+              <a:rPr lang="en-GB" b="0" dirty="0">
+                <a:solidFill>
+                  <a:srgbClr val="D4D4D4"/>
+                </a:solidFill>
+                <a:effectLst/>
+                <a:latin typeface="Consolas" panose="020B0609020204030204" pitchFamily="49" charset="0"/>
+              </a:rPr>
+              <a:t>Where it's desirable to deploy everything together, we can create a coordinating Project within the same Project Group.</a:t>
+            </a:r>
+          </a:p>
+          <a:p>
+            <a:pPr marL="0" marR="0" lvl="0" indent="0" algn="l" defTabSz="914400" rtl="0" eaLnBrk="1" fontAlgn="auto" latinLnBrk="0" hangingPunct="1">
+              <a:lnSpc>
+                <a:spcPct val="100000"/>
+              </a:lnSpc>
+              <a:spcBef>
+                <a:spcPts val="0"/>
+              </a:spcBef>
+              <a:spcAft>
+                <a:spcPts val="0"/>
+              </a:spcAft>
+              <a:buClr>
+                <a:srgbClr val="000000"/>
+              </a:buClr>
+              <a:buSzPts val="1100"/>
+              <a:buFont typeface="Arial"/>
+              <a:buNone/>
+              <a:tabLst/>
+              <a:defRPr/>
+            </a:pPr>
+            <a:endParaRPr lang="en-GB" b="0" dirty="0">
+              <a:solidFill>
+                <a:srgbClr val="D4D4D4"/>
+              </a:solidFill>
+              <a:effectLst/>
+              <a:latin typeface="Consolas" panose="020B0609020204030204" pitchFamily="49" charset="0"/>
+            </a:endParaRPr>
+          </a:p>
+          <a:p>
+            <a:pPr marL="0" marR="0" lvl="0" indent="0" algn="l" defTabSz="914400" rtl="0" eaLnBrk="1" fontAlgn="auto" latinLnBrk="0" hangingPunct="1">
+              <a:lnSpc>
+                <a:spcPct val="100000"/>
+              </a:lnSpc>
+              <a:spcBef>
+                <a:spcPts val="0"/>
+              </a:spcBef>
+              <a:spcAft>
+                <a:spcPts val="0"/>
+              </a:spcAft>
+              <a:buClr>
+                <a:srgbClr val="000000"/>
+              </a:buClr>
+              <a:buSzPts val="1100"/>
+              <a:buFont typeface="Arial"/>
+              <a:buNone/>
+              <a:tabLst/>
+              <a:defRPr/>
+            </a:pPr>
+            <a:r>
+              <a:rPr lang="en-GB" b="0" dirty="0">
+                <a:solidFill>
+                  <a:srgbClr val="D4D4D4"/>
+                </a:solidFill>
+                <a:effectLst/>
+                <a:latin typeface="Consolas" panose="020B0609020204030204" pitchFamily="49" charset="0"/>
+              </a:rPr>
+              <a:t>Let's create our first Project and Project Group.</a:t>
+            </a:r>
+          </a:p>
+          <a:p>
+            <a:pPr marL="0" marR="0" lvl="0" indent="0" algn="l" defTabSz="914400" rtl="0" eaLnBrk="1" fontAlgn="auto" latinLnBrk="0" hangingPunct="1">
+              <a:lnSpc>
+                <a:spcPct val="100000"/>
+              </a:lnSpc>
+              <a:spcBef>
+                <a:spcPts val="0"/>
+              </a:spcBef>
+              <a:spcAft>
+                <a:spcPts val="0"/>
+              </a:spcAft>
+              <a:buClr>
+                <a:srgbClr val="000000"/>
+              </a:buClr>
+              <a:buSzPts val="1100"/>
+              <a:buFont typeface="Arial"/>
+              <a:buNone/>
+              <a:tabLst/>
+              <a:defRPr/>
+            </a:pPr>
+            <a:endParaRPr lang="en-GB" b="0" dirty="0">
+              <a:solidFill>
+                <a:srgbClr val="D4D4D4"/>
+              </a:solidFill>
+              <a:effectLst/>
+              <a:latin typeface="Consolas" panose="020B0609020204030204" pitchFamily="49" charset="0"/>
+            </a:endParaRPr>
+          </a:p>
+          <a:p>
+            <a:pPr marL="0" marR="0" lvl="0" indent="0" algn="l" defTabSz="914400" rtl="0" eaLnBrk="1" fontAlgn="auto" latinLnBrk="0" hangingPunct="1">
+              <a:lnSpc>
+                <a:spcPct val="100000"/>
+              </a:lnSpc>
+              <a:spcBef>
+                <a:spcPts val="0"/>
+              </a:spcBef>
+              <a:spcAft>
+                <a:spcPts val="0"/>
+              </a:spcAft>
+              <a:buClr>
+                <a:srgbClr val="000000"/>
+              </a:buClr>
+              <a:buSzPts val="1100"/>
+              <a:buFont typeface="Arial"/>
+              <a:buNone/>
+              <a:tabLst/>
+              <a:defRPr/>
+            </a:pPr>
+            <a:r>
+              <a:rPr lang="en-GB" b="0" dirty="0">
+                <a:solidFill>
+                  <a:srgbClr val="D4D4D4"/>
+                </a:solidFill>
+                <a:effectLst/>
+                <a:latin typeface="Consolas" panose="020B0609020204030204" pitchFamily="49" charset="0"/>
+              </a:rPr>
+              <a:t>DEMO</a:t>
+            </a:r>
+          </a:p>
+          <a:p>
             <a:pPr marL="0" lvl="0" indent="0" algn="l" rtl="0">
               <a:spcBef>
                 <a:spcPts val="0"/>
@@ -1299,6 +1676,231 @@
 </file>
 
 <file path=ppt/notesSlides/notesSlide7.xml><?xml version="1.0" encoding="utf-8"?>
+<p:notes xmlns:a="http://schemas.openxmlformats.org/drawingml/2006/main" xmlns:r="http://schemas.openxmlformats.org/officeDocument/2006/relationships" xmlns:p="http://schemas.openxmlformats.org/presentationml/2006/main">
+  <p:cSld>
+    <p:spTree>
+      <p:nvGrpSpPr>
+        <p:cNvPr id="1" name=""/>
+        <p:cNvGrpSpPr/>
+        <p:nvPr/>
+      </p:nvGrpSpPr>
+      <p:grpSpPr>
+        <a:xfrm>
+          <a:off x="0" y="0"/>
+          <a:ext cx="0" cy="0"/>
+          <a:chOff x="0" y="0"/>
+          <a:chExt cx="0" cy="0"/>
+        </a:xfrm>
+      </p:grpSpPr>
+      <p:sp>
+        <p:nvSpPr>
+          <p:cNvPr id="2" name="Slide Image Placeholder 1"/>
+          <p:cNvSpPr>
+            <a:spLocks noGrp="1" noRot="1" noChangeAspect="1"/>
+          </p:cNvSpPr>
+          <p:nvPr>
+            <p:ph type="sldImg"/>
+          </p:nvPr>
+        </p:nvSpPr>
+        <p:spPr>
+          <a:xfrm>
+            <a:off x="381000" y="685800"/>
+            <a:ext cx="6096000" cy="3429000"/>
+          </a:xfrm>
+        </p:spPr>
+      </p:sp>
+      <p:sp>
+        <p:nvSpPr>
+          <p:cNvPr id="3" name="Notes Placeholder 2"/>
+          <p:cNvSpPr>
+            <a:spLocks noGrp="1"/>
+          </p:cNvSpPr>
+          <p:nvPr>
+            <p:ph type="body" idx="1"/>
+          </p:nvPr>
+        </p:nvSpPr>
+        <p:spPr/>
+        <p:txBody>
+          <a:bodyPr/>
+          <a:lstStyle/>
+          <a:p>
+            <a:pPr marL="158750" indent="0">
+              <a:buNone/>
+            </a:pPr>
+            <a:r>
+              <a:rPr lang="en-GB" b="0" dirty="0">
+                <a:solidFill>
+                  <a:srgbClr val="D4D4D4"/>
+                </a:solidFill>
+                <a:effectLst/>
+                <a:latin typeface="Consolas" panose="020B0609020204030204" pitchFamily="49" charset="0"/>
+              </a:rPr>
+              <a:t>Navigate to the Projects page in the Octopus Deploy interface and click "ADD GROUP", enter a name and click "SAVE".</a:t>
+            </a:r>
+          </a:p>
+          <a:p>
+            <a:pPr marL="158750" indent="0">
+              <a:buNone/>
+            </a:pPr>
+            <a:br>
+              <a:rPr lang="en-GB" b="0" dirty="0">
+                <a:solidFill>
+                  <a:srgbClr val="D4D4D4"/>
+                </a:solidFill>
+                <a:effectLst/>
+                <a:latin typeface="Consolas" panose="020B0609020204030204" pitchFamily="49" charset="0"/>
+              </a:rPr>
+            </a:br>
+            <a:r>
+              <a:rPr lang="en-GB" b="0" dirty="0">
+                <a:solidFill>
+                  <a:srgbClr val="D4D4D4"/>
+                </a:solidFill>
+                <a:effectLst/>
+                <a:latin typeface="Consolas" panose="020B0609020204030204" pitchFamily="49" charset="0"/>
+              </a:rPr>
+              <a:t>[Name is "Fundamentals Demos"]</a:t>
+            </a:r>
+          </a:p>
+          <a:p>
+            <a:pPr marL="158750" indent="0">
+              <a:buNone/>
+            </a:pPr>
+            <a:br>
+              <a:rPr lang="en-GB" b="0" dirty="0">
+                <a:solidFill>
+                  <a:srgbClr val="D4D4D4"/>
+                </a:solidFill>
+                <a:effectLst/>
+                <a:latin typeface="Consolas" panose="020B0609020204030204" pitchFamily="49" charset="0"/>
+              </a:rPr>
+            </a:br>
+            <a:r>
+              <a:rPr lang="en-GB" b="0" dirty="0">
+                <a:solidFill>
+                  <a:srgbClr val="D4D4D4"/>
+                </a:solidFill>
+                <a:effectLst/>
+                <a:latin typeface="Consolas" panose="020B0609020204030204" pitchFamily="49" charset="0"/>
+              </a:rPr>
+              <a:t>Now click "ADD PROJECT", provide a name for this component, and click "SAVE". You've just created your first project.</a:t>
+            </a:r>
+          </a:p>
+          <a:p>
+            <a:pPr marL="158750" indent="0">
+              <a:buNone/>
+            </a:pPr>
+            <a:br>
+              <a:rPr lang="en-GB" b="0" dirty="0">
+                <a:solidFill>
+                  <a:srgbClr val="D4D4D4"/>
+                </a:solidFill>
+                <a:effectLst/>
+                <a:latin typeface="Consolas" panose="020B0609020204030204" pitchFamily="49" charset="0"/>
+              </a:rPr>
+            </a:br>
+            <a:r>
+              <a:rPr lang="en-GB" b="0" dirty="0">
+                <a:solidFill>
+                  <a:srgbClr val="D4D4D4"/>
+                </a:solidFill>
+                <a:effectLst/>
+                <a:latin typeface="Consolas" panose="020B0609020204030204" pitchFamily="49" charset="0"/>
+              </a:rPr>
+              <a:t>[Name is "Random Quotes"]</a:t>
+            </a:r>
+          </a:p>
+          <a:p>
+            <a:pPr marL="158750" indent="0">
+              <a:buNone/>
+            </a:pPr>
+            <a:br>
+              <a:rPr lang="en-GB" b="0" dirty="0">
+                <a:solidFill>
+                  <a:srgbClr val="D4D4D4"/>
+                </a:solidFill>
+                <a:effectLst/>
+                <a:latin typeface="Consolas" panose="020B0609020204030204" pitchFamily="49" charset="0"/>
+              </a:rPr>
+            </a:br>
+            <a:r>
+              <a:rPr lang="en-GB" b="0" dirty="0">
+                <a:solidFill>
+                  <a:srgbClr val="D4D4D4"/>
+                </a:solidFill>
+                <a:effectLst/>
+                <a:latin typeface="Consolas" panose="020B0609020204030204" pitchFamily="49" charset="0"/>
+              </a:rPr>
+              <a:t>Let's start by reviewing the settings for our Project.</a:t>
+            </a:r>
+          </a:p>
+          <a:p>
+            <a:pPr marL="158750" indent="0">
+              <a:buNone/>
+            </a:pPr>
+            <a:br>
+              <a:rPr lang="en-GB" b="0" dirty="0">
+                <a:solidFill>
+                  <a:srgbClr val="D4D4D4"/>
+                </a:solidFill>
+                <a:effectLst/>
+                <a:latin typeface="Consolas" panose="020B0609020204030204" pitchFamily="49" charset="0"/>
+              </a:rPr>
+            </a:br>
+            <a:r>
+              <a:rPr lang="en-GB" b="0" dirty="0">
+                <a:solidFill>
+                  <a:srgbClr val="D4D4D4"/>
+                </a:solidFill>
+                <a:effectLst/>
+                <a:latin typeface="Consolas" panose="020B0609020204030204" pitchFamily="49" charset="0"/>
+              </a:rPr>
+              <a:t>On the settings page we can upload a logo for the Project, and enter a description. The description supports markdown, allowing us to add relevant hyperlinks, such as the source code, build server, documentation pages or whatever else may be useful to Project maintainers.</a:t>
+            </a:r>
+          </a:p>
+          <a:p>
+            <a:pPr marL="158750" indent="0">
+              <a:buNone/>
+            </a:pPr>
+            <a:br>
+              <a:rPr lang="en-GB" b="0" dirty="0">
+                <a:solidFill>
+                  <a:srgbClr val="D4D4D4"/>
+                </a:solidFill>
+                <a:effectLst/>
+                <a:latin typeface="Consolas" panose="020B0609020204030204" pitchFamily="49" charset="0"/>
+              </a:rPr>
+            </a:br>
+            <a:r>
+              <a:rPr lang="en-GB" b="0" dirty="0">
+                <a:solidFill>
+                  <a:srgbClr val="D4D4D4"/>
+                </a:solidFill>
+                <a:effectLst/>
+                <a:latin typeface="Consolas" panose="020B0609020204030204" pitchFamily="49" charset="0"/>
+              </a:rPr>
+              <a:t>After saving the page, we can see that the image and description have been updated, including any hyperlinks.</a:t>
+            </a:r>
+          </a:p>
+          <a:p>
+            <a:endParaRPr lang="en-GB" dirty="0"/>
+          </a:p>
+        </p:txBody>
+      </p:sp>
+    </p:spTree>
+    <p:extLst>
+      <p:ext uri="{BB962C8B-B14F-4D97-AF65-F5344CB8AC3E}">
+        <p14:creationId xmlns:p14="http://schemas.microsoft.com/office/powerpoint/2010/main" val="995955846"/>
+      </p:ext>
+    </p:extLst>
+  </p:cSld>
+  <p:clrMapOvr>
+    <a:masterClrMapping/>
+  </p:clrMapOvr>
+</p:notes>
+</file>
+
+<file path=ppt/notesSlides/notesSlide8.xml><?xml version="1.0" encoding="utf-8"?>
 <p:notes xmlns:a="http://schemas.openxmlformats.org/drawingml/2006/main" xmlns:r="http://schemas.openxmlformats.org/officeDocument/2006/relationships" xmlns:p="http://schemas.openxmlformats.org/presentationml/2006/main" showMasterSp="0" showMasterPhAnim="0">
   <p:cSld>
     <p:spTree>
@@ -1380,6 +1982,149 @@
             <a:noAutofit/>
           </a:bodyPr>
           <a:lstStyle/>
+          <a:p>
+            <a:pPr marL="158750" indent="0">
+              <a:buNone/>
+            </a:pPr>
+            <a:r>
+              <a:rPr lang="en-GB" b="0" dirty="0">
+                <a:solidFill>
+                  <a:srgbClr val="D4D4D4"/>
+                </a:solidFill>
+                <a:effectLst/>
+                <a:latin typeface="Consolas" panose="020B0609020204030204" pitchFamily="49" charset="0"/>
+              </a:rPr>
+              <a:t>Consider the following advice when setting up your own projects:</a:t>
+            </a:r>
+          </a:p>
+          <a:p>
+            <a:pPr marL="158750" indent="0">
+              <a:buNone/>
+            </a:pPr>
+            <a:br>
+              <a:rPr lang="en-GB" b="0" dirty="0">
+                <a:solidFill>
+                  <a:srgbClr val="D4D4D4"/>
+                </a:solidFill>
+                <a:effectLst/>
+                <a:latin typeface="Consolas" panose="020B0609020204030204" pitchFamily="49" charset="0"/>
+              </a:rPr>
+            </a:br>
+            <a:r>
+              <a:rPr lang="en-GB" b="0" dirty="0">
+                <a:solidFill>
+                  <a:srgbClr val="6796E6"/>
+                </a:solidFill>
+                <a:effectLst/>
+                <a:latin typeface="Consolas" panose="020B0609020204030204" pitchFamily="49" charset="0"/>
+              </a:rPr>
+              <a:t>-</a:t>
+            </a:r>
+            <a:r>
+              <a:rPr lang="en-GB" b="0" dirty="0">
+                <a:solidFill>
+                  <a:srgbClr val="D4D4D4"/>
+                </a:solidFill>
+                <a:effectLst/>
+                <a:latin typeface="Consolas" panose="020B0609020204030204" pitchFamily="49" charset="0"/>
+              </a:rPr>
+              <a:t> [Use concise names] Use concise names. Brevity goes a long when naming Projects.</a:t>
+            </a:r>
+          </a:p>
+          <a:p>
+            <a:pPr marL="158750" indent="0">
+              <a:buNone/>
+            </a:pPr>
+            <a:r>
+              <a:rPr lang="en-GB" b="0" dirty="0">
+                <a:solidFill>
+                  <a:srgbClr val="6796E6"/>
+                </a:solidFill>
+                <a:effectLst/>
+                <a:latin typeface="Consolas" panose="020B0609020204030204" pitchFamily="49" charset="0"/>
+              </a:rPr>
+              <a:t>-</a:t>
+            </a:r>
+            <a:r>
+              <a:rPr lang="en-GB" b="0" dirty="0">
+                <a:solidFill>
+                  <a:srgbClr val="D4D4D4"/>
+                </a:solidFill>
+                <a:effectLst/>
+                <a:latin typeface="Consolas" panose="020B0609020204030204" pitchFamily="49" charset="0"/>
+              </a:rPr>
+              <a:t> [Automate all the things] Aim to automate the </a:t>
+            </a:r>
+            <a:r>
+              <a:rPr lang="en-GB" b="0" dirty="0" err="1">
+                <a:solidFill>
+                  <a:srgbClr val="D4D4D4"/>
+                </a:solidFill>
+                <a:effectLst/>
+                <a:latin typeface="Consolas" panose="020B0609020204030204" pitchFamily="49" charset="0"/>
+              </a:rPr>
+              <a:t>deployent</a:t>
+            </a:r>
+            <a:r>
+              <a:rPr lang="en-GB" b="0" dirty="0">
+                <a:solidFill>
+                  <a:srgbClr val="D4D4D4"/>
+                </a:solidFill>
+                <a:effectLst/>
+                <a:latin typeface="Consolas" panose="020B0609020204030204" pitchFamily="49" charset="0"/>
+              </a:rPr>
+              <a:t> of every part of the system. If the website updates are automated through Octopus, but deployments are regularly blocked on manual database updates, you'll need to automate the database steps to unleash Octopus's full potential.</a:t>
+            </a:r>
+          </a:p>
+          <a:p>
+            <a:pPr marL="158750" indent="0">
+              <a:buNone/>
+            </a:pPr>
+            <a:r>
+              <a:rPr lang="en-GB" b="0" dirty="0">
+                <a:solidFill>
+                  <a:srgbClr val="6796E6"/>
+                </a:solidFill>
+                <a:effectLst/>
+                <a:latin typeface="Consolas" panose="020B0609020204030204" pitchFamily="49" charset="0"/>
+              </a:rPr>
+              <a:t>-</a:t>
+            </a:r>
+            <a:r>
+              <a:rPr lang="en-GB" b="0" dirty="0">
+                <a:solidFill>
+                  <a:srgbClr val="D4D4D4"/>
+                </a:solidFill>
+                <a:effectLst/>
+                <a:latin typeface="Consolas" panose="020B0609020204030204" pitchFamily="49" charset="0"/>
+              </a:rPr>
+              <a:t> [Break up big projects] If separate components of a system can be deployed independently, break them up into separate projects. Smaller projects are simpler, easier to govern and maintain, and both faster and safer to deploy.</a:t>
+            </a:r>
+          </a:p>
+          <a:p>
+            <a:pPr marL="158750" indent="0">
+              <a:buNone/>
+            </a:pPr>
+            <a:br>
+              <a:rPr lang="en-GB" b="0" dirty="0">
+                <a:solidFill>
+                  <a:srgbClr val="D4D4D4"/>
+                </a:solidFill>
+                <a:effectLst/>
+                <a:latin typeface="Consolas" panose="020B0609020204030204" pitchFamily="49" charset="0"/>
+              </a:rPr>
+            </a:br>
+            <a:r>
+              <a:rPr lang="en-GB" b="0" dirty="0">
+                <a:solidFill>
+                  <a:srgbClr val="D4D4D4"/>
+                </a:solidFill>
+                <a:effectLst/>
+                <a:latin typeface="Consolas" panose="020B0609020204030204" pitchFamily="49" charset="0"/>
+              </a:rPr>
+              <a:t>Thanks for watching, and happy deployments!</a:t>
+            </a:r>
+          </a:p>
           <a:p>
             <a:pPr marL="158750" indent="0">
               <a:buNone/>
@@ -6181,13 +6926,13 @@
   <p:clrMapOvr>
     <a:masterClrMapping/>
   </p:clrMapOvr>
-  <mc:AlternateContent xmlns:mc="http://schemas.openxmlformats.org/markup-compatibility/2006">
-    <mc:Choice xmlns:p14="http://schemas.microsoft.com/office/powerpoint/2010/main" Requires="p14">
+  <mc:AlternateContent xmlns:mc="http://schemas.openxmlformats.org/markup-compatibility/2006" xmlns:p14="http://schemas.microsoft.com/office/powerpoint/2010/main">
+    <mc:Choice Requires="p14">
       <p:transition spd="med" p14:dur="700">
         <p:fade/>
       </p:transition>
     </mc:Choice>
-    <mc:Fallback>
+    <mc:Fallback xmlns="">
       <p:transition spd="med">
         <p:fade/>
       </p:transition>
@@ -6250,13 +6995,13 @@
   <p:clrMapOvr>
     <a:masterClrMapping/>
   </p:clrMapOvr>
-  <mc:AlternateContent xmlns:mc="http://schemas.openxmlformats.org/markup-compatibility/2006">
-    <mc:Choice xmlns:p14="http://schemas.microsoft.com/office/powerpoint/2010/main" Requires="p14">
+  <mc:AlternateContent xmlns:mc="http://schemas.openxmlformats.org/markup-compatibility/2006" xmlns:p14="http://schemas.microsoft.com/office/powerpoint/2010/main">
+    <mc:Choice Requires="p14">
       <p:transition spd="med" p14:dur="700">
         <p:fade/>
       </p:transition>
     </mc:Choice>
-    <mc:Fallback>
+    <mc:Fallback xmlns="">
       <p:transition spd="med">
         <p:fade/>
       </p:transition>
@@ -6465,300 +7210,6 @@
           </a:p>
         </p:txBody>
       </p:sp>
-      <p:sp>
-        <p:nvSpPr>
-          <p:cNvPr id="6" name="Rectangle 5">
-            <a:extLst>
-              <a:ext uri="{FF2B5EF4-FFF2-40B4-BE49-F238E27FC236}">
-                <a16:creationId xmlns:a16="http://schemas.microsoft.com/office/drawing/2014/main" id="{7ECADFE4-6284-40CF-A1D9-75FE6FDFA479}"/>
-              </a:ext>
-            </a:extLst>
-          </p:cNvPr>
-          <p:cNvSpPr/>
-          <p:nvPr/>
-        </p:nvSpPr>
-        <p:spPr>
-          <a:xfrm>
-            <a:off x="-3734770" y="867307"/>
-            <a:ext cx="2571512" cy="892911"/>
-          </a:xfrm>
-          <a:prstGeom prst="rect">
-            <a:avLst/>
-          </a:prstGeom>
-          <a:solidFill>
-            <a:srgbClr val="00CC65"/>
-          </a:solidFill>
-          <a:ln w="76200">
-            <a:solidFill>
-              <a:schemeClr val="bg1"/>
-            </a:solidFill>
-            <a:miter lim="800000"/>
-          </a:ln>
-        </p:spPr>
-        <p:style>
-          <a:lnRef idx="2">
-            <a:schemeClr val="accent1">
-              <a:shade val="50000"/>
-            </a:schemeClr>
-          </a:lnRef>
-          <a:fillRef idx="1">
-            <a:schemeClr val="accent1"/>
-          </a:fillRef>
-          <a:effectRef idx="0">
-            <a:schemeClr val="accent1"/>
-          </a:effectRef>
-          <a:fontRef idx="minor">
-            <a:schemeClr val="lt1"/>
-          </a:fontRef>
-        </p:style>
-        <p:txBody>
-          <a:bodyPr rtlCol="0" anchor="t"/>
-          <a:lstStyle/>
-          <a:p>
-            <a:r>
-              <a:rPr lang="en-GB" sz="1100" b="1" dirty="0">
-                <a:latin typeface="Consolas" panose="020B0609020204030204" pitchFamily="49" charset="0"/>
-              </a:rPr>
-              <a:t>Target: Web02</a:t>
-            </a:r>
-          </a:p>
-          <a:p>
-            <a:r>
-              <a:rPr lang="en-GB" sz="1100" b="1" dirty="0">
-                <a:latin typeface="Consolas" panose="020B0609020204030204" pitchFamily="49" charset="0"/>
-              </a:rPr>
-              <a:t>Roles:</a:t>
-            </a:r>
-            <a:r>
-              <a:rPr lang="en-GB" sz="300" b="1" dirty="0">
-                <a:latin typeface="Consolas" panose="020B0609020204030204" pitchFamily="49" charset="0"/>
-              </a:rPr>
-              <a:t> </a:t>
-            </a:r>
-            <a:endParaRPr lang="en-GB" sz="1100" b="1" dirty="0">
-              <a:latin typeface="Consolas" panose="020B0609020204030204" pitchFamily="49" charset="0"/>
-            </a:endParaRPr>
-          </a:p>
-          <a:p>
-            <a:r>
-              <a:rPr lang="en-GB" sz="1100" b="1" dirty="0" err="1">
-                <a:solidFill>
-                  <a:srgbClr val="FFFF00"/>
-                </a:solidFill>
-                <a:latin typeface="Consolas" panose="020B0609020204030204" pitchFamily="49" charset="0"/>
-              </a:rPr>
-              <a:t>WebServer</a:t>
-            </a:r>
-            <a:endParaRPr lang="en-GB" sz="1100" b="1" dirty="0">
-              <a:solidFill>
-                <a:srgbClr val="FFFF00"/>
-              </a:solidFill>
-              <a:latin typeface="Consolas" panose="020B0609020204030204" pitchFamily="49" charset="0"/>
-            </a:endParaRPr>
-          </a:p>
-          <a:p>
-            <a:endParaRPr lang="en-GB" sz="1100" dirty="0">
-              <a:latin typeface="Consolas" panose="020B0609020204030204" pitchFamily="49" charset="0"/>
-            </a:endParaRPr>
-          </a:p>
-        </p:txBody>
-      </p:sp>
-      <p:sp>
-        <p:nvSpPr>
-          <p:cNvPr id="7" name="Rectangle 6">
-            <a:extLst>
-              <a:ext uri="{FF2B5EF4-FFF2-40B4-BE49-F238E27FC236}">
-                <a16:creationId xmlns:a16="http://schemas.microsoft.com/office/drawing/2014/main" id="{97423E62-1D0A-45F2-A76F-1D2484112914}"/>
-              </a:ext>
-            </a:extLst>
-          </p:cNvPr>
-          <p:cNvSpPr/>
-          <p:nvPr/>
-        </p:nvSpPr>
-        <p:spPr>
-          <a:xfrm>
-            <a:off x="-3517602" y="3658485"/>
-            <a:ext cx="2571514" cy="917722"/>
-          </a:xfrm>
-          <a:prstGeom prst="rect">
-            <a:avLst/>
-          </a:prstGeom>
-          <a:solidFill>
-            <a:srgbClr val="2F93E0"/>
-          </a:solidFill>
-          <a:ln w="76200">
-            <a:solidFill>
-              <a:schemeClr val="bg1"/>
-            </a:solidFill>
-            <a:miter lim="800000"/>
-          </a:ln>
-        </p:spPr>
-        <p:style>
-          <a:lnRef idx="2">
-            <a:schemeClr val="accent1">
-              <a:shade val="50000"/>
-            </a:schemeClr>
-          </a:lnRef>
-          <a:fillRef idx="1">
-            <a:schemeClr val="accent1"/>
-          </a:fillRef>
-          <a:effectRef idx="0">
-            <a:schemeClr val="accent1"/>
-          </a:effectRef>
-          <a:fontRef idx="minor">
-            <a:schemeClr val="lt1"/>
-          </a:fontRef>
-        </p:style>
-        <p:txBody>
-          <a:bodyPr rtlCol="0" anchor="t"/>
-          <a:lstStyle/>
-          <a:p>
-            <a:r>
-              <a:rPr lang="en-GB" sz="1100" dirty="0">
-                <a:latin typeface="Consolas" panose="020B0609020204030204" pitchFamily="49" charset="0"/>
-              </a:rPr>
-              <a:t>Target: DB02</a:t>
-            </a:r>
-          </a:p>
-          <a:p>
-            <a:r>
-              <a:rPr lang="en-GB" sz="300" dirty="0">
-                <a:latin typeface="Consolas" panose="020B0609020204030204" pitchFamily="49" charset="0"/>
-              </a:rPr>
-              <a:t> </a:t>
-            </a:r>
-            <a:r>
-              <a:rPr lang="en-GB" sz="1100" dirty="0">
-                <a:latin typeface="Consolas" panose="020B0609020204030204" pitchFamily="49" charset="0"/>
-              </a:rPr>
-              <a:t>Roles:</a:t>
-            </a:r>
-            <a:r>
-              <a:rPr lang="en-GB" sz="300" dirty="0">
-                <a:latin typeface="Consolas" panose="020B0609020204030204" pitchFamily="49" charset="0"/>
-              </a:rPr>
-              <a:t> </a:t>
-            </a:r>
-            <a:endParaRPr lang="en-GB" sz="1100" dirty="0">
-              <a:latin typeface="Consolas" panose="020B0609020204030204" pitchFamily="49" charset="0"/>
-            </a:endParaRPr>
-          </a:p>
-          <a:p>
-            <a:r>
-              <a:rPr lang="en-GB" sz="1100" dirty="0">
-                <a:solidFill>
-                  <a:schemeClr val="accent6"/>
-                </a:solidFill>
-                <a:latin typeface="Consolas" panose="020B0609020204030204" pitchFamily="49" charset="0"/>
-              </a:rPr>
-              <a:t>Database</a:t>
-            </a:r>
-          </a:p>
-          <a:p>
-            <a:endParaRPr lang="en-GB" sz="1100" dirty="0">
-              <a:latin typeface="Consolas" panose="020B0609020204030204" pitchFamily="49" charset="0"/>
-            </a:endParaRPr>
-          </a:p>
-        </p:txBody>
-      </p:sp>
-      <p:sp>
-        <p:nvSpPr>
-          <p:cNvPr id="9" name="Rectangle 8">
-            <a:extLst>
-              <a:ext uri="{FF2B5EF4-FFF2-40B4-BE49-F238E27FC236}">
-                <a16:creationId xmlns:a16="http://schemas.microsoft.com/office/drawing/2014/main" id="{708F42E3-02CA-44D3-9683-0CADB846FD68}"/>
-              </a:ext>
-            </a:extLst>
-          </p:cNvPr>
-          <p:cNvSpPr/>
-          <p:nvPr/>
-        </p:nvSpPr>
-        <p:spPr>
-          <a:xfrm>
-            <a:off x="-3833226" y="2416071"/>
-            <a:ext cx="2571512" cy="892911"/>
-          </a:xfrm>
-          <a:prstGeom prst="rect">
-            <a:avLst/>
-          </a:prstGeom>
-          <a:solidFill>
-            <a:srgbClr val="00CC65"/>
-          </a:solidFill>
-          <a:ln w="76200">
-            <a:solidFill>
-              <a:schemeClr val="bg1"/>
-            </a:solidFill>
-            <a:miter lim="800000"/>
-          </a:ln>
-        </p:spPr>
-        <p:style>
-          <a:lnRef idx="2">
-            <a:schemeClr val="accent1">
-              <a:shade val="50000"/>
-            </a:schemeClr>
-          </a:lnRef>
-          <a:fillRef idx="1">
-            <a:schemeClr val="accent1"/>
-          </a:fillRef>
-          <a:effectRef idx="0">
-            <a:schemeClr val="accent1"/>
-          </a:effectRef>
-          <a:fontRef idx="minor">
-            <a:schemeClr val="lt1"/>
-          </a:fontRef>
-        </p:style>
-        <p:txBody>
-          <a:bodyPr rtlCol="0" anchor="t"/>
-          <a:lstStyle/>
-          <a:p>
-            <a:r>
-              <a:rPr lang="en-GB" sz="1100" b="1" dirty="0">
-                <a:latin typeface="Consolas" panose="020B0609020204030204" pitchFamily="49" charset="0"/>
-              </a:rPr>
-              <a:t>Target: Web03</a:t>
-            </a:r>
-          </a:p>
-          <a:p>
-            <a:r>
-              <a:rPr lang="en-GB" sz="1100" b="1" dirty="0">
-                <a:latin typeface="Consolas" panose="020B0609020204030204" pitchFamily="49" charset="0"/>
-              </a:rPr>
-              <a:t>Roles:</a:t>
-            </a:r>
-            <a:r>
-              <a:rPr lang="en-GB" sz="300" b="1" dirty="0">
-                <a:latin typeface="Consolas" panose="020B0609020204030204" pitchFamily="49" charset="0"/>
-              </a:rPr>
-              <a:t> </a:t>
-            </a:r>
-            <a:endParaRPr lang="en-GB" sz="1100" b="1" dirty="0">
-              <a:latin typeface="Consolas" panose="020B0609020204030204" pitchFamily="49" charset="0"/>
-            </a:endParaRPr>
-          </a:p>
-          <a:p>
-            <a:r>
-              <a:rPr lang="en-GB" sz="1100" b="1" dirty="0" err="1">
-                <a:solidFill>
-                  <a:srgbClr val="FFFF00"/>
-                </a:solidFill>
-                <a:latin typeface="Consolas" panose="020B0609020204030204" pitchFamily="49" charset="0"/>
-              </a:rPr>
-              <a:t>WebServer</a:t>
-            </a:r>
-            <a:endParaRPr lang="en-GB" sz="1100" b="1" dirty="0">
-              <a:solidFill>
-                <a:srgbClr val="FFFF00"/>
-              </a:solidFill>
-              <a:latin typeface="Consolas" panose="020B0609020204030204" pitchFamily="49" charset="0"/>
-            </a:endParaRPr>
-          </a:p>
-          <a:p>
-            <a:endParaRPr lang="en-GB" sz="1100" dirty="0">
-              <a:latin typeface="Consolas" panose="020B0609020204030204" pitchFamily="49" charset="0"/>
-            </a:endParaRPr>
-          </a:p>
-        </p:txBody>
-      </p:sp>
       <p:pic>
         <p:nvPicPr>
           <p:cNvPr id="10" name="Graphic 9" descr="Internet with solid fill">
@@ -6877,13 +7328,13 @@
   <p:clrMapOvr>
     <a:masterClrMapping/>
   </p:clrMapOvr>
-  <mc:AlternateContent xmlns:mc="http://schemas.openxmlformats.org/markup-compatibility/2006">
-    <mc:Choice xmlns:p14="http://schemas.microsoft.com/office/powerpoint/2010/main" Requires="p14">
+  <mc:AlternateContent xmlns:mc="http://schemas.openxmlformats.org/markup-compatibility/2006" xmlns:p14="http://schemas.microsoft.com/office/powerpoint/2010/main">
+    <mc:Choice Requires="p14">
       <p:transition spd="med" p14:dur="700">
         <p:fade/>
       </p:transition>
     </mc:Choice>
-    <mc:Fallback>
+    <mc:Fallback xmlns="">
       <p:transition spd="med">
         <p:fade/>
       </p:transition>
@@ -7155,300 +7606,6 @@
           </a:p>
         </p:txBody>
       </p:sp>
-      <p:sp>
-        <p:nvSpPr>
-          <p:cNvPr id="6" name="Rectangle 5">
-            <a:extLst>
-              <a:ext uri="{FF2B5EF4-FFF2-40B4-BE49-F238E27FC236}">
-                <a16:creationId xmlns:a16="http://schemas.microsoft.com/office/drawing/2014/main" id="{7ECADFE4-6284-40CF-A1D9-75FE6FDFA479}"/>
-              </a:ext>
-            </a:extLst>
-          </p:cNvPr>
-          <p:cNvSpPr/>
-          <p:nvPr/>
-        </p:nvSpPr>
-        <p:spPr>
-          <a:xfrm>
-            <a:off x="-3734770" y="867307"/>
-            <a:ext cx="2571512" cy="892911"/>
-          </a:xfrm>
-          <a:prstGeom prst="rect">
-            <a:avLst/>
-          </a:prstGeom>
-          <a:solidFill>
-            <a:srgbClr val="00CC65"/>
-          </a:solidFill>
-          <a:ln w="76200">
-            <a:solidFill>
-              <a:schemeClr val="bg1"/>
-            </a:solidFill>
-            <a:miter lim="800000"/>
-          </a:ln>
-        </p:spPr>
-        <p:style>
-          <a:lnRef idx="2">
-            <a:schemeClr val="accent1">
-              <a:shade val="50000"/>
-            </a:schemeClr>
-          </a:lnRef>
-          <a:fillRef idx="1">
-            <a:schemeClr val="accent1"/>
-          </a:fillRef>
-          <a:effectRef idx="0">
-            <a:schemeClr val="accent1"/>
-          </a:effectRef>
-          <a:fontRef idx="minor">
-            <a:schemeClr val="lt1"/>
-          </a:fontRef>
-        </p:style>
-        <p:txBody>
-          <a:bodyPr rtlCol="0" anchor="t"/>
-          <a:lstStyle/>
-          <a:p>
-            <a:r>
-              <a:rPr lang="en-GB" sz="1100" b="1" dirty="0">
-                <a:latin typeface="Consolas" panose="020B0609020204030204" pitchFamily="49" charset="0"/>
-              </a:rPr>
-              <a:t>Target: Web02</a:t>
-            </a:r>
-          </a:p>
-          <a:p>
-            <a:r>
-              <a:rPr lang="en-GB" sz="1100" b="1" dirty="0">
-                <a:latin typeface="Consolas" panose="020B0609020204030204" pitchFamily="49" charset="0"/>
-              </a:rPr>
-              <a:t>Roles:</a:t>
-            </a:r>
-            <a:r>
-              <a:rPr lang="en-GB" sz="300" b="1" dirty="0">
-                <a:latin typeface="Consolas" panose="020B0609020204030204" pitchFamily="49" charset="0"/>
-              </a:rPr>
-              <a:t> </a:t>
-            </a:r>
-            <a:endParaRPr lang="en-GB" sz="1100" b="1" dirty="0">
-              <a:latin typeface="Consolas" panose="020B0609020204030204" pitchFamily="49" charset="0"/>
-            </a:endParaRPr>
-          </a:p>
-          <a:p>
-            <a:r>
-              <a:rPr lang="en-GB" sz="1100" b="1" dirty="0" err="1">
-                <a:solidFill>
-                  <a:srgbClr val="FFFF00"/>
-                </a:solidFill>
-                <a:latin typeface="Consolas" panose="020B0609020204030204" pitchFamily="49" charset="0"/>
-              </a:rPr>
-              <a:t>WebServer</a:t>
-            </a:r>
-            <a:endParaRPr lang="en-GB" sz="1100" b="1" dirty="0">
-              <a:solidFill>
-                <a:srgbClr val="FFFF00"/>
-              </a:solidFill>
-              <a:latin typeface="Consolas" panose="020B0609020204030204" pitchFamily="49" charset="0"/>
-            </a:endParaRPr>
-          </a:p>
-          <a:p>
-            <a:endParaRPr lang="en-GB" sz="1100" dirty="0">
-              <a:latin typeface="Consolas" panose="020B0609020204030204" pitchFamily="49" charset="0"/>
-            </a:endParaRPr>
-          </a:p>
-        </p:txBody>
-      </p:sp>
-      <p:sp>
-        <p:nvSpPr>
-          <p:cNvPr id="7" name="Rectangle 6">
-            <a:extLst>
-              <a:ext uri="{FF2B5EF4-FFF2-40B4-BE49-F238E27FC236}">
-                <a16:creationId xmlns:a16="http://schemas.microsoft.com/office/drawing/2014/main" id="{97423E62-1D0A-45F2-A76F-1D2484112914}"/>
-              </a:ext>
-            </a:extLst>
-          </p:cNvPr>
-          <p:cNvSpPr/>
-          <p:nvPr/>
-        </p:nvSpPr>
-        <p:spPr>
-          <a:xfrm>
-            <a:off x="-3517602" y="3658485"/>
-            <a:ext cx="2571514" cy="917722"/>
-          </a:xfrm>
-          <a:prstGeom prst="rect">
-            <a:avLst/>
-          </a:prstGeom>
-          <a:solidFill>
-            <a:srgbClr val="2F93E0"/>
-          </a:solidFill>
-          <a:ln w="76200">
-            <a:solidFill>
-              <a:schemeClr val="bg1"/>
-            </a:solidFill>
-            <a:miter lim="800000"/>
-          </a:ln>
-        </p:spPr>
-        <p:style>
-          <a:lnRef idx="2">
-            <a:schemeClr val="accent1">
-              <a:shade val="50000"/>
-            </a:schemeClr>
-          </a:lnRef>
-          <a:fillRef idx="1">
-            <a:schemeClr val="accent1"/>
-          </a:fillRef>
-          <a:effectRef idx="0">
-            <a:schemeClr val="accent1"/>
-          </a:effectRef>
-          <a:fontRef idx="minor">
-            <a:schemeClr val="lt1"/>
-          </a:fontRef>
-        </p:style>
-        <p:txBody>
-          <a:bodyPr rtlCol="0" anchor="t"/>
-          <a:lstStyle/>
-          <a:p>
-            <a:r>
-              <a:rPr lang="en-GB" sz="1100" dirty="0">
-                <a:latin typeface="Consolas" panose="020B0609020204030204" pitchFamily="49" charset="0"/>
-              </a:rPr>
-              <a:t>Target: DB02</a:t>
-            </a:r>
-          </a:p>
-          <a:p>
-            <a:r>
-              <a:rPr lang="en-GB" sz="300" dirty="0">
-                <a:latin typeface="Consolas" panose="020B0609020204030204" pitchFamily="49" charset="0"/>
-              </a:rPr>
-              <a:t> </a:t>
-            </a:r>
-            <a:r>
-              <a:rPr lang="en-GB" sz="1100" dirty="0">
-                <a:latin typeface="Consolas" panose="020B0609020204030204" pitchFamily="49" charset="0"/>
-              </a:rPr>
-              <a:t>Roles:</a:t>
-            </a:r>
-            <a:r>
-              <a:rPr lang="en-GB" sz="300" dirty="0">
-                <a:latin typeface="Consolas" panose="020B0609020204030204" pitchFamily="49" charset="0"/>
-              </a:rPr>
-              <a:t> </a:t>
-            </a:r>
-            <a:endParaRPr lang="en-GB" sz="1100" dirty="0">
-              <a:latin typeface="Consolas" panose="020B0609020204030204" pitchFamily="49" charset="0"/>
-            </a:endParaRPr>
-          </a:p>
-          <a:p>
-            <a:r>
-              <a:rPr lang="en-GB" sz="1100" dirty="0">
-                <a:solidFill>
-                  <a:schemeClr val="accent6"/>
-                </a:solidFill>
-                <a:latin typeface="Consolas" panose="020B0609020204030204" pitchFamily="49" charset="0"/>
-              </a:rPr>
-              <a:t>Database</a:t>
-            </a:r>
-          </a:p>
-          <a:p>
-            <a:endParaRPr lang="en-GB" sz="1100" dirty="0">
-              <a:latin typeface="Consolas" panose="020B0609020204030204" pitchFamily="49" charset="0"/>
-            </a:endParaRPr>
-          </a:p>
-        </p:txBody>
-      </p:sp>
-      <p:sp>
-        <p:nvSpPr>
-          <p:cNvPr id="9" name="Rectangle 8">
-            <a:extLst>
-              <a:ext uri="{FF2B5EF4-FFF2-40B4-BE49-F238E27FC236}">
-                <a16:creationId xmlns:a16="http://schemas.microsoft.com/office/drawing/2014/main" id="{708F42E3-02CA-44D3-9683-0CADB846FD68}"/>
-              </a:ext>
-            </a:extLst>
-          </p:cNvPr>
-          <p:cNvSpPr/>
-          <p:nvPr/>
-        </p:nvSpPr>
-        <p:spPr>
-          <a:xfrm>
-            <a:off x="-3833226" y="2416071"/>
-            <a:ext cx="2571512" cy="892911"/>
-          </a:xfrm>
-          <a:prstGeom prst="rect">
-            <a:avLst/>
-          </a:prstGeom>
-          <a:solidFill>
-            <a:srgbClr val="00CC65"/>
-          </a:solidFill>
-          <a:ln w="76200">
-            <a:solidFill>
-              <a:schemeClr val="bg1"/>
-            </a:solidFill>
-            <a:miter lim="800000"/>
-          </a:ln>
-        </p:spPr>
-        <p:style>
-          <a:lnRef idx="2">
-            <a:schemeClr val="accent1">
-              <a:shade val="50000"/>
-            </a:schemeClr>
-          </a:lnRef>
-          <a:fillRef idx="1">
-            <a:schemeClr val="accent1"/>
-          </a:fillRef>
-          <a:effectRef idx="0">
-            <a:schemeClr val="accent1"/>
-          </a:effectRef>
-          <a:fontRef idx="minor">
-            <a:schemeClr val="lt1"/>
-          </a:fontRef>
-        </p:style>
-        <p:txBody>
-          <a:bodyPr rtlCol="0" anchor="t"/>
-          <a:lstStyle/>
-          <a:p>
-            <a:r>
-              <a:rPr lang="en-GB" sz="1100" b="1" dirty="0">
-                <a:latin typeface="Consolas" panose="020B0609020204030204" pitchFamily="49" charset="0"/>
-              </a:rPr>
-              <a:t>Target: Web03</a:t>
-            </a:r>
-          </a:p>
-          <a:p>
-            <a:r>
-              <a:rPr lang="en-GB" sz="1100" b="1" dirty="0">
-                <a:latin typeface="Consolas" panose="020B0609020204030204" pitchFamily="49" charset="0"/>
-              </a:rPr>
-              <a:t>Roles:</a:t>
-            </a:r>
-            <a:r>
-              <a:rPr lang="en-GB" sz="300" b="1" dirty="0">
-                <a:latin typeface="Consolas" panose="020B0609020204030204" pitchFamily="49" charset="0"/>
-              </a:rPr>
-              <a:t> </a:t>
-            </a:r>
-            <a:endParaRPr lang="en-GB" sz="1100" b="1" dirty="0">
-              <a:latin typeface="Consolas" panose="020B0609020204030204" pitchFamily="49" charset="0"/>
-            </a:endParaRPr>
-          </a:p>
-          <a:p>
-            <a:r>
-              <a:rPr lang="en-GB" sz="1100" b="1" dirty="0" err="1">
-                <a:solidFill>
-                  <a:srgbClr val="FFFF00"/>
-                </a:solidFill>
-                <a:latin typeface="Consolas" panose="020B0609020204030204" pitchFamily="49" charset="0"/>
-              </a:rPr>
-              <a:t>WebServer</a:t>
-            </a:r>
-            <a:endParaRPr lang="en-GB" sz="1100" b="1" dirty="0">
-              <a:solidFill>
-                <a:srgbClr val="FFFF00"/>
-              </a:solidFill>
-              <a:latin typeface="Consolas" panose="020B0609020204030204" pitchFamily="49" charset="0"/>
-            </a:endParaRPr>
-          </a:p>
-          <a:p>
-            <a:endParaRPr lang="en-GB" sz="1100" dirty="0">
-              <a:latin typeface="Consolas" panose="020B0609020204030204" pitchFamily="49" charset="0"/>
-            </a:endParaRPr>
-          </a:p>
-        </p:txBody>
-      </p:sp>
       <p:pic>
         <p:nvPicPr>
           <p:cNvPr id="10" name="Graphic 9" descr="Internet with solid fill">
@@ -7567,13 +7724,13 @@
   <p:clrMapOvr>
     <a:masterClrMapping/>
   </p:clrMapOvr>
-  <mc:AlternateContent xmlns:mc="http://schemas.openxmlformats.org/markup-compatibility/2006">
-    <mc:Choice xmlns:p14="http://schemas.microsoft.com/office/powerpoint/2010/main" Requires="p14">
+  <mc:AlternateContent xmlns:mc="http://schemas.openxmlformats.org/markup-compatibility/2006" xmlns:p14="http://schemas.microsoft.com/office/powerpoint/2010/main">
+    <mc:Choice Requires="p14">
       <p:transition spd="med" p14:dur="700">
         <p:fade/>
       </p:transition>
     </mc:Choice>
-    <mc:Fallback>
+    <mc:Fallback xmlns="">
       <p:transition spd="med">
         <p:fade/>
       </p:transition>
@@ -7877,300 +8034,6 @@
           </a:p>
         </p:txBody>
       </p:sp>
-      <p:sp>
-        <p:nvSpPr>
-          <p:cNvPr id="6" name="Rectangle 5">
-            <a:extLst>
-              <a:ext uri="{FF2B5EF4-FFF2-40B4-BE49-F238E27FC236}">
-                <a16:creationId xmlns:a16="http://schemas.microsoft.com/office/drawing/2014/main" id="{7ECADFE4-6284-40CF-A1D9-75FE6FDFA479}"/>
-              </a:ext>
-            </a:extLst>
-          </p:cNvPr>
-          <p:cNvSpPr/>
-          <p:nvPr/>
-        </p:nvSpPr>
-        <p:spPr>
-          <a:xfrm>
-            <a:off x="-3734770" y="867307"/>
-            <a:ext cx="2571512" cy="892911"/>
-          </a:xfrm>
-          <a:prstGeom prst="rect">
-            <a:avLst/>
-          </a:prstGeom>
-          <a:solidFill>
-            <a:srgbClr val="00CC65"/>
-          </a:solidFill>
-          <a:ln w="76200">
-            <a:solidFill>
-              <a:schemeClr val="bg1"/>
-            </a:solidFill>
-            <a:miter lim="800000"/>
-          </a:ln>
-        </p:spPr>
-        <p:style>
-          <a:lnRef idx="2">
-            <a:schemeClr val="accent1">
-              <a:shade val="50000"/>
-            </a:schemeClr>
-          </a:lnRef>
-          <a:fillRef idx="1">
-            <a:schemeClr val="accent1"/>
-          </a:fillRef>
-          <a:effectRef idx="0">
-            <a:schemeClr val="accent1"/>
-          </a:effectRef>
-          <a:fontRef idx="minor">
-            <a:schemeClr val="lt1"/>
-          </a:fontRef>
-        </p:style>
-        <p:txBody>
-          <a:bodyPr rtlCol="0" anchor="t"/>
-          <a:lstStyle/>
-          <a:p>
-            <a:r>
-              <a:rPr lang="en-GB" sz="1100" b="1" dirty="0">
-                <a:latin typeface="Consolas" panose="020B0609020204030204" pitchFamily="49" charset="0"/>
-              </a:rPr>
-              <a:t>Target: Web02</a:t>
-            </a:r>
-          </a:p>
-          <a:p>
-            <a:r>
-              <a:rPr lang="en-GB" sz="1100" b="1" dirty="0">
-                <a:latin typeface="Consolas" panose="020B0609020204030204" pitchFamily="49" charset="0"/>
-              </a:rPr>
-              <a:t>Roles:</a:t>
-            </a:r>
-            <a:r>
-              <a:rPr lang="en-GB" sz="300" b="1" dirty="0">
-                <a:latin typeface="Consolas" panose="020B0609020204030204" pitchFamily="49" charset="0"/>
-              </a:rPr>
-              <a:t> </a:t>
-            </a:r>
-            <a:endParaRPr lang="en-GB" sz="1100" b="1" dirty="0">
-              <a:latin typeface="Consolas" panose="020B0609020204030204" pitchFamily="49" charset="0"/>
-            </a:endParaRPr>
-          </a:p>
-          <a:p>
-            <a:r>
-              <a:rPr lang="en-GB" sz="1100" b="1" dirty="0" err="1">
-                <a:solidFill>
-                  <a:srgbClr val="FFFF00"/>
-                </a:solidFill>
-                <a:latin typeface="Consolas" panose="020B0609020204030204" pitchFamily="49" charset="0"/>
-              </a:rPr>
-              <a:t>WebServer</a:t>
-            </a:r>
-            <a:endParaRPr lang="en-GB" sz="1100" b="1" dirty="0">
-              <a:solidFill>
-                <a:srgbClr val="FFFF00"/>
-              </a:solidFill>
-              <a:latin typeface="Consolas" panose="020B0609020204030204" pitchFamily="49" charset="0"/>
-            </a:endParaRPr>
-          </a:p>
-          <a:p>
-            <a:endParaRPr lang="en-GB" sz="1100" dirty="0">
-              <a:latin typeface="Consolas" panose="020B0609020204030204" pitchFamily="49" charset="0"/>
-            </a:endParaRPr>
-          </a:p>
-        </p:txBody>
-      </p:sp>
-      <p:sp>
-        <p:nvSpPr>
-          <p:cNvPr id="7" name="Rectangle 6">
-            <a:extLst>
-              <a:ext uri="{FF2B5EF4-FFF2-40B4-BE49-F238E27FC236}">
-                <a16:creationId xmlns:a16="http://schemas.microsoft.com/office/drawing/2014/main" id="{97423E62-1D0A-45F2-A76F-1D2484112914}"/>
-              </a:ext>
-            </a:extLst>
-          </p:cNvPr>
-          <p:cNvSpPr/>
-          <p:nvPr/>
-        </p:nvSpPr>
-        <p:spPr>
-          <a:xfrm>
-            <a:off x="-3517602" y="3658485"/>
-            <a:ext cx="2571514" cy="917722"/>
-          </a:xfrm>
-          <a:prstGeom prst="rect">
-            <a:avLst/>
-          </a:prstGeom>
-          <a:solidFill>
-            <a:srgbClr val="2F93E0"/>
-          </a:solidFill>
-          <a:ln w="76200">
-            <a:solidFill>
-              <a:schemeClr val="bg1"/>
-            </a:solidFill>
-            <a:miter lim="800000"/>
-          </a:ln>
-        </p:spPr>
-        <p:style>
-          <a:lnRef idx="2">
-            <a:schemeClr val="accent1">
-              <a:shade val="50000"/>
-            </a:schemeClr>
-          </a:lnRef>
-          <a:fillRef idx="1">
-            <a:schemeClr val="accent1"/>
-          </a:fillRef>
-          <a:effectRef idx="0">
-            <a:schemeClr val="accent1"/>
-          </a:effectRef>
-          <a:fontRef idx="minor">
-            <a:schemeClr val="lt1"/>
-          </a:fontRef>
-        </p:style>
-        <p:txBody>
-          <a:bodyPr rtlCol="0" anchor="t"/>
-          <a:lstStyle/>
-          <a:p>
-            <a:r>
-              <a:rPr lang="en-GB" sz="1100" dirty="0">
-                <a:latin typeface="Consolas" panose="020B0609020204030204" pitchFamily="49" charset="0"/>
-              </a:rPr>
-              <a:t>Target: DB02</a:t>
-            </a:r>
-          </a:p>
-          <a:p>
-            <a:r>
-              <a:rPr lang="en-GB" sz="300" dirty="0">
-                <a:latin typeface="Consolas" panose="020B0609020204030204" pitchFamily="49" charset="0"/>
-              </a:rPr>
-              <a:t> </a:t>
-            </a:r>
-            <a:r>
-              <a:rPr lang="en-GB" sz="1100" dirty="0">
-                <a:latin typeface="Consolas" panose="020B0609020204030204" pitchFamily="49" charset="0"/>
-              </a:rPr>
-              <a:t>Roles:</a:t>
-            </a:r>
-            <a:r>
-              <a:rPr lang="en-GB" sz="300" dirty="0">
-                <a:latin typeface="Consolas" panose="020B0609020204030204" pitchFamily="49" charset="0"/>
-              </a:rPr>
-              <a:t> </a:t>
-            </a:r>
-            <a:endParaRPr lang="en-GB" sz="1100" dirty="0">
-              <a:latin typeface="Consolas" panose="020B0609020204030204" pitchFamily="49" charset="0"/>
-            </a:endParaRPr>
-          </a:p>
-          <a:p>
-            <a:r>
-              <a:rPr lang="en-GB" sz="1100" dirty="0">
-                <a:solidFill>
-                  <a:schemeClr val="accent6"/>
-                </a:solidFill>
-                <a:latin typeface="Consolas" panose="020B0609020204030204" pitchFamily="49" charset="0"/>
-              </a:rPr>
-              <a:t>Database</a:t>
-            </a:r>
-          </a:p>
-          <a:p>
-            <a:endParaRPr lang="en-GB" sz="1100" dirty="0">
-              <a:latin typeface="Consolas" panose="020B0609020204030204" pitchFamily="49" charset="0"/>
-            </a:endParaRPr>
-          </a:p>
-        </p:txBody>
-      </p:sp>
-      <p:sp>
-        <p:nvSpPr>
-          <p:cNvPr id="9" name="Rectangle 8">
-            <a:extLst>
-              <a:ext uri="{FF2B5EF4-FFF2-40B4-BE49-F238E27FC236}">
-                <a16:creationId xmlns:a16="http://schemas.microsoft.com/office/drawing/2014/main" id="{708F42E3-02CA-44D3-9683-0CADB846FD68}"/>
-              </a:ext>
-            </a:extLst>
-          </p:cNvPr>
-          <p:cNvSpPr/>
-          <p:nvPr/>
-        </p:nvSpPr>
-        <p:spPr>
-          <a:xfrm>
-            <a:off x="-3833226" y="2416071"/>
-            <a:ext cx="2571512" cy="892911"/>
-          </a:xfrm>
-          <a:prstGeom prst="rect">
-            <a:avLst/>
-          </a:prstGeom>
-          <a:solidFill>
-            <a:srgbClr val="00CC65"/>
-          </a:solidFill>
-          <a:ln w="76200">
-            <a:solidFill>
-              <a:schemeClr val="bg1"/>
-            </a:solidFill>
-            <a:miter lim="800000"/>
-          </a:ln>
-        </p:spPr>
-        <p:style>
-          <a:lnRef idx="2">
-            <a:schemeClr val="accent1">
-              <a:shade val="50000"/>
-            </a:schemeClr>
-          </a:lnRef>
-          <a:fillRef idx="1">
-            <a:schemeClr val="accent1"/>
-          </a:fillRef>
-          <a:effectRef idx="0">
-            <a:schemeClr val="accent1"/>
-          </a:effectRef>
-          <a:fontRef idx="minor">
-            <a:schemeClr val="lt1"/>
-          </a:fontRef>
-        </p:style>
-        <p:txBody>
-          <a:bodyPr rtlCol="0" anchor="t"/>
-          <a:lstStyle/>
-          <a:p>
-            <a:r>
-              <a:rPr lang="en-GB" sz="1100" b="1" dirty="0">
-                <a:latin typeface="Consolas" panose="020B0609020204030204" pitchFamily="49" charset="0"/>
-              </a:rPr>
-              <a:t>Target: Web03</a:t>
-            </a:r>
-          </a:p>
-          <a:p>
-            <a:r>
-              <a:rPr lang="en-GB" sz="1100" b="1" dirty="0">
-                <a:latin typeface="Consolas" panose="020B0609020204030204" pitchFamily="49" charset="0"/>
-              </a:rPr>
-              <a:t>Roles:</a:t>
-            </a:r>
-            <a:r>
-              <a:rPr lang="en-GB" sz="300" b="1" dirty="0">
-                <a:latin typeface="Consolas" panose="020B0609020204030204" pitchFamily="49" charset="0"/>
-              </a:rPr>
-              <a:t> </a:t>
-            </a:r>
-            <a:endParaRPr lang="en-GB" sz="1100" b="1" dirty="0">
-              <a:latin typeface="Consolas" panose="020B0609020204030204" pitchFamily="49" charset="0"/>
-            </a:endParaRPr>
-          </a:p>
-          <a:p>
-            <a:r>
-              <a:rPr lang="en-GB" sz="1100" b="1" dirty="0" err="1">
-                <a:solidFill>
-                  <a:srgbClr val="FFFF00"/>
-                </a:solidFill>
-                <a:latin typeface="Consolas" panose="020B0609020204030204" pitchFamily="49" charset="0"/>
-              </a:rPr>
-              <a:t>WebServer</a:t>
-            </a:r>
-            <a:endParaRPr lang="en-GB" sz="1100" b="1" dirty="0">
-              <a:solidFill>
-                <a:srgbClr val="FFFF00"/>
-              </a:solidFill>
-              <a:latin typeface="Consolas" panose="020B0609020204030204" pitchFamily="49" charset="0"/>
-            </a:endParaRPr>
-          </a:p>
-          <a:p>
-            <a:endParaRPr lang="en-GB" sz="1100" dirty="0">
-              <a:latin typeface="Consolas" panose="020B0609020204030204" pitchFamily="49" charset="0"/>
-            </a:endParaRPr>
-          </a:p>
-        </p:txBody>
-      </p:sp>
       <p:pic>
         <p:nvPicPr>
           <p:cNvPr id="10" name="Graphic 9" descr="Internet with solid fill">
@@ -8289,13 +8152,13 @@
   <p:clrMapOvr>
     <a:masterClrMapping/>
   </p:clrMapOvr>
-  <mc:AlternateContent xmlns:mc="http://schemas.openxmlformats.org/markup-compatibility/2006">
-    <mc:Choice xmlns:p14="http://schemas.microsoft.com/office/powerpoint/2010/main" Requires="p14">
+  <mc:AlternateContent xmlns:mc="http://schemas.openxmlformats.org/markup-compatibility/2006" xmlns:p14="http://schemas.microsoft.com/office/powerpoint/2010/main">
+    <mc:Choice Requires="p14">
       <p:transition spd="med" p14:dur="700">
         <p:fade/>
       </p:transition>
     </mc:Choice>
-    <mc:Fallback>
+    <mc:Fallback xmlns="">
       <p:transition spd="med">
         <p:fade/>
       </p:transition>
@@ -8599,300 +8462,6 @@
           </a:p>
         </p:txBody>
       </p:sp>
-      <p:sp>
-        <p:nvSpPr>
-          <p:cNvPr id="6" name="Rectangle 5">
-            <a:extLst>
-              <a:ext uri="{FF2B5EF4-FFF2-40B4-BE49-F238E27FC236}">
-                <a16:creationId xmlns:a16="http://schemas.microsoft.com/office/drawing/2014/main" id="{7ECADFE4-6284-40CF-A1D9-75FE6FDFA479}"/>
-              </a:ext>
-            </a:extLst>
-          </p:cNvPr>
-          <p:cNvSpPr/>
-          <p:nvPr/>
-        </p:nvSpPr>
-        <p:spPr>
-          <a:xfrm>
-            <a:off x="-3734770" y="867307"/>
-            <a:ext cx="2571512" cy="892911"/>
-          </a:xfrm>
-          <a:prstGeom prst="rect">
-            <a:avLst/>
-          </a:prstGeom>
-          <a:solidFill>
-            <a:srgbClr val="00CC65"/>
-          </a:solidFill>
-          <a:ln w="76200">
-            <a:solidFill>
-              <a:schemeClr val="bg1"/>
-            </a:solidFill>
-            <a:miter lim="800000"/>
-          </a:ln>
-        </p:spPr>
-        <p:style>
-          <a:lnRef idx="2">
-            <a:schemeClr val="accent1">
-              <a:shade val="50000"/>
-            </a:schemeClr>
-          </a:lnRef>
-          <a:fillRef idx="1">
-            <a:schemeClr val="accent1"/>
-          </a:fillRef>
-          <a:effectRef idx="0">
-            <a:schemeClr val="accent1"/>
-          </a:effectRef>
-          <a:fontRef idx="minor">
-            <a:schemeClr val="lt1"/>
-          </a:fontRef>
-        </p:style>
-        <p:txBody>
-          <a:bodyPr rtlCol="0" anchor="t"/>
-          <a:lstStyle/>
-          <a:p>
-            <a:r>
-              <a:rPr lang="en-GB" sz="1100" b="1" dirty="0">
-                <a:latin typeface="Consolas" panose="020B0609020204030204" pitchFamily="49" charset="0"/>
-              </a:rPr>
-              <a:t>Target: Web02</a:t>
-            </a:r>
-          </a:p>
-          <a:p>
-            <a:r>
-              <a:rPr lang="en-GB" sz="1100" b="1" dirty="0">
-                <a:latin typeface="Consolas" panose="020B0609020204030204" pitchFamily="49" charset="0"/>
-              </a:rPr>
-              <a:t>Roles:</a:t>
-            </a:r>
-            <a:r>
-              <a:rPr lang="en-GB" sz="300" b="1" dirty="0">
-                <a:latin typeface="Consolas" panose="020B0609020204030204" pitchFamily="49" charset="0"/>
-              </a:rPr>
-              <a:t> </a:t>
-            </a:r>
-            <a:endParaRPr lang="en-GB" sz="1100" b="1" dirty="0">
-              <a:latin typeface="Consolas" panose="020B0609020204030204" pitchFamily="49" charset="0"/>
-            </a:endParaRPr>
-          </a:p>
-          <a:p>
-            <a:r>
-              <a:rPr lang="en-GB" sz="1100" b="1" dirty="0" err="1">
-                <a:solidFill>
-                  <a:srgbClr val="FFFF00"/>
-                </a:solidFill>
-                <a:latin typeface="Consolas" panose="020B0609020204030204" pitchFamily="49" charset="0"/>
-              </a:rPr>
-              <a:t>WebServer</a:t>
-            </a:r>
-            <a:endParaRPr lang="en-GB" sz="1100" b="1" dirty="0">
-              <a:solidFill>
-                <a:srgbClr val="FFFF00"/>
-              </a:solidFill>
-              <a:latin typeface="Consolas" panose="020B0609020204030204" pitchFamily="49" charset="0"/>
-            </a:endParaRPr>
-          </a:p>
-          <a:p>
-            <a:endParaRPr lang="en-GB" sz="1100" dirty="0">
-              <a:latin typeface="Consolas" panose="020B0609020204030204" pitchFamily="49" charset="0"/>
-            </a:endParaRPr>
-          </a:p>
-        </p:txBody>
-      </p:sp>
-      <p:sp>
-        <p:nvSpPr>
-          <p:cNvPr id="7" name="Rectangle 6">
-            <a:extLst>
-              <a:ext uri="{FF2B5EF4-FFF2-40B4-BE49-F238E27FC236}">
-                <a16:creationId xmlns:a16="http://schemas.microsoft.com/office/drawing/2014/main" id="{97423E62-1D0A-45F2-A76F-1D2484112914}"/>
-              </a:ext>
-            </a:extLst>
-          </p:cNvPr>
-          <p:cNvSpPr/>
-          <p:nvPr/>
-        </p:nvSpPr>
-        <p:spPr>
-          <a:xfrm>
-            <a:off x="-3517602" y="3658485"/>
-            <a:ext cx="2571514" cy="917722"/>
-          </a:xfrm>
-          <a:prstGeom prst="rect">
-            <a:avLst/>
-          </a:prstGeom>
-          <a:solidFill>
-            <a:srgbClr val="2F93E0"/>
-          </a:solidFill>
-          <a:ln w="76200">
-            <a:solidFill>
-              <a:schemeClr val="bg1"/>
-            </a:solidFill>
-            <a:miter lim="800000"/>
-          </a:ln>
-        </p:spPr>
-        <p:style>
-          <a:lnRef idx="2">
-            <a:schemeClr val="accent1">
-              <a:shade val="50000"/>
-            </a:schemeClr>
-          </a:lnRef>
-          <a:fillRef idx="1">
-            <a:schemeClr val="accent1"/>
-          </a:fillRef>
-          <a:effectRef idx="0">
-            <a:schemeClr val="accent1"/>
-          </a:effectRef>
-          <a:fontRef idx="minor">
-            <a:schemeClr val="lt1"/>
-          </a:fontRef>
-        </p:style>
-        <p:txBody>
-          <a:bodyPr rtlCol="0" anchor="t"/>
-          <a:lstStyle/>
-          <a:p>
-            <a:r>
-              <a:rPr lang="en-GB" sz="1100" dirty="0">
-                <a:latin typeface="Consolas" panose="020B0609020204030204" pitchFamily="49" charset="0"/>
-              </a:rPr>
-              <a:t>Target: DB02</a:t>
-            </a:r>
-          </a:p>
-          <a:p>
-            <a:r>
-              <a:rPr lang="en-GB" sz="300" dirty="0">
-                <a:latin typeface="Consolas" panose="020B0609020204030204" pitchFamily="49" charset="0"/>
-              </a:rPr>
-              <a:t> </a:t>
-            </a:r>
-            <a:r>
-              <a:rPr lang="en-GB" sz="1100" dirty="0">
-                <a:latin typeface="Consolas" panose="020B0609020204030204" pitchFamily="49" charset="0"/>
-              </a:rPr>
-              <a:t>Roles:</a:t>
-            </a:r>
-            <a:r>
-              <a:rPr lang="en-GB" sz="300" dirty="0">
-                <a:latin typeface="Consolas" panose="020B0609020204030204" pitchFamily="49" charset="0"/>
-              </a:rPr>
-              <a:t> </a:t>
-            </a:r>
-            <a:endParaRPr lang="en-GB" sz="1100" dirty="0">
-              <a:latin typeface="Consolas" panose="020B0609020204030204" pitchFamily="49" charset="0"/>
-            </a:endParaRPr>
-          </a:p>
-          <a:p>
-            <a:r>
-              <a:rPr lang="en-GB" sz="1100" dirty="0">
-                <a:solidFill>
-                  <a:schemeClr val="accent6"/>
-                </a:solidFill>
-                <a:latin typeface="Consolas" panose="020B0609020204030204" pitchFamily="49" charset="0"/>
-              </a:rPr>
-              <a:t>Database</a:t>
-            </a:r>
-          </a:p>
-          <a:p>
-            <a:endParaRPr lang="en-GB" sz="1100" dirty="0">
-              <a:latin typeface="Consolas" panose="020B0609020204030204" pitchFamily="49" charset="0"/>
-            </a:endParaRPr>
-          </a:p>
-        </p:txBody>
-      </p:sp>
-      <p:sp>
-        <p:nvSpPr>
-          <p:cNvPr id="9" name="Rectangle 8">
-            <a:extLst>
-              <a:ext uri="{FF2B5EF4-FFF2-40B4-BE49-F238E27FC236}">
-                <a16:creationId xmlns:a16="http://schemas.microsoft.com/office/drawing/2014/main" id="{708F42E3-02CA-44D3-9683-0CADB846FD68}"/>
-              </a:ext>
-            </a:extLst>
-          </p:cNvPr>
-          <p:cNvSpPr/>
-          <p:nvPr/>
-        </p:nvSpPr>
-        <p:spPr>
-          <a:xfrm>
-            <a:off x="-3833226" y="2416071"/>
-            <a:ext cx="2571512" cy="892911"/>
-          </a:xfrm>
-          <a:prstGeom prst="rect">
-            <a:avLst/>
-          </a:prstGeom>
-          <a:solidFill>
-            <a:srgbClr val="00CC65"/>
-          </a:solidFill>
-          <a:ln w="76200">
-            <a:solidFill>
-              <a:schemeClr val="bg1"/>
-            </a:solidFill>
-            <a:miter lim="800000"/>
-          </a:ln>
-        </p:spPr>
-        <p:style>
-          <a:lnRef idx="2">
-            <a:schemeClr val="accent1">
-              <a:shade val="50000"/>
-            </a:schemeClr>
-          </a:lnRef>
-          <a:fillRef idx="1">
-            <a:schemeClr val="accent1"/>
-          </a:fillRef>
-          <a:effectRef idx="0">
-            <a:schemeClr val="accent1"/>
-          </a:effectRef>
-          <a:fontRef idx="minor">
-            <a:schemeClr val="lt1"/>
-          </a:fontRef>
-        </p:style>
-        <p:txBody>
-          <a:bodyPr rtlCol="0" anchor="t"/>
-          <a:lstStyle/>
-          <a:p>
-            <a:r>
-              <a:rPr lang="en-GB" sz="1100" b="1" dirty="0">
-                <a:latin typeface="Consolas" panose="020B0609020204030204" pitchFamily="49" charset="0"/>
-              </a:rPr>
-              <a:t>Target: Web03</a:t>
-            </a:r>
-          </a:p>
-          <a:p>
-            <a:r>
-              <a:rPr lang="en-GB" sz="1100" b="1" dirty="0">
-                <a:latin typeface="Consolas" panose="020B0609020204030204" pitchFamily="49" charset="0"/>
-              </a:rPr>
-              <a:t>Roles:</a:t>
-            </a:r>
-            <a:r>
-              <a:rPr lang="en-GB" sz="300" b="1" dirty="0">
-                <a:latin typeface="Consolas" panose="020B0609020204030204" pitchFamily="49" charset="0"/>
-              </a:rPr>
-              <a:t> </a:t>
-            </a:r>
-            <a:endParaRPr lang="en-GB" sz="1100" b="1" dirty="0">
-              <a:latin typeface="Consolas" panose="020B0609020204030204" pitchFamily="49" charset="0"/>
-            </a:endParaRPr>
-          </a:p>
-          <a:p>
-            <a:r>
-              <a:rPr lang="en-GB" sz="1100" b="1" dirty="0" err="1">
-                <a:solidFill>
-                  <a:srgbClr val="FFFF00"/>
-                </a:solidFill>
-                <a:latin typeface="Consolas" panose="020B0609020204030204" pitchFamily="49" charset="0"/>
-              </a:rPr>
-              <a:t>WebServer</a:t>
-            </a:r>
-            <a:endParaRPr lang="en-GB" sz="1100" b="1" dirty="0">
-              <a:solidFill>
-                <a:srgbClr val="FFFF00"/>
-              </a:solidFill>
-              <a:latin typeface="Consolas" panose="020B0609020204030204" pitchFamily="49" charset="0"/>
-            </a:endParaRPr>
-          </a:p>
-          <a:p>
-            <a:endParaRPr lang="en-GB" sz="1100" dirty="0">
-              <a:latin typeface="Consolas" panose="020B0609020204030204" pitchFamily="49" charset="0"/>
-            </a:endParaRPr>
-          </a:p>
-        </p:txBody>
-      </p:sp>
       <p:pic>
         <p:nvPicPr>
           <p:cNvPr id="10" name="Graphic 9" descr="Internet with solid fill">
@@ -9139,13 +8708,13 @@
   <p:clrMapOvr>
     <a:masterClrMapping/>
   </p:clrMapOvr>
-  <mc:AlternateContent xmlns:mc="http://schemas.openxmlformats.org/markup-compatibility/2006">
-    <mc:Choice xmlns:p14="http://schemas.microsoft.com/office/powerpoint/2010/main" Requires="p14">
+  <mc:AlternateContent xmlns:mc="http://schemas.openxmlformats.org/markup-compatibility/2006" xmlns:p14="http://schemas.microsoft.com/office/powerpoint/2010/main">
+    <mc:Choice Requires="p14">
       <p:transition spd="med" p14:dur="700">
         <p:fade/>
       </p:transition>
     </mc:Choice>
-    <mc:Fallback>
+    <mc:Fallback xmlns="">
       <p:transition spd="med">
         <p:fade/>
       </p:transition>
@@ -9155,6 +8724,86 @@
 </file>
 
 <file path=ppt/slides/slide7.xml><?xml version="1.0" encoding="utf-8"?>
+<p:sld xmlns:a="http://schemas.openxmlformats.org/drawingml/2006/main" xmlns:r="http://schemas.openxmlformats.org/officeDocument/2006/relationships" xmlns:p="http://schemas.openxmlformats.org/presentationml/2006/main">
+  <p:cSld>
+    <p:spTree>
+      <p:nvGrpSpPr>
+        <p:cNvPr id="1" name=""/>
+        <p:cNvGrpSpPr/>
+        <p:nvPr/>
+      </p:nvGrpSpPr>
+      <p:grpSpPr>
+        <a:xfrm>
+          <a:off x="0" y="0"/>
+          <a:ext cx="0" cy="0"/>
+          <a:chOff x="0" y="0"/>
+          <a:chExt cx="0" cy="0"/>
+        </a:xfrm>
+      </p:grpSpPr>
+      <p:sp>
+        <p:nvSpPr>
+          <p:cNvPr id="2" name="Title 1">
+            <a:extLst>
+              <a:ext uri="{FF2B5EF4-FFF2-40B4-BE49-F238E27FC236}">
+                <a16:creationId xmlns:a16="http://schemas.microsoft.com/office/drawing/2014/main" id="{0534B25F-8574-46A9-AF4C-2ED315916406}"/>
+              </a:ext>
+            </a:extLst>
+          </p:cNvPr>
+          <p:cNvSpPr>
+            <a:spLocks noGrp="1"/>
+          </p:cNvSpPr>
+          <p:nvPr>
+            <p:ph type="title"/>
+          </p:nvPr>
+        </p:nvSpPr>
+        <p:spPr/>
+        <p:txBody>
+          <a:bodyPr/>
+          <a:lstStyle/>
+          <a:p>
+            <a:endParaRPr lang="en-GB"/>
+          </a:p>
+        </p:txBody>
+      </p:sp>
+      <p:sp>
+        <p:nvSpPr>
+          <p:cNvPr id="3" name="Text Placeholder 2">
+            <a:extLst>
+              <a:ext uri="{FF2B5EF4-FFF2-40B4-BE49-F238E27FC236}">
+                <a16:creationId xmlns:a16="http://schemas.microsoft.com/office/drawing/2014/main" id="{96D79BD1-4C34-4C68-8FA0-C1657628B893}"/>
+              </a:ext>
+            </a:extLst>
+          </p:cNvPr>
+          <p:cNvSpPr>
+            <a:spLocks noGrp="1"/>
+          </p:cNvSpPr>
+          <p:nvPr>
+            <p:ph type="body" idx="1"/>
+          </p:nvPr>
+        </p:nvSpPr>
+        <p:spPr/>
+        <p:txBody>
+          <a:bodyPr/>
+          <a:lstStyle/>
+          <a:p>
+            <a:endParaRPr lang="en-GB"/>
+          </a:p>
+        </p:txBody>
+      </p:sp>
+    </p:spTree>
+    <p:extLst>
+      <p:ext uri="{BB962C8B-B14F-4D97-AF65-F5344CB8AC3E}">
+        <p14:creationId xmlns:p14="http://schemas.microsoft.com/office/powerpoint/2010/main" val="557030965"/>
+      </p:ext>
+    </p:extLst>
+  </p:cSld>
+  <p:clrMapOvr>
+    <a:masterClrMapping/>
+  </p:clrMapOvr>
+</p:sld>
+</file>
+
+<file path=ppt/slides/slide8.xml><?xml version="1.0" encoding="utf-8"?>
 <p:sld xmlns:a="http://schemas.openxmlformats.org/drawingml/2006/main" xmlns:r="http://schemas.openxmlformats.org/officeDocument/2006/relationships" xmlns:p="http://schemas.openxmlformats.org/presentationml/2006/main">
   <p:cSld>
     <p:spTree>
@@ -9266,13 +8915,13 @@
   <p:clrMapOvr>
     <a:masterClrMapping/>
   </p:clrMapOvr>
-  <mc:AlternateContent xmlns:mc="http://schemas.openxmlformats.org/markup-compatibility/2006">
-    <mc:Choice xmlns:p14="http://schemas.microsoft.com/office/powerpoint/2010/main" Requires="p14">
+  <mc:AlternateContent xmlns:mc="http://schemas.openxmlformats.org/markup-compatibility/2006" xmlns:p14="http://schemas.microsoft.com/office/powerpoint/2010/main">
+    <mc:Choice Requires="p14">
       <p:transition spd="med" p14:dur="700">
         <p:fade/>
       </p:transition>
     </mc:Choice>
-    <mc:Fallback>
+    <mc:Fallback xmlns="">
       <p:transition spd="med">
         <p:fade/>
       </p:transition>

</xml_diff>